<commit_message>
add code before poster
</commit_message>
<xml_diff>
--- a/221POSTER.pptx
+++ b/221POSTER.pptx
@@ -3567,8 +3567,8 @@
         </p:nvSpPr>
         <p:spPr>
           <a:xfrm>
-            <a:off x="567401" y="3232386"/>
-            <a:ext cx="7816992" cy="5755271"/>
+            <a:off x="567401" y="3232387"/>
+            <a:ext cx="7816992" cy="5399840"/>
           </a:xfrm>
           <a:prstGeom prst="rect">
             <a:avLst/>
@@ -3727,7 +3727,7 @@
         <p:spPr>
           <a:xfrm>
             <a:off x="17983200" y="13932903"/>
-            <a:ext cx="8984960" cy="3798249"/>
+            <a:ext cx="8984960" cy="3981350"/>
           </a:xfrm>
           <a:prstGeom prst="rect">
             <a:avLst/>
@@ -3771,8 +3771,8 @@
         </p:nvSpPr>
         <p:spPr>
           <a:xfrm>
-            <a:off x="690004" y="3852201"/>
-            <a:ext cx="7662202" cy="7331399"/>
+            <a:off x="592563" y="3845267"/>
+            <a:ext cx="7662202" cy="6777401"/>
           </a:xfrm>
           <a:prstGeom prst="rect">
             <a:avLst/>
@@ -3792,7 +3792,19 @@
               <a:rPr lang="en-US" sz="2200" dirty="0">
                 <a:latin typeface="Helvetica" pitchFamily="2" charset="0"/>
               </a:rPr>
-              <a:t>Office hours (OHs) are integral to Stanford’s classes.</a:t>
+              <a:t>OHs often suffer from </a:t>
+            </a:r>
+            <a:r>
+              <a:rPr lang="en-US" sz="2200" b="1" dirty="0">
+                <a:latin typeface="Helvetica" pitchFamily="2" charset="0"/>
+              </a:rPr>
+              <a:t>overcrowding and long wait times</a:t>
+            </a:r>
+            <a:r>
+              <a:rPr lang="en-US" sz="2200" dirty="0">
+                <a:latin typeface="Helvetica" pitchFamily="2" charset="0"/>
+              </a:rPr>
+              <a:t>, stressing both students and instructors. </a:t>
             </a:r>
           </a:p>
           <a:p>
@@ -3813,19 +3825,7 @@
               <a:rPr lang="en-US" sz="2200" dirty="0">
                 <a:latin typeface="Helvetica" pitchFamily="2" charset="0"/>
               </a:rPr>
-              <a:t>Unfortunately, OHs often suffer from </a:t>
-            </a:r>
-            <a:r>
-              <a:rPr lang="en-US" sz="2200" b="1" dirty="0">
-                <a:latin typeface="Helvetica" pitchFamily="2" charset="0"/>
-              </a:rPr>
-              <a:t>overcrowding and long wait times</a:t>
-            </a:r>
-            <a:r>
-              <a:rPr lang="en-US" sz="2200" dirty="0">
-                <a:latin typeface="Helvetica" pitchFamily="2" charset="0"/>
-              </a:rPr>
-              <a:t>, stressing both students and instructors. </a:t>
+              <a:t>If we could accurately predict the expected workload at a given OH, TAs can be better allocated. </a:t>
             </a:r>
           </a:p>
           <a:p>
@@ -3843,10 +3843,16 @@
               <a:buChar char="•"/>
             </a:pPr>
             <a:r>
+              <a:rPr lang="en-US" sz="2200" dirty="0" err="1">
+                <a:latin typeface="Helvetica" pitchFamily="2" charset="0"/>
+              </a:rPr>
+              <a:t>QueueStatus</a:t>
+            </a:r>
+            <a:r>
               <a:rPr lang="en-US" sz="2200" dirty="0">
                 <a:latin typeface="Helvetica" pitchFamily="2" charset="0"/>
               </a:rPr>
-              <a:t>If we could accurately predict the expected workload at a given OH, TAs can be better allocated. </a:t>
+              <a:t>, Carta, and course syllabi provide a wealth of information that can be used. </a:t>
             </a:r>
           </a:p>
           <a:p>
@@ -3864,16 +3870,34 @@
               <a:buChar char="•"/>
             </a:pPr>
             <a:r>
-              <a:rPr lang="en-US" sz="2200" dirty="0" err="1">
-                <a:latin typeface="Helvetica" pitchFamily="2" charset="0"/>
-              </a:rPr>
-              <a:t>QueueStatus</a:t>
-            </a:r>
-            <a:r>
               <a:rPr lang="en-US" sz="2200" dirty="0">
                 <a:latin typeface="Helvetica" pitchFamily="2" charset="0"/>
               </a:rPr>
-              <a:t>, Carta, and course syllabi provide a wealth of information that can be used. </a:t>
+              <a:t>We trained a </a:t>
+            </a:r>
+            <a:r>
+              <a:rPr lang="en-US" sz="2200" b="1" dirty="0">
+                <a:latin typeface="Helvetica" pitchFamily="2" charset="0"/>
+              </a:rPr>
+              <a:t>neural network model that predicts student load influx</a:t>
+            </a:r>
+            <a:r>
+              <a:rPr lang="en-US" sz="2200" dirty="0">
+                <a:latin typeface="Helvetica" pitchFamily="2" charset="0"/>
+              </a:rPr>
+              <a:t> </a:t>
+            </a:r>
+            <a:r>
+              <a:rPr lang="en-US" sz="2200" b="1" dirty="0">
+                <a:latin typeface="Helvetica" pitchFamily="2" charset="0"/>
+              </a:rPr>
+              <a:t>(expected serve time * # sign-ups) </a:t>
+            </a:r>
+            <a:r>
+              <a:rPr lang="en-US" sz="2200" dirty="0">
+                <a:latin typeface="Helvetica" pitchFamily="2" charset="0"/>
+              </a:rPr>
+              <a:t>at OH on an hourly basis, for any course.</a:t>
             </a:r>
           </a:p>
           <a:p>
@@ -3894,13 +3918,13 @@
               <a:rPr lang="en-US" sz="2200" dirty="0">
                 <a:latin typeface="Helvetica" pitchFamily="2" charset="0"/>
               </a:rPr>
-              <a:t>We trained a </a:t>
+              <a:t>With these predictions, we now </a:t>
             </a:r>
             <a:r>
               <a:rPr lang="en-US" sz="2200" b="1" dirty="0">
                 <a:latin typeface="Helvetica" pitchFamily="2" charset="0"/>
               </a:rPr>
-              <a:t>neural network model that predicts student load influx</a:t>
+              <a:t>optimize</a:t>
             </a:r>
             <a:r>
               <a:rPr lang="en-US" sz="2200" dirty="0">
@@ -3912,46 +3936,37 @@
               <a:rPr lang="en-US" sz="2200" b="1" dirty="0">
                 <a:latin typeface="Helvetica" pitchFamily="2" charset="0"/>
               </a:rPr>
-              <a:t>(expected serve time * # sign-ups) </a:t>
+              <a:t>TA scheduling </a:t>
             </a:r>
             <a:r>
               <a:rPr lang="en-US" sz="2200" dirty="0">
                 <a:latin typeface="Helvetica" pitchFamily="2" charset="0"/>
               </a:rPr>
-              <a:t>at OH on an hourly basis, for any course.</a:t>
-            </a:r>
-          </a:p>
-          <a:p>
-            <a:pPr marL="326579" indent="-326579">
-              <a:buFont typeface="Arial" panose="020B0604020202020204" pitchFamily="34" charset="0"/>
-              <a:buChar char="•"/>
-            </a:pPr>
-            <a:endParaRPr lang="en-US" sz="1400" dirty="0">
-              <a:latin typeface="Helvetica" pitchFamily="2" charset="0"/>
-            </a:endParaRPr>
-          </a:p>
-          <a:p>
-            <a:pPr marL="326579" indent="-326579">
-              <a:buFont typeface="Arial" panose="020B0604020202020204" pitchFamily="34" charset="0"/>
-              <a:buChar char="•"/>
-            </a:pPr>
+              <a:t>given </a:t>
+            </a:r>
+            <a:r>
+              <a:rPr lang="en-US" sz="2200" b="1" dirty="0">
+                <a:latin typeface="Helvetica" pitchFamily="2" charset="0"/>
+              </a:rPr>
+              <a:t>realistic</a:t>
+            </a:r>
             <a:r>
               <a:rPr lang="en-US" sz="2200" dirty="0">
                 <a:latin typeface="Helvetica" pitchFamily="2" charset="0"/>
               </a:rPr>
-              <a:t>With these predictions, we now optimize </a:t>
+              <a:t> </a:t>
             </a:r>
             <a:r>
               <a:rPr lang="en-US" sz="2200" b="1" dirty="0">
                 <a:latin typeface="Helvetica" pitchFamily="2" charset="0"/>
               </a:rPr>
-              <a:t>TA scheduling </a:t>
+              <a:t>constraints</a:t>
             </a:r>
             <a:r>
               <a:rPr lang="en-US" sz="2200" dirty="0">
                 <a:latin typeface="Helvetica" pitchFamily="2" charset="0"/>
               </a:rPr>
-              <a:t>given realistic constraints. </a:t>
+              <a:t>. </a:t>
             </a:r>
           </a:p>
           <a:p>
@@ -4020,7 +4035,7 @@
         </p:nvSpPr>
         <p:spPr bwMode="auto">
           <a:xfrm>
-            <a:off x="567399" y="9248027"/>
+            <a:off x="567399" y="8862207"/>
             <a:ext cx="7826825" cy="723657"/>
           </a:xfrm>
           <a:prstGeom prst="rect">
@@ -4197,7 +4212,7 @@
         </p:nvSpPr>
         <p:spPr>
           <a:xfrm>
-            <a:off x="1219200" y="10023535"/>
+            <a:off x="1188393" y="9661046"/>
             <a:ext cx="6700698" cy="417037"/>
           </a:xfrm>
           <a:prstGeom prst="rect">
@@ -4233,7 +4248,7 @@
         </p:nvSpPr>
         <p:spPr>
           <a:xfrm>
-            <a:off x="567399" y="9248027"/>
+            <a:off x="567399" y="8862207"/>
             <a:ext cx="7833192" cy="2846187"/>
           </a:xfrm>
           <a:prstGeom prst="rect">
@@ -4418,8 +4433,8 @@
         </p:nvSpPr>
         <p:spPr>
           <a:xfrm>
-            <a:off x="8948351" y="3086773"/>
-            <a:ext cx="8391462" cy="14644380"/>
+            <a:off x="8948351" y="3086772"/>
+            <a:ext cx="8391462" cy="14820227"/>
           </a:xfrm>
           <a:prstGeom prst="rect">
             <a:avLst/>
@@ -4660,41 +4675,6 @@
           <a:lstStyle/>
           <a:p>
             <a:endParaRPr lang="en-US" sz="1286" dirty="0">
-              <a:cs typeface="Arial"/>
-            </a:endParaRPr>
-          </a:p>
-        </p:txBody>
-      </p:sp>
-      <p:sp>
-        <p:nvSpPr>
-          <p:cNvPr id="95" name="Rectangle 94"/>
-          <p:cNvSpPr/>
-          <p:nvPr/>
-        </p:nvSpPr>
-        <p:spPr>
-          <a:xfrm>
-            <a:off x="18554509" y="5681467"/>
-            <a:ext cx="2490942" cy="400110"/>
-          </a:xfrm>
-          <a:prstGeom prst="rect">
-            <a:avLst/>
-          </a:prstGeom>
-        </p:spPr>
-        <p:txBody>
-          <a:bodyPr wrap="square">
-            <a:spAutoFit/>
-          </a:bodyPr>
-          <a:lstStyle/>
-          <a:p>
-            <a:r>
-              <a:rPr lang="en-US" sz="2000" b="1" dirty="0">
-                <a:latin typeface="Helvetica" pitchFamily="2" charset="0"/>
-                <a:cs typeface="Arial"/>
-              </a:rPr>
-              <a:t>Figure 1:</a:t>
-            </a:r>
-            <a:endParaRPr lang="en-US" sz="2000" dirty="0">
-              <a:latin typeface="Helvetica" pitchFamily="2" charset="0"/>
               <a:cs typeface="Arial"/>
             </a:endParaRPr>
           </a:p>
@@ -4829,8 +4809,8 @@
         </p:nvSpPr>
         <p:spPr>
           <a:xfrm>
-            <a:off x="567398" y="13125204"/>
-            <a:ext cx="7833193" cy="4605949"/>
+            <a:off x="567398" y="12620612"/>
+            <a:ext cx="7833193" cy="5286388"/>
           </a:xfrm>
           <a:prstGeom prst="rect">
             <a:avLst/>
@@ -5375,43 +5355,6 @@
       </p:sp>
       <p:sp>
         <p:nvSpPr>
-          <p:cNvPr id="70" name="TextBox 69">
-            <a:extLst>
-              <a:ext uri="{FF2B5EF4-FFF2-40B4-BE49-F238E27FC236}">
-                <a16:creationId xmlns:a16="http://schemas.microsoft.com/office/drawing/2014/main" id="{9041D8EB-8AFD-6F41-9AEF-4A0940687680}"/>
-              </a:ext>
-            </a:extLst>
-          </p:cNvPr>
-          <p:cNvSpPr txBox="1"/>
-          <p:nvPr/>
-        </p:nvSpPr>
-        <p:spPr>
-          <a:xfrm>
-            <a:off x="18661398" y="5169368"/>
-            <a:ext cx="1635324" cy="400110"/>
-          </a:xfrm>
-          <a:prstGeom prst="rect">
-            <a:avLst/>
-          </a:prstGeom>
-          <a:noFill/>
-        </p:spPr>
-        <p:txBody>
-          <a:bodyPr wrap="square" rtlCol="0">
-            <a:spAutoFit/>
-          </a:bodyPr>
-          <a:lstStyle/>
-          <a:p>
-            <a:r>
-              <a:rPr lang="en-US" sz="2000" dirty="0">
-                <a:latin typeface="Helvetica" pitchFamily="2" charset="0"/>
-              </a:rPr>
-              <a:t>A:</a:t>
-            </a:r>
-          </a:p>
-        </p:txBody>
-      </p:sp>
-      <p:sp>
-        <p:nvSpPr>
           <p:cNvPr id="37" name="Rectangle 12">
             <a:extLst>
               <a:ext uri="{FF2B5EF4-FFF2-40B4-BE49-F238E27FC236}">
@@ -5537,7 +5480,7 @@
         </p:nvSpPr>
         <p:spPr bwMode="auto">
           <a:xfrm>
-            <a:off x="567398" y="12401547"/>
+            <a:off x="547724" y="11896955"/>
             <a:ext cx="7826825" cy="723657"/>
           </a:xfrm>
           <a:prstGeom prst="rect">
@@ -5583,8 +5526,8 @@
         </p:nvSpPr>
         <p:spPr>
           <a:xfrm>
-            <a:off x="653378" y="13283784"/>
-            <a:ext cx="7770728" cy="5439246"/>
+            <a:off x="653548" y="12762511"/>
+            <a:ext cx="7770728" cy="3238644"/>
           </a:xfrm>
           <a:prstGeom prst="rect">
             <a:avLst/>
@@ -5596,84 +5539,33 @@
           </a:bodyPr>
           <a:lstStyle/>
           <a:p>
+            <a:pPr marL="342900" indent="-342900">
+              <a:lnSpc>
+                <a:spcPct val="110000"/>
+              </a:lnSpc>
+              <a:buFont typeface="Arial" panose="020B0604020202020204" pitchFamily="34" charset="0"/>
+              <a:buChar char="•"/>
+            </a:pPr>
+            <a:r>
+              <a:rPr lang="en-US" sz="2000" dirty="0">
+                <a:latin typeface="Helvetica" pitchFamily="2" charset="0"/>
+                <a:cs typeface="Arial"/>
+              </a:rPr>
+              <a:t>Load influx is significantly and positively correlated with: </a:t>
+            </a:r>
+          </a:p>
+          <a:p>
             <a:pPr>
               <a:lnSpc>
                 <a:spcPct val="110000"/>
               </a:lnSpc>
             </a:pPr>
             <a:r>
-              <a:rPr lang="en-US" sz="2000" dirty="0">
-                <a:latin typeface="Helvetica" pitchFamily="2" charset="0"/>
-                <a:cs typeface="Arial"/>
-              </a:rPr>
-              <a:t>We analyzed </a:t>
-            </a:r>
-            <a:r>
               <a:rPr lang="en-US" sz="2000" b="1" dirty="0">
                 <a:latin typeface="Helvetica" pitchFamily="2" charset="0"/>
                 <a:cs typeface="Arial"/>
               </a:rPr>
-              <a:t>relationships between individual variables </a:t>
-            </a:r>
-            <a:r>
-              <a:rPr lang="en-US" sz="2000" dirty="0">
-                <a:latin typeface="Helvetica" pitchFamily="2" charset="0"/>
-                <a:cs typeface="Arial"/>
-              </a:rPr>
-              <a:t>and </a:t>
-            </a:r>
-            <a:r>
-              <a:rPr lang="en-US" sz="2000" b="1" dirty="0">
-                <a:latin typeface="Helvetica" pitchFamily="2" charset="0"/>
-                <a:cs typeface="Arial"/>
-              </a:rPr>
-              <a:t>load influx </a:t>
-            </a:r>
-            <a:r>
-              <a:rPr lang="en-US" sz="2000" dirty="0">
-                <a:latin typeface="Helvetica" pitchFamily="2" charset="0"/>
-                <a:cs typeface="Arial"/>
-              </a:rPr>
-              <a:t>across all office hours collected to find useful features.</a:t>
-            </a:r>
-          </a:p>
-          <a:p>
-            <a:pPr>
-              <a:lnSpc>
-                <a:spcPct val="110000"/>
-              </a:lnSpc>
-            </a:pPr>
-            <a:endParaRPr lang="en-US" sz="1200" dirty="0">
-              <a:latin typeface="Helvetica" pitchFamily="2" charset="0"/>
-              <a:cs typeface="Arial"/>
-            </a:endParaRPr>
-          </a:p>
-          <a:p>
-            <a:pPr algn="ctr">
-              <a:lnSpc>
-                <a:spcPct val="110000"/>
-              </a:lnSpc>
-            </a:pPr>
-            <a:r>
-              <a:rPr lang="en-US" sz="2000" dirty="0">
-                <a:latin typeface="Helvetica" pitchFamily="2" charset="0"/>
-                <a:cs typeface="Arial"/>
-              </a:rPr>
-              <a:t>Load influx is significantly and positively correlated with: </a:t>
-            </a:r>
-          </a:p>
-          <a:p>
-            <a:pPr algn="ctr">
-              <a:lnSpc>
-                <a:spcPct val="110000"/>
-              </a:lnSpc>
-            </a:pPr>
-            <a:r>
-              <a:rPr lang="en-US" sz="2000" b="1" dirty="0">
-                <a:latin typeface="Helvetica" pitchFamily="2" charset="0"/>
-                <a:cs typeface="Arial"/>
-              </a:rPr>
-              <a:t>Week number </a:t>
+              <a:t>     Week number </a:t>
             </a:r>
             <a:r>
               <a:rPr lang="en-US" sz="2000" dirty="0">
@@ -5694,7 +5586,85 @@
                 <a:latin typeface="Helvetica" pitchFamily="2" charset="0"/>
                 <a:cs typeface="Arial"/>
               </a:rPr>
-              <a:t>(r = 0.32).</a:t>
+              <a:t>(r = 0.32)</a:t>
+            </a:r>
+          </a:p>
+          <a:p>
+            <a:pPr marL="342900" indent="-342900">
+              <a:lnSpc>
+                <a:spcPct val="110000"/>
+              </a:lnSpc>
+              <a:buFont typeface="Arial" panose="020B0604020202020204" pitchFamily="34" charset="0"/>
+              <a:buChar char="•"/>
+            </a:pPr>
+            <a:r>
+              <a:rPr lang="en-US" sz="2000" dirty="0">
+                <a:latin typeface="Helvetica" pitchFamily="2" charset="0"/>
+                <a:cs typeface="Arial"/>
+              </a:rPr>
+              <a:t>Negatively correlated with: </a:t>
+            </a:r>
+            <a:br>
+              <a:rPr lang="en-US" sz="2000" dirty="0">
+                <a:latin typeface="Helvetica" pitchFamily="2" charset="0"/>
+                <a:cs typeface="Arial"/>
+              </a:rPr>
+            </a:br>
+            <a:r>
+              <a:rPr lang="en-US" sz="2000" b="1" dirty="0">
+                <a:latin typeface="Helvetica" pitchFamily="2" charset="0"/>
+                <a:cs typeface="Arial"/>
+              </a:rPr>
+              <a:t>Days until assignment due </a:t>
+            </a:r>
+            <a:r>
+              <a:rPr lang="en-US" sz="2000" dirty="0">
+                <a:latin typeface="Helvetica" pitchFamily="2" charset="0"/>
+                <a:cs typeface="Arial"/>
+              </a:rPr>
+              <a:t>(r= -0.08),  </a:t>
+            </a:r>
+            <a:r>
+              <a:rPr lang="en-US" sz="2000" b="1" dirty="0">
+                <a:latin typeface="Helvetica" pitchFamily="2" charset="0"/>
+                <a:cs typeface="Arial"/>
+              </a:rPr>
+              <a:t>Hour of day </a:t>
+            </a:r>
+            <a:r>
+              <a:rPr lang="en-US" sz="2000" dirty="0">
+                <a:latin typeface="Helvetica" pitchFamily="2" charset="0"/>
+                <a:cs typeface="Arial"/>
+              </a:rPr>
+              <a:t>(r = -0.10),  </a:t>
+            </a:r>
+            <a:r>
+              <a:rPr lang="en-US" sz="2000" b="1" dirty="0">
+                <a:latin typeface="Helvetica" pitchFamily="2" charset="0"/>
+                <a:cs typeface="Arial"/>
+              </a:rPr>
+              <a:t>Weekday</a:t>
+            </a:r>
+            <a:r>
+              <a:rPr lang="en-US" sz="2000" dirty="0">
+                <a:latin typeface="Helvetica" pitchFamily="2" charset="0"/>
+                <a:cs typeface="Arial"/>
+              </a:rPr>
+              <a:t> (r=-0.09), </a:t>
+            </a:r>
+            <a:r>
+              <a:rPr lang="en-US" sz="2000" b="1" dirty="0">
+                <a:latin typeface="Helvetica" pitchFamily="2" charset="0"/>
+                <a:cs typeface="Arial"/>
+              </a:rPr>
+              <a:t>Days until next exam </a:t>
+            </a:r>
+            <a:r>
+              <a:rPr lang="en-US" sz="2000" dirty="0">
+                <a:latin typeface="Helvetica" pitchFamily="2" charset="0"/>
+                <a:cs typeface="Arial"/>
+              </a:rPr>
+              <a:t>(r = -0.06)</a:t>
             </a:r>
           </a:p>
           <a:p>
@@ -5707,115 +5677,6 @@
               <a:latin typeface="Helvetica" pitchFamily="2" charset="0"/>
               <a:cs typeface="Arial"/>
             </a:endParaRPr>
-          </a:p>
-          <a:p>
-            <a:pPr algn="ctr">
-              <a:lnSpc>
-                <a:spcPct val="110000"/>
-              </a:lnSpc>
-            </a:pPr>
-            <a:r>
-              <a:rPr lang="en-US" sz="2000" dirty="0">
-                <a:latin typeface="Helvetica" pitchFamily="2" charset="0"/>
-                <a:cs typeface="Arial"/>
-              </a:rPr>
-              <a:t>Load influx is significantly and negatively correlated with: </a:t>
-            </a:r>
-          </a:p>
-          <a:p>
-            <a:pPr algn="ctr">
-              <a:lnSpc>
-                <a:spcPct val="110000"/>
-              </a:lnSpc>
-            </a:pPr>
-            <a:r>
-              <a:rPr lang="en-US" sz="2000" b="1" dirty="0">
-                <a:latin typeface="Helvetica" pitchFamily="2" charset="0"/>
-                <a:cs typeface="Arial"/>
-              </a:rPr>
-              <a:t>Days until assignment due </a:t>
-            </a:r>
-            <a:r>
-              <a:rPr lang="en-US" sz="2000" dirty="0">
-                <a:latin typeface="Helvetica" pitchFamily="2" charset="0"/>
-                <a:cs typeface="Arial"/>
-              </a:rPr>
-              <a:t>(r= -0.08),  </a:t>
-            </a:r>
-            <a:r>
-              <a:rPr lang="en-US" sz="2000" b="1" dirty="0">
-                <a:latin typeface="Helvetica" pitchFamily="2" charset="0"/>
-                <a:cs typeface="Arial"/>
-              </a:rPr>
-              <a:t>Hour of day </a:t>
-            </a:r>
-            <a:r>
-              <a:rPr lang="en-US" sz="2000" dirty="0">
-                <a:latin typeface="Helvetica" pitchFamily="2" charset="0"/>
-                <a:cs typeface="Arial"/>
-              </a:rPr>
-              <a:t>(r = -0.10),  </a:t>
-            </a:r>
-          </a:p>
-          <a:p>
-            <a:pPr algn="ctr">
-              <a:lnSpc>
-                <a:spcPct val="110000"/>
-              </a:lnSpc>
-            </a:pPr>
-            <a:r>
-              <a:rPr lang="en-US" sz="2000" b="1" dirty="0">
-                <a:latin typeface="Helvetica" pitchFamily="2" charset="0"/>
-                <a:cs typeface="Arial"/>
-              </a:rPr>
-              <a:t>Weekday</a:t>
-            </a:r>
-            <a:r>
-              <a:rPr lang="en-US" sz="2000" dirty="0">
-                <a:latin typeface="Helvetica" pitchFamily="2" charset="0"/>
-                <a:cs typeface="Arial"/>
-              </a:rPr>
-              <a:t> (r=-0.09), </a:t>
-            </a:r>
-            <a:r>
-              <a:rPr lang="en-US" sz="2000" b="1" dirty="0">
-                <a:latin typeface="Helvetica" pitchFamily="2" charset="0"/>
-                <a:cs typeface="Arial"/>
-              </a:rPr>
-              <a:t>Days until next exam </a:t>
-            </a:r>
-            <a:r>
-              <a:rPr lang="en-US" sz="2000" dirty="0">
-                <a:latin typeface="Helvetica" pitchFamily="2" charset="0"/>
-                <a:cs typeface="Arial"/>
-              </a:rPr>
-              <a:t>(r = -0.06)</a:t>
-            </a:r>
-          </a:p>
-          <a:p>
-            <a:pPr algn="ctr">
-              <a:lnSpc>
-                <a:spcPct val="110000"/>
-              </a:lnSpc>
-            </a:pPr>
-            <a:endParaRPr lang="en-US" sz="1200" dirty="0">
-              <a:latin typeface="Helvetica" pitchFamily="2" charset="0"/>
-              <a:cs typeface="Arial"/>
-            </a:endParaRPr>
-          </a:p>
-          <a:p>
-            <a:pPr algn="ctr">
-              <a:lnSpc>
-                <a:spcPct val="110000"/>
-              </a:lnSpc>
-            </a:pPr>
-            <a:r>
-              <a:rPr lang="en-US" sz="2000" dirty="0">
-                <a:latin typeface="Helvetica" pitchFamily="2" charset="0"/>
-                <a:cs typeface="Arial"/>
-              </a:rPr>
-              <a:t>We used all of these variables as predictor features, along with course information (instructor rating, enrolled students, avg. hours spent per week on course, % frosh/grad/PhD) </a:t>
-            </a:r>
           </a:p>
           <a:p>
             <a:pPr algn="ctr">
@@ -5876,13 +5737,13 @@
           <p:nvPr>
             <p:extLst>
               <p:ext uri="{D42A27DB-BD31-4B8C-83A1-F6EECF244321}">
-                <p14:modId xmlns:p14="http://schemas.microsoft.com/office/powerpoint/2010/main" val="1083876281"/>
+                <p14:modId xmlns:p14="http://schemas.microsoft.com/office/powerpoint/2010/main" val="907111339"/>
               </p:ext>
             </p:extLst>
           </p:nvPr>
         </p:nvGraphicFramePr>
         <p:xfrm>
-          <a:off x="627547" y="10408963"/>
+          <a:off x="574615" y="10070316"/>
           <a:ext cx="7773044" cy="1588476"/>
         </p:xfrm>
         <a:graphic>
@@ -8278,41 +8139,6 @@
       </p:sp>
       <p:sp>
         <p:nvSpPr>
-          <p:cNvPr id="30" name="TextBox 29">
-            <a:extLst>
-              <a:ext uri="{FF2B5EF4-FFF2-40B4-BE49-F238E27FC236}">
-                <a16:creationId xmlns:a16="http://schemas.microsoft.com/office/drawing/2014/main" id="{68FA4C74-CA41-5A47-BA27-E55E188440BD}"/>
-              </a:ext>
-            </a:extLst>
-          </p:cNvPr>
-          <p:cNvSpPr txBox="1"/>
-          <p:nvPr/>
-        </p:nvSpPr>
-        <p:spPr>
-          <a:xfrm>
-            <a:off x="9202395" y="7767558"/>
-            <a:ext cx="7605359" cy="646331"/>
-          </a:xfrm>
-          <a:prstGeom prst="rect">
-            <a:avLst/>
-          </a:prstGeom>
-          <a:noFill/>
-        </p:spPr>
-        <p:txBody>
-          <a:bodyPr wrap="square" rtlCol="0">
-            <a:spAutoFit/>
-          </a:bodyPr>
-          <a:lstStyle/>
-          <a:p>
-            <a:r>
-              <a:rPr lang="en-US" sz="3600" dirty="0"/>
-              <a:t>Dian Ang – fill in here </a:t>
-            </a:r>
-          </a:p>
-        </p:txBody>
-      </p:sp>
-      <p:sp>
-        <p:nvSpPr>
           <p:cNvPr id="63" name="TextBox 62">
             <a:extLst>
               <a:ext uri="{FF2B5EF4-FFF2-40B4-BE49-F238E27FC236}">
@@ -8361,10 +8187,10 @@
       </p:sp>
       <p:sp>
         <p:nvSpPr>
-          <p:cNvPr id="65" name="TextBox 64">
+          <p:cNvPr id="55" name="TextBox 54">
             <a:extLst>
               <a:ext uri="{FF2B5EF4-FFF2-40B4-BE49-F238E27FC236}">
-                <a16:creationId xmlns:a16="http://schemas.microsoft.com/office/drawing/2014/main" id="{36FFDDB7-5709-9E41-BC2B-5F7E7DE94399}"/>
+                <a16:creationId xmlns:a16="http://schemas.microsoft.com/office/drawing/2014/main" id="{39001FD3-5B49-D946-B5FE-CC0F37D748F8}"/>
               </a:ext>
             </a:extLst>
           </p:cNvPr>
@@ -8373,8 +8199,8 @@
         </p:nvSpPr>
         <p:spPr>
           <a:xfrm>
-            <a:off x="19381374" y="3982192"/>
-            <a:ext cx="7605359" cy="646331"/>
+            <a:off x="9028131" y="7658679"/>
+            <a:ext cx="8231902" cy="707886"/>
           </a:xfrm>
           <a:prstGeom prst="rect">
             <a:avLst/>
@@ -8387,19 +8213,389 @@
           </a:bodyPr>
           <a:lstStyle/>
           <a:p>
-            <a:r>
-              <a:rPr lang="en-US" sz="3600" dirty="0"/>
-              <a:t>Dian Ang – fill in here </a:t>
-            </a:r>
-          </a:p>
-        </p:txBody>
-      </p:sp>
-      <p:sp>
-        <p:nvSpPr>
-          <p:cNvPr id="66" name="TextBox 65">
+            <a:pPr marL="342900" indent="-342900">
+              <a:buFont typeface="Arial" panose="020B0604020202020204" pitchFamily="34" charset="0"/>
+              <a:buChar char="•"/>
+            </a:pPr>
+            <a:r>
+              <a:rPr lang="en-US" sz="2000" dirty="0">
+                <a:latin typeface="Helvetica" pitchFamily="2" charset="0"/>
+              </a:rPr>
+              <a:t>Trained and compared different models with deep fully-connected NN, univariate LSTMs and multivariate LSTMs.</a:t>
+            </a:r>
+          </a:p>
+        </p:txBody>
+      </p:sp>
+      <p:graphicFrame>
+        <p:nvGraphicFramePr>
+          <p:cNvPr id="3" name="Table 2">
             <a:extLst>
               <a:ext uri="{FF2B5EF4-FFF2-40B4-BE49-F238E27FC236}">
-                <a16:creationId xmlns:a16="http://schemas.microsoft.com/office/drawing/2014/main" id="{7A48A9D2-323B-4A4D-8B55-D6A20E47BBC9}"/>
+                <a16:creationId xmlns:a16="http://schemas.microsoft.com/office/drawing/2014/main" id="{09C9289D-51AA-EA43-98E3-C95E74530F55}"/>
+              </a:ext>
+            </a:extLst>
+          </p:cNvPr>
+          <p:cNvGraphicFramePr>
+            <a:graphicFrameLocks noGrp="1"/>
+          </p:cNvGraphicFramePr>
+          <p:nvPr>
+            <p:extLst>
+              <p:ext uri="{D42A27DB-BD31-4B8C-83A1-F6EECF244321}">
+                <p14:modId xmlns:p14="http://schemas.microsoft.com/office/powerpoint/2010/main" val="4262217554"/>
+              </p:ext>
+            </p:extLst>
+          </p:nvPr>
+        </p:nvGraphicFramePr>
+        <p:xfrm>
+          <a:off x="9517880" y="8343070"/>
+          <a:ext cx="7430888" cy="2115688"/>
+        </p:xfrm>
+        <a:graphic>
+          <a:graphicData uri="http://schemas.openxmlformats.org/drawingml/2006/table">
+            <a:tbl>
+              <a:tblPr firstRow="1" bandRow="1">
+                <a:tableStyleId>{21E4AEA4-8DFA-4A89-87EB-49C32662AFE0}</a:tableStyleId>
+              </a:tblPr>
+              <a:tblGrid>
+                <a:gridCol w="3715444">
+                  <a:extLst>
+                    <a:ext uri="{9D8B030D-6E8A-4147-A177-3AD203B41FA5}">
+                      <a16:colId xmlns:a16="http://schemas.microsoft.com/office/drawing/2014/main" val="2629748201"/>
+                    </a:ext>
+                  </a:extLst>
+                </a:gridCol>
+                <a:gridCol w="3715444">
+                  <a:extLst>
+                    <a:ext uri="{9D8B030D-6E8A-4147-A177-3AD203B41FA5}">
+                      <a16:colId xmlns:a16="http://schemas.microsoft.com/office/drawing/2014/main" val="2277001996"/>
+                    </a:ext>
+                  </a:extLst>
+                </a:gridCol>
+              </a:tblGrid>
+              <a:tr h="528922">
+                <a:tc>
+                  <a:txBody>
+                    <a:bodyPr/>
+                    <a:lstStyle/>
+                    <a:p>
+                      <a:pPr algn="ctr"/>
+                      <a:r>
+                        <a:rPr lang="en-US" sz="2200" dirty="0"/>
+                        <a:t>Model for regression</a:t>
+                      </a:r>
+                    </a:p>
+                  </a:txBody>
+                  <a:tcPr/>
+                </a:tc>
+                <a:tc>
+                  <a:txBody>
+                    <a:bodyPr/>
+                    <a:lstStyle/>
+                    <a:p>
+                      <a:pPr algn="ctr"/>
+                      <a:r>
+                        <a:rPr lang="en-US" sz="2200" dirty="0"/>
+                        <a:t>RMSE (Load Influx)</a:t>
+                      </a:r>
+                    </a:p>
+                  </a:txBody>
+                  <a:tcPr/>
+                </a:tc>
+                <a:extLst>
+                  <a:ext uri="{0D108BD9-81ED-4DB2-BD59-A6C34878D82A}">
+                    <a16:rowId xmlns:a16="http://schemas.microsoft.com/office/drawing/2014/main" val="1343423239"/>
+                  </a:ext>
+                </a:extLst>
+              </a:tr>
+              <a:tr h="528922">
+                <a:tc>
+                  <a:txBody>
+                    <a:bodyPr/>
+                    <a:lstStyle/>
+                    <a:p>
+                      <a:pPr algn="ctr"/>
+                      <a:r>
+                        <a:rPr lang="en-US" sz="2200" dirty="0"/>
+                        <a:t>FCN (hinge/MSE)</a:t>
+                      </a:r>
+                    </a:p>
+                  </a:txBody>
+                  <a:tcPr/>
+                </a:tc>
+                <a:tc>
+                  <a:txBody>
+                    <a:bodyPr/>
+                    <a:lstStyle/>
+                    <a:p>
+                      <a:pPr algn="ctr"/>
+                      <a:r>
+                        <a:rPr lang="en-US" sz="2200" b="0" dirty="0"/>
+                        <a:t>161 / </a:t>
+                      </a:r>
+                      <a:r>
+                        <a:rPr lang="en-US" sz="2200" b="1" dirty="0"/>
+                        <a:t>119</a:t>
+                      </a:r>
+                    </a:p>
+                  </a:txBody>
+                  <a:tcPr/>
+                </a:tc>
+                <a:extLst>
+                  <a:ext uri="{0D108BD9-81ED-4DB2-BD59-A6C34878D82A}">
+                    <a16:rowId xmlns:a16="http://schemas.microsoft.com/office/drawing/2014/main" val="1677445699"/>
+                  </a:ext>
+                </a:extLst>
+              </a:tr>
+              <a:tr h="528922">
+                <a:tc>
+                  <a:txBody>
+                    <a:bodyPr/>
+                    <a:lstStyle/>
+                    <a:p>
+                      <a:pPr algn="ctr"/>
+                      <a:r>
+                        <a:rPr lang="en-US" sz="2200" dirty="0"/>
+                        <a:t>Univariate LSTM</a:t>
+                      </a:r>
+                    </a:p>
+                  </a:txBody>
+                  <a:tcPr/>
+                </a:tc>
+                <a:tc>
+                  <a:txBody>
+                    <a:bodyPr/>
+                    <a:lstStyle/>
+                    <a:p>
+                      <a:pPr algn="ctr"/>
+                      <a:r>
+                        <a:rPr lang="en-US" sz="2200"/>
+                        <a:t>137</a:t>
+                      </a:r>
+                      <a:endParaRPr lang="en-US" sz="2200" dirty="0"/>
+                    </a:p>
+                  </a:txBody>
+                  <a:tcPr/>
+                </a:tc>
+                <a:extLst>
+                  <a:ext uri="{0D108BD9-81ED-4DB2-BD59-A6C34878D82A}">
+                    <a16:rowId xmlns:a16="http://schemas.microsoft.com/office/drawing/2014/main" val="3352610144"/>
+                  </a:ext>
+                </a:extLst>
+              </a:tr>
+              <a:tr h="528922">
+                <a:tc>
+                  <a:txBody>
+                    <a:bodyPr/>
+                    <a:lstStyle/>
+                    <a:p>
+                      <a:pPr algn="ctr"/>
+                      <a:r>
+                        <a:rPr lang="en-US" sz="2200" dirty="0"/>
+                        <a:t>Autoregressive LSTM</a:t>
+                      </a:r>
+                    </a:p>
+                  </a:txBody>
+                  <a:tcPr/>
+                </a:tc>
+                <a:tc>
+                  <a:txBody>
+                    <a:bodyPr/>
+                    <a:lstStyle/>
+                    <a:p>
+                      <a:pPr algn="ctr"/>
+                      <a:r>
+                        <a:rPr lang="en-US" sz="2200" dirty="0"/>
+                        <a:t>128</a:t>
+                      </a:r>
+                    </a:p>
+                  </a:txBody>
+                  <a:tcPr/>
+                </a:tc>
+                <a:extLst>
+                  <a:ext uri="{0D108BD9-81ED-4DB2-BD59-A6C34878D82A}">
+                    <a16:rowId xmlns:a16="http://schemas.microsoft.com/office/drawing/2014/main" val="3662109026"/>
+                  </a:ext>
+                </a:extLst>
+              </a:tr>
+            </a:tbl>
+          </a:graphicData>
+        </a:graphic>
+      </p:graphicFrame>
+      <p:grpSp>
+        <p:nvGrpSpPr>
+          <p:cNvPr id="14" name="Group 13">
+            <a:extLst>
+              <a:ext uri="{FF2B5EF4-FFF2-40B4-BE49-F238E27FC236}">
+                <a16:creationId xmlns:a16="http://schemas.microsoft.com/office/drawing/2014/main" id="{DBC57ACA-1F60-3B40-B5D1-375166A4D0FD}"/>
+              </a:ext>
+            </a:extLst>
+          </p:cNvPr>
+          <p:cNvGrpSpPr/>
+          <p:nvPr/>
+        </p:nvGrpSpPr>
+        <p:grpSpPr>
+          <a:xfrm>
+            <a:off x="18042860" y="4234041"/>
+            <a:ext cx="8767786" cy="2702250"/>
+            <a:chOff x="18094769" y="4385325"/>
+            <a:chExt cx="8767786" cy="2702250"/>
+          </a:xfrm>
+        </p:grpSpPr>
+        <p:grpSp>
+          <p:nvGrpSpPr>
+            <p:cNvPr id="12" name="Group 11">
+              <a:extLst>
+                <a:ext uri="{FF2B5EF4-FFF2-40B4-BE49-F238E27FC236}">
+                  <a16:creationId xmlns:a16="http://schemas.microsoft.com/office/drawing/2014/main" id="{1F21AC5A-70DC-B64C-8C14-26B1076103FF}"/>
+                </a:ext>
+              </a:extLst>
+            </p:cNvPr>
+            <p:cNvGrpSpPr/>
+            <p:nvPr/>
+          </p:nvGrpSpPr>
+          <p:grpSpPr>
+            <a:xfrm>
+              <a:off x="18094770" y="4385325"/>
+              <a:ext cx="8767785" cy="2267525"/>
+              <a:chOff x="18094770" y="4385325"/>
+              <a:chExt cx="8767785" cy="2267525"/>
+            </a:xfrm>
+          </p:grpSpPr>
+          <p:pic>
+            <p:nvPicPr>
+              <p:cNvPr id="4" name="Picture 3">
+                <a:extLst>
+                  <a:ext uri="{FF2B5EF4-FFF2-40B4-BE49-F238E27FC236}">
+                    <a16:creationId xmlns:a16="http://schemas.microsoft.com/office/drawing/2014/main" id="{400AA407-2F4B-E548-BAEF-B635B07BE19E}"/>
+                  </a:ext>
+                </a:extLst>
+              </p:cNvPr>
+              <p:cNvPicPr>
+                <a:picLocks noChangeAspect="1"/>
+              </p:cNvPicPr>
+              <p:nvPr/>
+            </p:nvPicPr>
+            <p:blipFill>
+              <a:blip r:embed="rId4"/>
+              <a:stretch>
+                <a:fillRect/>
+              </a:stretch>
+            </p:blipFill>
+            <p:spPr>
+              <a:xfrm>
+                <a:off x="23840153" y="4407624"/>
+                <a:ext cx="3022402" cy="2222928"/>
+              </a:xfrm>
+              <a:prstGeom prst="rect">
+                <a:avLst/>
+              </a:prstGeom>
+            </p:spPr>
+          </p:pic>
+          <p:pic>
+            <p:nvPicPr>
+              <p:cNvPr id="7" name="Picture 6">
+                <a:extLst>
+                  <a:ext uri="{FF2B5EF4-FFF2-40B4-BE49-F238E27FC236}">
+                    <a16:creationId xmlns:a16="http://schemas.microsoft.com/office/drawing/2014/main" id="{273282C8-A615-884F-9544-42220FDFECDD}"/>
+                  </a:ext>
+                </a:extLst>
+              </p:cNvPr>
+              <p:cNvPicPr>
+                <a:picLocks noChangeAspect="1"/>
+              </p:cNvPicPr>
+              <p:nvPr/>
+            </p:nvPicPr>
+            <p:blipFill>
+              <a:blip r:embed="rId5"/>
+              <a:stretch>
+                <a:fillRect/>
+              </a:stretch>
+            </p:blipFill>
+            <p:spPr>
+              <a:xfrm>
+                <a:off x="20981336" y="4473300"/>
+                <a:ext cx="2855281" cy="2130516"/>
+              </a:xfrm>
+              <a:prstGeom prst="rect">
+                <a:avLst/>
+              </a:prstGeom>
+            </p:spPr>
+          </p:pic>
+          <p:pic>
+            <p:nvPicPr>
+              <p:cNvPr id="8" name="Picture 7">
+                <a:extLst>
+                  <a:ext uri="{FF2B5EF4-FFF2-40B4-BE49-F238E27FC236}">
+                    <a16:creationId xmlns:a16="http://schemas.microsoft.com/office/drawing/2014/main" id="{22DCC4E4-787E-6744-8F3D-BAE5FC6EB75B}"/>
+                  </a:ext>
+                </a:extLst>
+              </p:cNvPr>
+              <p:cNvPicPr>
+                <a:picLocks noChangeAspect="1"/>
+              </p:cNvPicPr>
+              <p:nvPr/>
+            </p:nvPicPr>
+            <p:blipFill>
+              <a:blip r:embed="rId6"/>
+              <a:stretch>
+                <a:fillRect/>
+              </a:stretch>
+            </p:blipFill>
+            <p:spPr>
+              <a:xfrm>
+                <a:off x="18094770" y="4385325"/>
+                <a:ext cx="2873841" cy="2267525"/>
+              </a:xfrm>
+              <a:prstGeom prst="rect">
+                <a:avLst/>
+              </a:prstGeom>
+            </p:spPr>
+          </p:pic>
+        </p:grpSp>
+        <p:sp>
+          <p:nvSpPr>
+            <p:cNvPr id="59" name="TextBox 58">
+              <a:extLst>
+                <a:ext uri="{FF2B5EF4-FFF2-40B4-BE49-F238E27FC236}">
+                  <a16:creationId xmlns:a16="http://schemas.microsoft.com/office/drawing/2014/main" id="{81F67041-EDD6-544B-99F7-E12D90C9B454}"/>
+                </a:ext>
+              </a:extLst>
+            </p:cNvPr>
+            <p:cNvSpPr txBox="1"/>
+            <p:nvPr/>
+          </p:nvSpPr>
+          <p:spPr>
+            <a:xfrm>
+              <a:off x="18094769" y="6656688"/>
+              <a:ext cx="8767785" cy="430887"/>
+            </a:xfrm>
+            <a:prstGeom prst="rect">
+              <a:avLst/>
+            </a:prstGeom>
+            <a:noFill/>
+          </p:spPr>
+          <p:txBody>
+            <a:bodyPr wrap="square" rtlCol="0">
+              <a:spAutoFit/>
+            </a:bodyPr>
+            <a:lstStyle/>
+            <a:p>
+              <a:r>
+                <a:rPr lang="en-US" sz="2200" dirty="0">
+                  <a:latin typeface="Helvetica" pitchFamily="2" charset="0"/>
+                </a:rPr>
+                <a:t>        Without norm          With normalization     Norm + Early stopping</a:t>
+              </a:r>
+            </a:p>
+          </p:txBody>
+        </p:sp>
+      </p:grpSp>
+      <p:sp>
+        <p:nvSpPr>
+          <p:cNvPr id="62" name="TextBox 61">
+            <a:extLst>
+              <a:ext uri="{FF2B5EF4-FFF2-40B4-BE49-F238E27FC236}">
+                <a16:creationId xmlns:a16="http://schemas.microsoft.com/office/drawing/2014/main" id="{DE09C6A8-0A93-424A-9648-7C59BF263DA9}"/>
               </a:ext>
             </a:extLst>
           </p:cNvPr>
@@ -8408,8 +8604,8 @@
         </p:nvSpPr>
         <p:spPr>
           <a:xfrm>
-            <a:off x="19415369" y="7739631"/>
-            <a:ext cx="7605359" cy="646331"/>
+            <a:off x="18035567" y="3839812"/>
+            <a:ext cx="8878757" cy="400110"/>
           </a:xfrm>
           <a:prstGeom prst="rect">
             <a:avLst/>
@@ -8422,17 +8618,135 @@
           </a:bodyPr>
           <a:lstStyle/>
           <a:p>
-            <a:r>
-              <a:rPr lang="en-US" sz="3600" dirty="0" err="1"/>
-              <a:t>Avoy</a:t>
-            </a:r>
-            <a:r>
-              <a:rPr lang="en-US" sz="3600" dirty="0"/>
-              <a:t> – fill in here </a:t>
-            </a:r>
-          </a:p>
-        </p:txBody>
-      </p:sp>
+            <a:pPr marL="342900" indent="-342900">
+              <a:buFont typeface="Arial" panose="020B0604020202020204" pitchFamily="34" charset="0"/>
+              <a:buChar char="•"/>
+            </a:pPr>
+            <a:r>
+              <a:rPr lang="en-US" sz="2000" dirty="0">
+                <a:latin typeface="Helvetica" pitchFamily="2" charset="0"/>
+              </a:rPr>
+              <a:t>Used normalization and early stopping to prevent overfitting. </a:t>
+            </a:r>
+          </a:p>
+        </p:txBody>
+      </p:sp>
+      <p:pic>
+        <p:nvPicPr>
+          <p:cNvPr id="20" name="Picture 19">
+            <a:extLst>
+              <a:ext uri="{FF2B5EF4-FFF2-40B4-BE49-F238E27FC236}">
+                <a16:creationId xmlns:a16="http://schemas.microsoft.com/office/drawing/2014/main" id="{214134BF-6497-2A47-81B1-0E920038EF19}"/>
+              </a:ext>
+            </a:extLst>
+          </p:cNvPr>
+          <p:cNvPicPr>
+            <a:picLocks noChangeAspect="1"/>
+          </p:cNvPicPr>
+          <p:nvPr/>
+        </p:nvPicPr>
+        <p:blipFill>
+          <a:blip r:embed="rId7"/>
+          <a:stretch>
+            <a:fillRect/>
+          </a:stretch>
+        </p:blipFill>
+        <p:spPr>
+          <a:xfrm>
+            <a:off x="1351347" y="14533098"/>
+            <a:ext cx="6268348" cy="3219911"/>
+          </a:xfrm>
+          <a:prstGeom prst="rect">
+            <a:avLst/>
+          </a:prstGeom>
+        </p:spPr>
+      </p:pic>
+      <p:grpSp>
+        <p:nvGrpSpPr>
+          <p:cNvPr id="29" name="Group 28">
+            <a:extLst>
+              <a:ext uri="{FF2B5EF4-FFF2-40B4-BE49-F238E27FC236}">
+                <a16:creationId xmlns:a16="http://schemas.microsoft.com/office/drawing/2014/main" id="{DCE0CBFE-F4A9-A547-B5BC-6A329C24310B}"/>
+              </a:ext>
+            </a:extLst>
+          </p:cNvPr>
+          <p:cNvGrpSpPr/>
+          <p:nvPr/>
+        </p:nvGrpSpPr>
+        <p:grpSpPr>
+          <a:xfrm>
+            <a:off x="18042860" y="7035072"/>
+            <a:ext cx="5350540" cy="4076109"/>
+            <a:chOff x="18192123" y="7417251"/>
+            <a:chExt cx="5316286" cy="4254363"/>
+          </a:xfrm>
+        </p:grpSpPr>
+        <p:pic>
+          <p:nvPicPr>
+            <p:cNvPr id="24" name="Picture 23">
+              <a:extLst>
+                <a:ext uri="{FF2B5EF4-FFF2-40B4-BE49-F238E27FC236}">
+                  <a16:creationId xmlns:a16="http://schemas.microsoft.com/office/drawing/2014/main" id="{03D2B28E-312F-8C4D-9D58-BA29F27963B2}"/>
+                </a:ext>
+              </a:extLst>
+            </p:cNvPr>
+            <p:cNvPicPr>
+              <a:picLocks noChangeAspect="1"/>
+            </p:cNvPicPr>
+            <p:nvPr/>
+          </p:nvPicPr>
+          <p:blipFill>
+            <a:blip r:embed="rId8"/>
+            <a:stretch>
+              <a:fillRect/>
+            </a:stretch>
+          </p:blipFill>
+          <p:spPr>
+            <a:xfrm>
+              <a:off x="18192123" y="7417251"/>
+              <a:ext cx="5201278" cy="3804899"/>
+            </a:xfrm>
+            <a:prstGeom prst="rect">
+              <a:avLst/>
+            </a:prstGeom>
+          </p:spPr>
+        </p:pic>
+        <p:sp>
+          <p:nvSpPr>
+            <p:cNvPr id="28" name="TextBox 27">
+              <a:extLst>
+                <a:ext uri="{FF2B5EF4-FFF2-40B4-BE49-F238E27FC236}">
+                  <a16:creationId xmlns:a16="http://schemas.microsoft.com/office/drawing/2014/main" id="{E33C9CF2-DF6F-3041-A666-1289D6A5092C}"/>
+                </a:ext>
+              </a:extLst>
+            </p:cNvPr>
+            <p:cNvSpPr txBox="1"/>
+            <p:nvPr/>
+          </p:nvSpPr>
+          <p:spPr>
+            <a:xfrm>
+              <a:off x="18326807" y="11240727"/>
+              <a:ext cx="5181602" cy="430887"/>
+            </a:xfrm>
+            <a:prstGeom prst="rect">
+              <a:avLst/>
+            </a:prstGeom>
+            <a:noFill/>
+          </p:spPr>
+          <p:txBody>
+            <a:bodyPr wrap="square" rtlCol="0">
+              <a:spAutoFit/>
+            </a:bodyPr>
+            <a:lstStyle/>
+            <a:p>
+              <a:r>
+                <a:rPr lang="en-US" sz="2200" dirty="0"/>
+                <a:t>Univariate LSTM predicts load influx spikes.</a:t>
+              </a:r>
+            </a:p>
+          </p:txBody>
+        </p:sp>
+      </p:grpSp>
     </p:spTree>
     <p:extLst>
       <p:ext uri="{BB962C8B-B14F-4D97-AF65-F5344CB8AC3E}">

</xml_diff>

<commit_message>
Fixed dataset (sorry avoy)
</commit_message>
<xml_diff>
--- a/221POSTER.pptx
+++ b/221POSTER.pptx
@@ -4235,7 +4235,21 @@
                 <a:latin typeface="Helvetica" pitchFamily="2" charset="0"/>
                 <a:cs typeface="Arial"/>
               </a:rPr>
-              <a:t>Table 1: Statistics for sample of classes (4/8 shown)</a:t>
+              <a:t>Table 1: Statistics for sample of classes </a:t>
+            </a:r>
+            <a:r>
+              <a:rPr lang="en-US" sz="2000" b="1">
+                <a:latin typeface="Helvetica" pitchFamily="2" charset="0"/>
+                <a:cs typeface="Arial"/>
+              </a:rPr>
+              <a:t>(4/10 </a:t>
+            </a:r>
+            <a:r>
+              <a:rPr lang="en-US" sz="2000" b="1" dirty="0">
+                <a:latin typeface="Helvetica" pitchFamily="2" charset="0"/>
+                <a:cs typeface="Arial"/>
+              </a:rPr>
+              <a:t>shown)</a:t>
             </a:r>
           </a:p>
         </p:txBody>
@@ -8368,10 +8382,9 @@
                     <a:p>
                       <a:pPr algn="ctr"/>
                       <a:r>
-                        <a:rPr lang="en-US" sz="2200"/>
+                        <a:rPr lang="en-US" sz="2200" dirty="0"/>
                         <a:t>137</a:t>
                       </a:r>
-                      <a:endParaRPr lang="en-US" sz="2200" dirty="0"/>
                     </a:p>
                   </a:txBody>
                   <a:tcPr/>

</xml_diff>

<commit_message>
Updated scheduler and poster
</commit_message>
<xml_diff>
--- a/221POSTER.pptx
+++ b/221POSTER.pptx
@@ -223,7 +223,7 @@
           <a:p>
             <a:fld id="{63953FA1-9968-F149-B3D8-ED72A059E6DF}" type="datetimeFigureOut">
               <a:rPr lang="en-US" smtClean="0"/>
-              <a:t>12/1/18</a:t>
+              <a:t>12/3/2018</a:t>
             </a:fld>
             <a:endParaRPr lang="en-US"/>
           </a:p>
@@ -758,7 +758,7 @@
           <a:p>
             <a:fld id="{1EF3E760-9FC4-8A49-A6CF-4E1B2370CEBA}" type="datetimeFigureOut">
               <a:rPr lang="en-US" smtClean="0"/>
-              <a:t>12/1/18</a:t>
+              <a:t>12/3/2018</a:t>
             </a:fld>
             <a:endParaRPr lang="en-US"/>
           </a:p>
@@ -926,7 +926,7 @@
           <a:p>
             <a:fld id="{1EF3E760-9FC4-8A49-A6CF-4E1B2370CEBA}" type="datetimeFigureOut">
               <a:rPr lang="en-US" smtClean="0"/>
-              <a:t>12/1/18</a:t>
+              <a:t>12/3/2018</a:t>
             </a:fld>
             <a:endParaRPr lang="en-US"/>
           </a:p>
@@ -1104,7 +1104,7 @@
           <a:p>
             <a:fld id="{1EF3E760-9FC4-8A49-A6CF-4E1B2370CEBA}" type="datetimeFigureOut">
               <a:rPr lang="en-US" smtClean="0"/>
-              <a:t>12/1/18</a:t>
+              <a:t>12/3/2018</a:t>
             </a:fld>
             <a:endParaRPr lang="en-US"/>
           </a:p>
@@ -1272,7 +1272,7 @@
           <a:p>
             <a:fld id="{1EF3E760-9FC4-8A49-A6CF-4E1B2370CEBA}" type="datetimeFigureOut">
               <a:rPr lang="en-US" smtClean="0"/>
-              <a:t>12/1/18</a:t>
+              <a:t>12/3/2018</a:t>
             </a:fld>
             <a:endParaRPr lang="en-US"/>
           </a:p>
@@ -1517,7 +1517,7 @@
           <a:p>
             <a:fld id="{1EF3E760-9FC4-8A49-A6CF-4E1B2370CEBA}" type="datetimeFigureOut">
               <a:rPr lang="en-US" smtClean="0"/>
-              <a:t>12/1/18</a:t>
+              <a:t>12/3/2018</a:t>
             </a:fld>
             <a:endParaRPr lang="en-US"/>
           </a:p>
@@ -1802,7 +1802,7 @@
           <a:p>
             <a:fld id="{1EF3E760-9FC4-8A49-A6CF-4E1B2370CEBA}" type="datetimeFigureOut">
               <a:rPr lang="en-US" smtClean="0"/>
-              <a:t>12/1/18</a:t>
+              <a:t>12/3/2018</a:t>
             </a:fld>
             <a:endParaRPr lang="en-US"/>
           </a:p>
@@ -2226,7 +2226,7 @@
           <a:p>
             <a:fld id="{1EF3E760-9FC4-8A49-A6CF-4E1B2370CEBA}" type="datetimeFigureOut">
               <a:rPr lang="en-US" smtClean="0"/>
-              <a:t>12/1/18</a:t>
+              <a:t>12/3/2018</a:t>
             </a:fld>
             <a:endParaRPr lang="en-US"/>
           </a:p>
@@ -2343,7 +2343,7 @@
           <a:p>
             <a:fld id="{1EF3E760-9FC4-8A49-A6CF-4E1B2370CEBA}" type="datetimeFigureOut">
               <a:rPr lang="en-US" smtClean="0"/>
-              <a:t>12/1/18</a:t>
+              <a:t>12/3/2018</a:t>
             </a:fld>
             <a:endParaRPr lang="en-US"/>
           </a:p>
@@ -2438,7 +2438,7 @@
           <a:p>
             <a:fld id="{1EF3E760-9FC4-8A49-A6CF-4E1B2370CEBA}" type="datetimeFigureOut">
               <a:rPr lang="en-US" smtClean="0"/>
-              <a:t>12/1/18</a:t>
+              <a:t>12/3/2018</a:t>
             </a:fld>
             <a:endParaRPr lang="en-US"/>
           </a:p>
@@ -2713,7 +2713,7 @@
           <a:p>
             <a:fld id="{1EF3E760-9FC4-8A49-A6CF-4E1B2370CEBA}" type="datetimeFigureOut">
               <a:rPr lang="en-US" smtClean="0"/>
-              <a:t>12/1/18</a:t>
+              <a:t>12/3/2018</a:t>
             </a:fld>
             <a:endParaRPr lang="en-US"/>
           </a:p>
@@ -2965,7 +2965,7 @@
           <a:p>
             <a:fld id="{1EF3E760-9FC4-8A49-A6CF-4E1B2370CEBA}" type="datetimeFigureOut">
               <a:rPr lang="en-US" smtClean="0"/>
-              <a:t>12/1/18</a:t>
+              <a:t>12/3/2018</a:t>
             </a:fld>
             <a:endParaRPr lang="en-US"/>
           </a:p>
@@ -3176,7 +3176,7 @@
           <a:p>
             <a:fld id="{1EF3E760-9FC4-8A49-A6CF-4E1B2370CEBA}" type="datetimeFigureOut">
               <a:rPr lang="en-US" smtClean="0"/>
-              <a:t>12/1/18</a:t>
+              <a:t>12/3/2018</a:t>
             </a:fld>
             <a:endParaRPr lang="en-US"/>
           </a:p>
@@ -3567,8 +3567,8 @@
         </p:nvSpPr>
         <p:spPr>
           <a:xfrm>
-            <a:off x="567401" y="3232386"/>
-            <a:ext cx="7816992" cy="5755271"/>
+            <a:off x="567401" y="3232387"/>
+            <a:ext cx="7816992" cy="5399840"/>
           </a:xfrm>
           <a:prstGeom prst="rect">
             <a:avLst/>
@@ -3614,8 +3614,8 @@
         </p:nvSpPr>
         <p:spPr bwMode="auto">
           <a:xfrm>
-            <a:off x="567400" y="3141215"/>
-            <a:ext cx="7826824" cy="668785"/>
+            <a:off x="533399" y="3039097"/>
+            <a:ext cx="7875289" cy="770902"/>
           </a:xfrm>
           <a:prstGeom prst="rect">
             <a:avLst/>
@@ -3634,11 +3634,11 @@
           <a:p>
             <a:pPr algn="ctr"/>
             <a:r>
-              <a:rPr lang="en-US" sz="2280" b="1" dirty="0">
+              <a:rPr lang="en-US" sz="2800" b="1" dirty="0">
                 <a:solidFill>
                   <a:schemeClr val="bg1"/>
                 </a:solidFill>
-                <a:latin typeface="Arial"/>
+                <a:latin typeface="Helvetica" pitchFamily="2" charset="0"/>
                 <a:cs typeface="Arial"/>
               </a:rPr>
               <a:t>Introduction</a:t>
@@ -3686,7 +3686,7 @@
         </p:nvSpPr>
         <p:spPr bwMode="auto">
           <a:xfrm>
-            <a:off x="17983200" y="12514849"/>
+            <a:off x="18020346" y="13780449"/>
             <a:ext cx="8984960" cy="672459"/>
           </a:xfrm>
           <a:prstGeom prst="rect">
@@ -3706,11 +3706,11 @@
           <a:p>
             <a:pPr algn="ctr"/>
             <a:r>
-              <a:rPr lang="en-US" sz="2280" b="1" dirty="0">
+              <a:rPr lang="en-US" sz="2800" b="1" dirty="0">
                 <a:solidFill>
                   <a:schemeClr val="bg1"/>
                 </a:solidFill>
-                <a:latin typeface="Arial"/>
+                <a:latin typeface="Helvetica" pitchFamily="2" charset="0"/>
                 <a:cs typeface="Arial"/>
               </a:rPr>
               <a:t>Summary</a:t>
@@ -3726,8 +3726,8 @@
         </p:nvSpPr>
         <p:spPr>
           <a:xfrm>
-            <a:off x="17983200" y="12514849"/>
-            <a:ext cx="8984960" cy="4820939"/>
+            <a:off x="17983200" y="13932903"/>
+            <a:ext cx="8984960" cy="3981350"/>
           </a:xfrm>
           <a:prstGeom prst="rect">
             <a:avLst/>
@@ -3771,8 +3771,8 @@
         </p:nvSpPr>
         <p:spPr>
           <a:xfrm>
-            <a:off x="567399" y="3810000"/>
-            <a:ext cx="7662202" cy="7238999"/>
+            <a:off x="592563" y="3845267"/>
+            <a:ext cx="7662202" cy="6808179"/>
           </a:xfrm>
           <a:prstGeom prst="rect">
             <a:avLst/>
@@ -3789,85 +3789,194 @@
               <a:buChar char="•"/>
             </a:pPr>
             <a:r>
-              <a:rPr lang="en-US" sz="2000" dirty="0"/>
-              <a:t>Office hours are integral to most students’ experiences at Stanford classes. Unfortunately, office hours are often crowded and have long wait times.</a:t>
-            </a:r>
-          </a:p>
-          <a:p>
-            <a:endParaRPr lang="en-US" sz="2000" dirty="0"/>
+              <a:rPr lang="en-US" sz="2000" dirty="0">
+                <a:latin typeface="Helvetica" pitchFamily="2" charset="0"/>
+              </a:rPr>
+              <a:t>OHs often suffer from </a:t>
+            </a:r>
+            <a:r>
+              <a:rPr lang="en-US" sz="2000" b="1" dirty="0">
+                <a:latin typeface="Helvetica" pitchFamily="2" charset="0"/>
+              </a:rPr>
+              <a:t>overcrowding and long wait times</a:t>
+            </a:r>
+            <a:r>
+              <a:rPr lang="en-US" sz="2000" dirty="0">
+                <a:latin typeface="Helvetica" pitchFamily="2" charset="0"/>
+              </a:rPr>
+              <a:t>, stressing both students and instructors. </a:t>
+            </a:r>
           </a:p>
           <a:p>
             <a:pPr marL="326579" indent="-326579">
               <a:buFont typeface="Arial" panose="020B0604020202020204" pitchFamily="34" charset="0"/>
               <a:buChar char="•"/>
             </a:pPr>
-            <a:r>
-              <a:rPr lang="en-US" sz="2000" dirty="0"/>
-              <a:t>Currently, TA assignments are somewhat arbitrary for many classes. </a:t>
-            </a:r>
+            <a:endParaRPr lang="en-US" sz="2000" dirty="0">
+              <a:latin typeface="Helvetica" pitchFamily="2" charset="0"/>
+            </a:endParaRPr>
           </a:p>
           <a:p>
             <a:pPr marL="326579" indent="-326579">
               <a:buFont typeface="Arial" panose="020B0604020202020204" pitchFamily="34" charset="0"/>
               <a:buChar char="•"/>
             </a:pPr>
-            <a:endParaRPr lang="en-US" sz="2000" dirty="0"/>
+            <a:r>
+              <a:rPr lang="en-US" sz="2000" dirty="0">
+                <a:latin typeface="Helvetica" pitchFamily="2" charset="0"/>
+              </a:rPr>
+              <a:t>If we could accurately predict the expected workload at a given OH, TAs can be better allocated. </a:t>
+            </a:r>
           </a:p>
           <a:p>
             <a:pPr marL="326579" indent="-326579">
               <a:buFont typeface="Arial" panose="020B0604020202020204" pitchFamily="34" charset="0"/>
               <a:buChar char="•"/>
             </a:pPr>
-            <a:r>
-              <a:rPr lang="en-US" sz="2000" dirty="0"/>
-              <a:t>If we could accurately predict how much workload is expected at office hours at any given time for a given class, TAs can be better allocated according to student need (under the same constraints) . </a:t>
-            </a:r>
+            <a:endParaRPr lang="en-US" sz="2000" dirty="0">
+              <a:latin typeface="Helvetica" pitchFamily="2" charset="0"/>
+            </a:endParaRPr>
           </a:p>
           <a:p>
             <a:pPr marL="326579" indent="-326579">
               <a:buFont typeface="Arial" panose="020B0604020202020204" pitchFamily="34" charset="0"/>
               <a:buChar char="•"/>
             </a:pPr>
-            <a:endParaRPr lang="en-US" sz="2000" dirty="0"/>
+            <a:r>
+              <a:rPr lang="en-US" sz="2000" dirty="0" err="1">
+                <a:latin typeface="Helvetica" pitchFamily="2" charset="0"/>
+              </a:rPr>
+              <a:t>QueueStatus</a:t>
+            </a:r>
+            <a:r>
+              <a:rPr lang="en-US" sz="2000" dirty="0">
+                <a:latin typeface="Helvetica" pitchFamily="2" charset="0"/>
+              </a:rPr>
+              <a:t>, Carta, and course syllabi provide a wealth of information that can be used. </a:t>
+            </a:r>
           </a:p>
           <a:p>
             <a:pPr marL="326579" indent="-326579">
               <a:buFont typeface="Arial" panose="020B0604020202020204" pitchFamily="34" charset="0"/>
               <a:buChar char="•"/>
             </a:pPr>
-            <a:r>
-              <a:rPr lang="en-US" sz="2000" dirty="0"/>
-              <a:t>With a better allocation process, TAs can be more evenly matched to student demand, allowing for a less stressful experience for both students and </a:t>
-            </a:r>
-            <a:r>
-              <a:rPr lang="en-US" sz="2000" dirty="0" err="1"/>
-              <a:t>TAs.</a:t>
-            </a:r>
-            <a:endParaRPr lang="en-US" sz="2000" dirty="0"/>
+            <a:endParaRPr lang="en-US" sz="2000" dirty="0">
+              <a:latin typeface="Helvetica" pitchFamily="2" charset="0"/>
+            </a:endParaRPr>
           </a:p>
           <a:p>
             <a:pPr marL="326579" indent="-326579">
               <a:buFont typeface="Arial" panose="020B0604020202020204" pitchFamily="34" charset="0"/>
               <a:buChar char="•"/>
             </a:pPr>
-            <a:endParaRPr lang="en-US" sz="2000" dirty="0"/>
+            <a:r>
+              <a:rPr lang="en-US" sz="2000" dirty="0">
+                <a:latin typeface="Helvetica" pitchFamily="2" charset="0"/>
+              </a:rPr>
+              <a:t>We trained a </a:t>
+            </a:r>
+            <a:r>
+              <a:rPr lang="en-US" sz="2000" b="1" dirty="0">
+                <a:latin typeface="Helvetica" pitchFamily="2" charset="0"/>
+              </a:rPr>
+              <a:t>neural network model that predicts student load influx</a:t>
+            </a:r>
+            <a:r>
+              <a:rPr lang="en-US" sz="2000" dirty="0">
+                <a:latin typeface="Helvetica" pitchFamily="2" charset="0"/>
+              </a:rPr>
+              <a:t> </a:t>
+            </a:r>
+            <a:r>
+              <a:rPr lang="en-US" sz="2000" b="1" dirty="0">
+                <a:latin typeface="Helvetica" pitchFamily="2" charset="0"/>
+              </a:rPr>
+              <a:t>(expected serve time * # sign-ups) </a:t>
+            </a:r>
+            <a:r>
+              <a:rPr lang="en-US" sz="2000" dirty="0">
+                <a:latin typeface="Helvetica" pitchFamily="2" charset="0"/>
+              </a:rPr>
+              <a:t>at OH on an hourly basis, for any course.</a:t>
+            </a:r>
           </a:p>
           <a:p>
             <a:pPr marL="326579" indent="-326579">
               <a:buFont typeface="Arial" panose="020B0604020202020204" pitchFamily="34" charset="0"/>
               <a:buChar char="•"/>
             </a:pPr>
-            <a:r>
-              <a:rPr lang="en-US" sz="2000" dirty="0"/>
-              <a:t>Note: this is a shared project between CS221 and CS229. In CS221, we focus on TA schedule optimization.</a:t>
-            </a:r>
+            <a:endParaRPr lang="en-US" sz="2000" dirty="0">
+              <a:latin typeface="Helvetica" pitchFamily="2" charset="0"/>
+            </a:endParaRPr>
           </a:p>
           <a:p>
             <a:pPr marL="326579" indent="-326579">
               <a:buFont typeface="Arial" panose="020B0604020202020204" pitchFamily="34" charset="0"/>
               <a:buChar char="•"/>
             </a:pPr>
-            <a:endParaRPr lang="en-US" sz="2000" dirty="0"/>
+            <a:r>
+              <a:rPr lang="en-US" sz="2000" dirty="0">
+                <a:latin typeface="Helvetica" pitchFamily="2" charset="0"/>
+              </a:rPr>
+              <a:t>With these predictions, we now </a:t>
+            </a:r>
+            <a:r>
+              <a:rPr lang="en-US" sz="2000" b="1" dirty="0">
+                <a:latin typeface="Helvetica" pitchFamily="2" charset="0"/>
+              </a:rPr>
+              <a:t>optimize</a:t>
+            </a:r>
+            <a:r>
+              <a:rPr lang="en-US" sz="2000" dirty="0">
+                <a:latin typeface="Helvetica" pitchFamily="2" charset="0"/>
+              </a:rPr>
+              <a:t> </a:t>
+            </a:r>
+            <a:r>
+              <a:rPr lang="en-US" sz="2000" b="1" dirty="0">
+                <a:latin typeface="Helvetica" pitchFamily="2" charset="0"/>
+              </a:rPr>
+              <a:t>TA scheduling </a:t>
+            </a:r>
+            <a:r>
+              <a:rPr lang="en-US" sz="2000" dirty="0">
+                <a:latin typeface="Helvetica" pitchFamily="2" charset="0"/>
+              </a:rPr>
+              <a:t>given </a:t>
+            </a:r>
+            <a:r>
+              <a:rPr lang="en-US" sz="2000" b="1" dirty="0">
+                <a:latin typeface="Helvetica" pitchFamily="2" charset="0"/>
+              </a:rPr>
+              <a:t>realistic</a:t>
+            </a:r>
+            <a:r>
+              <a:rPr lang="en-US" sz="2000" dirty="0">
+                <a:latin typeface="Helvetica" pitchFamily="2" charset="0"/>
+              </a:rPr>
+              <a:t> </a:t>
+            </a:r>
+            <a:r>
+              <a:rPr lang="en-US" sz="2000" b="1" dirty="0">
+                <a:latin typeface="Helvetica" pitchFamily="2" charset="0"/>
+              </a:rPr>
+              <a:t>constraints</a:t>
+            </a:r>
+            <a:r>
+              <a:rPr lang="en-US" sz="2000" dirty="0">
+                <a:latin typeface="Helvetica" pitchFamily="2" charset="0"/>
+              </a:rPr>
+              <a:t>. </a:t>
+            </a:r>
+          </a:p>
+          <a:p>
+            <a:pPr marL="326579" indent="-326579">
+              <a:buFont typeface="Arial" panose="020B0604020202020204" pitchFamily="34" charset="0"/>
+              <a:buChar char="•"/>
+            </a:pPr>
+            <a:endParaRPr lang="en-US" sz="1800" dirty="0">
+              <a:latin typeface="Helvetica" pitchFamily="2" charset="0"/>
+            </a:endParaRPr>
           </a:p>
           <a:p>
             <a:endParaRPr lang="en-US" sz="2000" dirty="0"/>
@@ -3926,7 +4035,7 @@
         </p:nvSpPr>
         <p:spPr bwMode="auto">
           <a:xfrm>
-            <a:off x="567399" y="9248027"/>
+            <a:off x="567399" y="8862207"/>
             <a:ext cx="7826825" cy="723657"/>
           </a:xfrm>
           <a:prstGeom prst="rect">
@@ -3946,14 +4055,14 @@
           <a:p>
             <a:pPr algn="ctr"/>
             <a:r>
-              <a:rPr lang="en-US" sz="2280" b="1" dirty="0">
+              <a:rPr lang="en-US" sz="2800" b="1" dirty="0">
                 <a:solidFill>
                   <a:schemeClr val="bg1"/>
                 </a:solidFill>
-                <a:latin typeface="Arial"/>
+                <a:latin typeface="Helvetica" pitchFamily="2" charset="0"/>
                 <a:cs typeface="Arial"/>
               </a:rPr>
-              <a:t>Features</a:t>
+              <a:t>Class Statistics</a:t>
             </a:r>
           </a:p>
         </p:txBody>
@@ -3966,8 +4075,8 @@
         </p:nvSpPr>
         <p:spPr>
           <a:xfrm>
-            <a:off x="17983200" y="3041238"/>
-            <a:ext cx="8984960" cy="10141362"/>
+            <a:off x="17983200" y="3041237"/>
+            <a:ext cx="8984960" cy="10891667"/>
           </a:xfrm>
           <a:prstGeom prst="rect">
             <a:avLst/>
@@ -4011,8 +4120,8 @@
         </p:nvSpPr>
         <p:spPr>
           <a:xfrm>
-            <a:off x="1423499" y="1497635"/>
-            <a:ext cx="23097393" cy="1051155"/>
+            <a:off x="1938560" y="990600"/>
+            <a:ext cx="23097393" cy="1820596"/>
           </a:xfrm>
           <a:prstGeom prst="rect">
             <a:avLst/>
@@ -4029,7 +4138,7 @@
           <a:p>
             <a:pPr algn="ctr"/>
             <a:endParaRPr lang="en-US" sz="2858" i="1" dirty="0">
-              <a:latin typeface="Arial"/>
+              <a:latin typeface="Garamond" panose="02020404030301010803" pitchFamily="18" charset="0"/>
               <a:ea typeface="Arial" charset="0"/>
               <a:cs typeface="Arial"/>
             </a:endParaRPr>
@@ -4037,39 +4146,58 @@
           <a:p>
             <a:pPr algn="ctr"/>
             <a:r>
-              <a:rPr lang="en-US" sz="3600" i="1" dirty="0" err="1">
-                <a:latin typeface="Arial"/>
+              <a:rPr lang="en-US" sz="4000" dirty="0" err="1">
+                <a:latin typeface="Garamond" panose="02020404030301010803" pitchFamily="18" charset="0"/>
                 <a:ea typeface="Arial" charset="0"/>
                 <a:cs typeface="Arial"/>
               </a:rPr>
               <a:t>Avoy</a:t>
             </a:r>
             <a:r>
-              <a:rPr lang="en-US" sz="3600" i="1" dirty="0">
-                <a:latin typeface="Arial"/>
+              <a:rPr lang="en-US" sz="4000" dirty="0">
+                <a:latin typeface="Garamond" panose="02020404030301010803" pitchFamily="18" charset="0"/>
                 <a:ea typeface="Arial" charset="0"/>
                 <a:cs typeface="Arial"/>
               </a:rPr>
               <a:t> </a:t>
             </a:r>
             <a:r>
-              <a:rPr lang="en-US" sz="3600" i="1" dirty="0" err="1">
-                <a:latin typeface="Arial"/>
+              <a:rPr lang="en-US" sz="4000" dirty="0" err="1">
+                <a:latin typeface="Garamond" panose="02020404030301010803" pitchFamily="18" charset="0"/>
                 <a:ea typeface="Arial" charset="0"/>
                 <a:cs typeface="Arial"/>
               </a:rPr>
               <a:t>Datta</a:t>
             </a:r>
             <a:r>
-              <a:rPr lang="en-US" sz="3600" i="1" dirty="0">
-                <a:latin typeface="Arial"/>
+              <a:rPr lang="en-US" sz="4000" dirty="0">
+                <a:latin typeface="Garamond" panose="02020404030301010803" pitchFamily="18" charset="0"/>
                 <a:ea typeface="Arial" charset="0"/>
                 <a:cs typeface="Arial"/>
               </a:rPr>
               <a:t>, Dian Ang Yap, Zheng Yan</a:t>
             </a:r>
-            <a:endParaRPr lang="en-US" sz="3600" i="1" dirty="0">
-              <a:latin typeface="Arial" charset="0"/>
+          </a:p>
+          <a:p>
+            <a:pPr algn="ctr"/>
+            <a:endParaRPr lang="en-US" sz="1400" i="1" dirty="0">
+              <a:latin typeface="Helvetica" pitchFamily="2" charset="0"/>
+              <a:ea typeface="Arial" charset="0"/>
+              <a:cs typeface="Arial"/>
+            </a:endParaRPr>
+          </a:p>
+          <a:p>
+            <a:pPr algn="ctr"/>
+            <a:r>
+              <a:rPr lang="en-US" sz="3200" dirty="0">
+                <a:latin typeface="Helvetica" pitchFamily="2" charset="0"/>
+                <a:ea typeface="Arial" charset="0"/>
+                <a:cs typeface="Arial"/>
+              </a:rPr>
+              <a:t>Note: This project is shared between CS221 and CS229. For CS221, we focus on TA scheduling.</a:t>
+            </a:r>
+            <a:endParaRPr lang="en-US" sz="3200" dirty="0">
+              <a:latin typeface="Helvetica" pitchFamily="2" charset="0"/>
               <a:ea typeface="Arial" charset="0"/>
               <a:cs typeface="Arial" charset="0"/>
             </a:endParaRPr>
@@ -4084,8 +4212,8 @@
         </p:nvSpPr>
         <p:spPr>
           <a:xfrm>
-            <a:off x="-796502" y="9971684"/>
-            <a:ext cx="6196394" cy="393056"/>
+            <a:off x="1188393" y="9661046"/>
+            <a:ext cx="6700698" cy="417037"/>
           </a:xfrm>
           <a:prstGeom prst="rect">
             <a:avLst/>
@@ -4103,10 +4231,11 @@
               </a:lnSpc>
             </a:pPr>
             <a:r>
-              <a:rPr lang="en-US" sz="1870" dirty="0">
+              <a:rPr lang="en-US" sz="2000" b="1" dirty="0">
+                <a:latin typeface="Helvetica" pitchFamily="2" charset="0"/>
                 <a:cs typeface="Arial"/>
               </a:rPr>
-              <a:t>Table 1: Features</a:t>
+              <a:t>Table 1: Statistics for sample of classes (4/8 shown)</a:t>
             </a:r>
           </a:p>
         </p:txBody>
@@ -4119,8 +4248,8 @@
         </p:nvSpPr>
         <p:spPr>
           <a:xfrm>
-            <a:off x="567399" y="9248026"/>
-            <a:ext cx="7833192" cy="4471827"/>
+            <a:off x="567399" y="8862207"/>
+            <a:ext cx="7833192" cy="2846187"/>
           </a:xfrm>
           <a:prstGeom prst="rect">
             <a:avLst/>
@@ -4164,8 +4293,8 @@
         </p:nvSpPr>
         <p:spPr>
           <a:xfrm>
-            <a:off x="8932153" y="15152295"/>
-            <a:ext cx="8423857" cy="2183494"/>
+            <a:off x="8963152" y="19432205"/>
+            <a:ext cx="8386122" cy="2578858"/>
           </a:xfrm>
           <a:prstGeom prst="rect">
             <a:avLst/>
@@ -4264,8 +4393,8 @@
         </p:nvSpPr>
         <p:spPr bwMode="auto">
           <a:xfrm>
-            <a:off x="8926290" y="14974019"/>
-            <a:ext cx="8413521" cy="674320"/>
+            <a:off x="8894321" y="18765502"/>
+            <a:ext cx="8451256" cy="674320"/>
           </a:xfrm>
           <a:prstGeom prst="rect">
             <a:avLst/>
@@ -4284,11 +4413,11 @@
           <a:p>
             <a:pPr algn="ctr"/>
             <a:r>
-              <a:rPr lang="en-US" sz="2280" b="1" dirty="0">
+              <a:rPr lang="en-US" sz="2800" b="1" dirty="0">
                 <a:solidFill>
                   <a:schemeClr val="bg1"/>
                 </a:solidFill>
-                <a:latin typeface="Arial"/>
+                <a:latin typeface="Helvetica" pitchFamily="2" charset="0"/>
                 <a:cs typeface="Arial"/>
               </a:rPr>
               <a:t>References</a:t>
@@ -4304,8 +4433,8 @@
         </p:nvSpPr>
         <p:spPr>
           <a:xfrm>
-            <a:off x="8948351" y="3086773"/>
-            <a:ext cx="8391462" cy="11619827"/>
+            <a:off x="8948351" y="3086772"/>
+            <a:ext cx="8391462" cy="14820227"/>
           </a:xfrm>
           <a:prstGeom prst="rect">
             <a:avLst/>
@@ -4371,20 +4500,20 @@
           <a:p>
             <a:pPr algn="ctr"/>
             <a:r>
-              <a:rPr lang="en-US" sz="2280" b="1">
+              <a:rPr lang="en-US" sz="2800" b="1">
                 <a:solidFill>
                   <a:schemeClr val="bg1"/>
                 </a:solidFill>
-                <a:latin typeface="Arial"/>
+                <a:latin typeface="Helvetica" pitchFamily="2" charset="0"/>
                 <a:cs typeface="Arial"/>
               </a:rPr>
               <a:t>   Results</a:t>
             </a:r>
-            <a:endParaRPr lang="en-US" sz="2280" b="1" dirty="0">
+            <a:endParaRPr lang="en-US" sz="2800" b="1" dirty="0">
               <a:solidFill>
                 <a:schemeClr val="bg1"/>
               </a:solidFill>
-              <a:latin typeface="Arial"/>
+              <a:latin typeface="Helvetica" pitchFamily="2" charset="0"/>
               <a:cs typeface="Arial"/>
             </a:endParaRPr>
           </a:p>
@@ -4400,8 +4529,8 @@
         </p:nvSpPr>
         <p:spPr bwMode="auto">
           <a:xfrm>
-            <a:off x="8932153" y="8813509"/>
-            <a:ext cx="8386121" cy="863891"/>
+            <a:off x="8969274" y="10659022"/>
+            <a:ext cx="8363557" cy="1347200"/>
           </a:xfrm>
           <a:prstGeom prst="rect">
             <a:avLst/>
@@ -4420,14 +4549,27 @@
           <a:p>
             <a:pPr algn="ctr"/>
             <a:r>
-              <a:rPr lang="en-US" sz="2105" b="1" dirty="0">
+              <a:rPr lang="en-US" sz="2700" b="1" dirty="0">
                 <a:solidFill>
                   <a:schemeClr val="bg1"/>
                 </a:solidFill>
-                <a:latin typeface="Arial"/>
+                <a:latin typeface="Helvetica" pitchFamily="2" charset="0"/>
                 <a:cs typeface="Arial"/>
               </a:rPr>
-              <a:t>Optimizing TA Scheduling Using Predicted Student Load</a:t>
+              <a:t>Optimizing TA Scheduling Using Predicted </a:t>
+            </a:r>
+          </a:p>
+          <a:p>
+            <a:pPr algn="ctr"/>
+            <a:r>
+              <a:rPr lang="en-US" sz="2700" b="1" dirty="0">
+                <a:solidFill>
+                  <a:schemeClr val="bg1"/>
+                </a:solidFill>
+                <a:latin typeface="Helvetica" pitchFamily="2" charset="0"/>
+                <a:cs typeface="Arial"/>
+              </a:rPr>
+              <a:t>Load Influx</a:t>
             </a:r>
           </a:p>
         </p:txBody>
@@ -4540,39 +4682,6 @@
       </p:sp>
       <p:sp>
         <p:nvSpPr>
-          <p:cNvPr id="95" name="Rectangle 94"/>
-          <p:cNvSpPr/>
-          <p:nvPr/>
-        </p:nvSpPr>
-        <p:spPr>
-          <a:xfrm>
-            <a:off x="18233589" y="4670365"/>
-            <a:ext cx="2490942" cy="400110"/>
-          </a:xfrm>
-          <a:prstGeom prst="rect">
-            <a:avLst/>
-          </a:prstGeom>
-        </p:spPr>
-        <p:txBody>
-          <a:bodyPr wrap="square">
-            <a:spAutoFit/>
-          </a:bodyPr>
-          <a:lstStyle/>
-          <a:p>
-            <a:r>
-              <a:rPr lang="en-US" sz="2000" b="1" dirty="0">
-                <a:cs typeface="Arial"/>
-              </a:rPr>
-              <a:t>Figure 1:</a:t>
-            </a:r>
-            <a:endParaRPr lang="en-US" sz="2000" dirty="0">
-              <a:cs typeface="Arial"/>
-            </a:endParaRPr>
-          </a:p>
-        </p:txBody>
-      </p:sp>
-      <p:sp>
-        <p:nvSpPr>
           <p:cNvPr id="9" name="TextBox 8">
             <a:extLst>
               <a:ext uri="{FF2B5EF4-FFF2-40B4-BE49-F238E27FC236}">
@@ -4585,8 +4694,8 @@
         </p:nvSpPr>
         <p:spPr>
           <a:xfrm>
-            <a:off x="3639929" y="551410"/>
-            <a:ext cx="20039006" cy="1107996"/>
+            <a:off x="3639928" y="516226"/>
+            <a:ext cx="20039006" cy="969496"/>
           </a:xfrm>
           <a:prstGeom prst="rect">
             <a:avLst/>
@@ -4601,7 +4710,9 @@
           <a:p>
             <a:pPr algn="ctr"/>
             <a:r>
-              <a:rPr lang="en-US" sz="6600" b="1" dirty="0"/>
+              <a:rPr lang="en-US" sz="5700" b="1" dirty="0">
+                <a:latin typeface="Garamond" panose="02020404030301010803" pitchFamily="18" charset="0"/>
+              </a:rPr>
               <a:t>Deep Queue-Learning: A Quest to Optimize Office Hours</a:t>
             </a:r>
           </a:p>
@@ -4628,7 +4739,7 @@
         </p:blipFill>
         <p:spPr>
           <a:xfrm>
-            <a:off x="315127" y="15826"/>
+            <a:off x="522635" y="18388"/>
             <a:ext cx="2831850" cy="2925191"/>
           </a:xfrm>
           <a:prstGeom prst="rect">
@@ -4652,7 +4763,7 @@
         </p:nvSpPr>
         <p:spPr bwMode="auto">
           <a:xfrm>
-            <a:off x="8948351" y="5806790"/>
+            <a:off x="8957813" y="6603816"/>
             <a:ext cx="8391461" cy="943074"/>
           </a:xfrm>
           <a:prstGeom prst="rect">
@@ -4672,14 +4783,14 @@
           <a:p>
             <a:pPr algn="ctr"/>
             <a:r>
-              <a:rPr lang="en-US" sz="2105" b="1" dirty="0">
+              <a:rPr lang="en-US" sz="2800" b="1" dirty="0">
                 <a:solidFill>
                   <a:schemeClr val="bg1"/>
                 </a:solidFill>
-                <a:latin typeface="Arial"/>
+                <a:latin typeface="Helvetica" pitchFamily="2" charset="0"/>
                 <a:cs typeface="Arial"/>
               </a:rPr>
-              <a:t>Learning Student Load Influx For Classes </a:t>
+              <a:t>Predicting Student Load Influx</a:t>
             </a:r>
           </a:p>
         </p:txBody>
@@ -4698,8 +4809,8 @@
         </p:nvSpPr>
         <p:spPr>
           <a:xfrm>
-            <a:off x="567398" y="14112909"/>
-            <a:ext cx="7833193" cy="3282498"/>
+            <a:off x="567398" y="12620612"/>
+            <a:ext cx="7833193" cy="5286388"/>
           </a:xfrm>
           <a:prstGeom prst="rect">
             <a:avLst/>
@@ -4826,7 +4937,7 @@
         </p:nvSpPr>
         <p:spPr>
           <a:xfrm>
-            <a:off x="9027781" y="15252975"/>
+            <a:off x="9017348" y="19073831"/>
             <a:ext cx="7369808" cy="2478179"/>
           </a:xfrm>
           <a:prstGeom prst="rect">
@@ -5244,41 +5355,6 @@
       </p:sp>
       <p:sp>
         <p:nvSpPr>
-          <p:cNvPr id="70" name="TextBox 69">
-            <a:extLst>
-              <a:ext uri="{FF2B5EF4-FFF2-40B4-BE49-F238E27FC236}">
-                <a16:creationId xmlns:a16="http://schemas.microsoft.com/office/drawing/2014/main" id="{9041D8EB-8AFD-6F41-9AEF-4A0940687680}"/>
-              </a:ext>
-            </a:extLst>
-          </p:cNvPr>
-          <p:cNvSpPr txBox="1"/>
-          <p:nvPr/>
-        </p:nvSpPr>
-        <p:spPr>
-          <a:xfrm>
-            <a:off x="18237457" y="4060987"/>
-            <a:ext cx="1635324" cy="400110"/>
-          </a:xfrm>
-          <a:prstGeom prst="rect">
-            <a:avLst/>
-          </a:prstGeom>
-          <a:noFill/>
-        </p:spPr>
-        <p:txBody>
-          <a:bodyPr wrap="square" rtlCol="0">
-            <a:spAutoFit/>
-          </a:bodyPr>
-          <a:lstStyle/>
-          <a:p>
-            <a:r>
-              <a:rPr lang="en-US" sz="2000" dirty="0"/>
-              <a:t>A:</a:t>
-            </a:r>
-          </a:p>
-        </p:txBody>
-      </p:sp>
-      <p:sp>
-        <p:nvSpPr>
           <p:cNvPr id="37" name="Rectangle 12">
             <a:extLst>
               <a:ext uri="{FF2B5EF4-FFF2-40B4-BE49-F238E27FC236}">
@@ -5356,7 +5432,7 @@
         </p:nvSpPr>
         <p:spPr bwMode="auto">
           <a:xfrm>
-            <a:off x="8932153" y="3048000"/>
+            <a:off x="8954718" y="3102799"/>
             <a:ext cx="8423857" cy="762000"/>
           </a:xfrm>
           <a:prstGeom prst="rect">
@@ -5376,11 +5452,11 @@
           <a:p>
             <a:pPr algn="ctr"/>
             <a:r>
-              <a:rPr lang="en-US" sz="2280" b="1" dirty="0">
+              <a:rPr lang="en-US" sz="2800" b="1" dirty="0">
                 <a:solidFill>
                   <a:schemeClr val="bg1"/>
                 </a:solidFill>
-                <a:latin typeface="Arial"/>
+                <a:latin typeface="Helvetica" pitchFamily="2" charset="0"/>
                 <a:cs typeface="Arial"/>
               </a:rPr>
               <a:t>Methodology</a:t>
@@ -5388,12 +5464,3615 @@
           </a:p>
         </p:txBody>
       </p:sp>
+      <p:sp>
+        <p:nvSpPr>
+          <p:cNvPr id="38" name="Rectangle 37">
+            <a:extLst>
+              <a:ext uri="{FF2B5EF4-FFF2-40B4-BE49-F238E27FC236}">
+                <a16:creationId xmlns:a16="http://schemas.microsoft.com/office/drawing/2014/main" id="{EE7B1EAE-E581-FB4C-9DEA-A64A58CFBDF4}"/>
+              </a:ext>
+            </a:extLst>
+          </p:cNvPr>
+          <p:cNvSpPr>
+            <a:spLocks noChangeArrowheads="1"/>
+          </p:cNvSpPr>
+          <p:nvPr/>
+        </p:nvSpPr>
+        <p:spPr bwMode="auto">
+          <a:xfrm>
+            <a:off x="547724" y="11896955"/>
+            <a:ext cx="7826825" cy="723657"/>
+          </a:xfrm>
+          <a:prstGeom prst="rect">
+            <a:avLst/>
+          </a:prstGeom>
+          <a:solidFill>
+            <a:srgbClr val="8B1336"/>
+          </a:solidFill>
+          <a:ln>
+            <a:noFill/>
+          </a:ln>
+          <a:extLst/>
+        </p:spPr>
+        <p:txBody>
+          <a:bodyPr lIns="56802" tIns="28401" rIns="56802" bIns="28401" anchor="ctr" anchorCtr="0"/>
+          <a:lstStyle/>
+          <a:p>
+            <a:pPr algn="ctr"/>
+            <a:r>
+              <a:rPr lang="en-US" sz="2800" b="1" dirty="0">
+                <a:solidFill>
+                  <a:schemeClr val="bg1"/>
+                </a:solidFill>
+                <a:latin typeface="Helvetica" pitchFamily="2" charset="0"/>
+                <a:cs typeface="Arial"/>
+              </a:rPr>
+              <a:t>Features and Preliminary Statistics</a:t>
+            </a:r>
+          </a:p>
+        </p:txBody>
+      </p:sp>
+      <p:sp>
+        <p:nvSpPr>
+          <p:cNvPr id="39" name="Rectangle 38">
+            <a:extLst>
+              <a:ext uri="{FF2B5EF4-FFF2-40B4-BE49-F238E27FC236}">
+                <a16:creationId xmlns:a16="http://schemas.microsoft.com/office/drawing/2014/main" id="{6C49F12A-4F0A-8C47-B281-8462E5DBB74A}"/>
+              </a:ext>
+            </a:extLst>
+          </p:cNvPr>
+          <p:cNvSpPr/>
+          <p:nvPr/>
+        </p:nvSpPr>
+        <p:spPr>
+          <a:xfrm>
+            <a:off x="653548" y="12762511"/>
+            <a:ext cx="7770728" cy="3238644"/>
+          </a:xfrm>
+          <a:prstGeom prst="rect">
+            <a:avLst/>
+          </a:prstGeom>
+        </p:spPr>
+        <p:txBody>
+          <a:bodyPr wrap="square">
+            <a:spAutoFit/>
+          </a:bodyPr>
+          <a:lstStyle/>
+          <a:p>
+            <a:pPr marL="342900" indent="-342900">
+              <a:lnSpc>
+                <a:spcPct val="110000"/>
+              </a:lnSpc>
+              <a:buFont typeface="Arial" panose="020B0604020202020204" pitchFamily="34" charset="0"/>
+              <a:buChar char="•"/>
+            </a:pPr>
+            <a:r>
+              <a:rPr lang="en-US" sz="2000" dirty="0">
+                <a:latin typeface="Helvetica" pitchFamily="2" charset="0"/>
+                <a:cs typeface="Arial"/>
+              </a:rPr>
+              <a:t>Load influx is significantly and positively correlated with: </a:t>
+            </a:r>
+          </a:p>
+          <a:p>
+            <a:pPr>
+              <a:lnSpc>
+                <a:spcPct val="110000"/>
+              </a:lnSpc>
+            </a:pPr>
+            <a:r>
+              <a:rPr lang="en-US" sz="2000" b="1" dirty="0">
+                <a:latin typeface="Helvetica" pitchFamily="2" charset="0"/>
+                <a:cs typeface="Arial"/>
+              </a:rPr>
+              <a:t>     Week number </a:t>
+            </a:r>
+            <a:r>
+              <a:rPr lang="en-US" sz="2000" dirty="0">
+                <a:latin typeface="Helvetica" pitchFamily="2" charset="0"/>
+                <a:cs typeface="Arial"/>
+              </a:rPr>
+              <a:t>(r = 0.07)  and </a:t>
+            </a:r>
+            <a:r>
+              <a:rPr lang="en-US" sz="2000" b="1" dirty="0">
+                <a:latin typeface="Helvetica" pitchFamily="2" charset="0"/>
+                <a:cs typeface="Arial"/>
+              </a:rPr>
+              <a:t>Number of servers </a:t>
+            </a:r>
+            <a:r>
+              <a:rPr lang="en-US" sz="2000" dirty="0">
+                <a:latin typeface="Helvetica" pitchFamily="2" charset="0"/>
+                <a:cs typeface="Arial"/>
+              </a:rPr>
+              <a:t>(r = 0.32)</a:t>
+            </a:r>
+          </a:p>
+          <a:p>
+            <a:pPr marL="342900" indent="-342900">
+              <a:lnSpc>
+                <a:spcPct val="110000"/>
+              </a:lnSpc>
+              <a:buFont typeface="Arial" panose="020B0604020202020204" pitchFamily="34" charset="0"/>
+              <a:buChar char="•"/>
+            </a:pPr>
+            <a:r>
+              <a:rPr lang="en-US" sz="2000" dirty="0">
+                <a:latin typeface="Helvetica" pitchFamily="2" charset="0"/>
+                <a:cs typeface="Arial"/>
+              </a:rPr>
+              <a:t>Negatively correlated with: </a:t>
+            </a:r>
+            <a:br>
+              <a:rPr lang="en-US" sz="2000" dirty="0">
+                <a:latin typeface="Helvetica" pitchFamily="2" charset="0"/>
+                <a:cs typeface="Arial"/>
+              </a:rPr>
+            </a:br>
+            <a:r>
+              <a:rPr lang="en-US" sz="2000" b="1" dirty="0">
+                <a:latin typeface="Helvetica" pitchFamily="2" charset="0"/>
+                <a:cs typeface="Arial"/>
+              </a:rPr>
+              <a:t>Days until assignment due </a:t>
+            </a:r>
+            <a:r>
+              <a:rPr lang="en-US" sz="2000" dirty="0">
+                <a:latin typeface="Helvetica" pitchFamily="2" charset="0"/>
+                <a:cs typeface="Arial"/>
+              </a:rPr>
+              <a:t>(r= -0.08),  </a:t>
+            </a:r>
+            <a:r>
+              <a:rPr lang="en-US" sz="2000" b="1" dirty="0">
+                <a:latin typeface="Helvetica" pitchFamily="2" charset="0"/>
+                <a:cs typeface="Arial"/>
+              </a:rPr>
+              <a:t>Hour of day </a:t>
+            </a:r>
+            <a:r>
+              <a:rPr lang="en-US" sz="2000" dirty="0">
+                <a:latin typeface="Helvetica" pitchFamily="2" charset="0"/>
+                <a:cs typeface="Arial"/>
+              </a:rPr>
+              <a:t>(r = -0.10),  </a:t>
+            </a:r>
+            <a:r>
+              <a:rPr lang="en-US" sz="2000" b="1" dirty="0">
+                <a:latin typeface="Helvetica" pitchFamily="2" charset="0"/>
+                <a:cs typeface="Arial"/>
+              </a:rPr>
+              <a:t>Weekday</a:t>
+            </a:r>
+            <a:r>
+              <a:rPr lang="en-US" sz="2000" dirty="0">
+                <a:latin typeface="Helvetica" pitchFamily="2" charset="0"/>
+                <a:cs typeface="Arial"/>
+              </a:rPr>
+              <a:t> (r=-0.09), </a:t>
+            </a:r>
+            <a:r>
+              <a:rPr lang="en-US" sz="2000" b="1" dirty="0">
+                <a:latin typeface="Helvetica" pitchFamily="2" charset="0"/>
+                <a:cs typeface="Arial"/>
+              </a:rPr>
+              <a:t>Days until next exam </a:t>
+            </a:r>
+            <a:r>
+              <a:rPr lang="en-US" sz="2000" dirty="0">
+                <a:latin typeface="Helvetica" pitchFamily="2" charset="0"/>
+                <a:cs typeface="Arial"/>
+              </a:rPr>
+              <a:t>(r = -0.06)</a:t>
+            </a:r>
+          </a:p>
+          <a:p>
+            <a:pPr algn="ctr">
+              <a:lnSpc>
+                <a:spcPct val="110000"/>
+              </a:lnSpc>
+            </a:pPr>
+            <a:endParaRPr lang="en-US" sz="1200" dirty="0">
+              <a:latin typeface="Helvetica" pitchFamily="2" charset="0"/>
+              <a:cs typeface="Arial"/>
+            </a:endParaRPr>
+          </a:p>
+          <a:p>
+            <a:pPr algn="ctr">
+              <a:lnSpc>
+                <a:spcPct val="110000"/>
+              </a:lnSpc>
+            </a:pPr>
+            <a:endParaRPr lang="en-US" sz="1870" dirty="0">
+              <a:cs typeface="Arial"/>
+            </a:endParaRPr>
+          </a:p>
+          <a:p>
+            <a:pPr marL="342900" indent="-342900" algn="ctr">
+              <a:lnSpc>
+                <a:spcPct val="110000"/>
+              </a:lnSpc>
+              <a:buFontTx/>
+              <a:buChar char="-"/>
+            </a:pPr>
+            <a:endParaRPr lang="en-US" sz="1870" dirty="0">
+              <a:cs typeface="Arial"/>
+            </a:endParaRPr>
+          </a:p>
+          <a:p>
+            <a:pPr algn="ctr">
+              <a:lnSpc>
+                <a:spcPct val="110000"/>
+              </a:lnSpc>
+            </a:pPr>
+            <a:endParaRPr lang="en-US" sz="1870" dirty="0">
+              <a:cs typeface="Arial"/>
+            </a:endParaRPr>
+          </a:p>
+          <a:p>
+            <a:pPr algn="ctr">
+              <a:lnSpc>
+                <a:spcPct val="110000"/>
+              </a:lnSpc>
+            </a:pPr>
+            <a:endParaRPr lang="en-US" sz="1870" dirty="0">
+              <a:cs typeface="Arial"/>
+            </a:endParaRPr>
+          </a:p>
+        </p:txBody>
+      </p:sp>
+      <p:graphicFrame>
+        <p:nvGraphicFramePr>
+          <p:cNvPr id="6" name="Table 5">
+            <a:extLst>
+              <a:ext uri="{FF2B5EF4-FFF2-40B4-BE49-F238E27FC236}">
+                <a16:creationId xmlns:a16="http://schemas.microsoft.com/office/drawing/2014/main" id="{BC8BEB52-25A2-B548-9B0F-4D2CD0C142CE}"/>
+              </a:ext>
+            </a:extLst>
+          </p:cNvPr>
+          <p:cNvGraphicFramePr>
+            <a:graphicFrameLocks noGrp="1"/>
+          </p:cNvGraphicFramePr>
+          <p:nvPr>
+            <p:extLst>
+              <p:ext uri="{D42A27DB-BD31-4B8C-83A1-F6EECF244321}">
+                <p14:modId xmlns:p14="http://schemas.microsoft.com/office/powerpoint/2010/main" val="907111339"/>
+              </p:ext>
+            </p:extLst>
+          </p:nvPr>
+        </p:nvGraphicFramePr>
+        <p:xfrm>
+          <a:off x="574615" y="10070316"/>
+          <a:ext cx="7773044" cy="1588476"/>
+        </p:xfrm>
+        <a:graphic>
+          <a:graphicData uri="http://schemas.openxmlformats.org/drawingml/2006/table">
+            <a:tbl>
+              <a:tblPr/>
+              <a:tblGrid>
+                <a:gridCol w="712139">
+                  <a:extLst>
+                    <a:ext uri="{9D8B030D-6E8A-4147-A177-3AD203B41FA5}">
+                      <a16:colId xmlns:a16="http://schemas.microsoft.com/office/drawing/2014/main" val="2518818810"/>
+                    </a:ext>
+                  </a:extLst>
+                </a:gridCol>
+                <a:gridCol w="979756">
+                  <a:extLst>
+                    <a:ext uri="{9D8B030D-6E8A-4147-A177-3AD203B41FA5}">
+                      <a16:colId xmlns:a16="http://schemas.microsoft.com/office/drawing/2014/main" val="3701162585"/>
+                    </a:ext>
+                  </a:extLst>
+                </a:gridCol>
+                <a:gridCol w="1426819">
+                  <a:extLst>
+                    <a:ext uri="{9D8B030D-6E8A-4147-A177-3AD203B41FA5}">
+                      <a16:colId xmlns:a16="http://schemas.microsoft.com/office/drawing/2014/main" val="1951519735"/>
+                    </a:ext>
+                  </a:extLst>
+                </a:gridCol>
+                <a:gridCol w="915605">
+                  <a:extLst>
+                    <a:ext uri="{9D8B030D-6E8A-4147-A177-3AD203B41FA5}">
+                      <a16:colId xmlns:a16="http://schemas.microsoft.com/office/drawing/2014/main" val="2152933948"/>
+                    </a:ext>
+                  </a:extLst>
+                </a:gridCol>
+                <a:gridCol w="1251328">
+                  <a:extLst>
+                    <a:ext uri="{9D8B030D-6E8A-4147-A177-3AD203B41FA5}">
+                      <a16:colId xmlns:a16="http://schemas.microsoft.com/office/drawing/2014/main" val="3451126802"/>
+                    </a:ext>
+                  </a:extLst>
+                </a:gridCol>
+                <a:gridCol w="1060578">
+                  <a:extLst>
+                    <a:ext uri="{9D8B030D-6E8A-4147-A177-3AD203B41FA5}">
+                      <a16:colId xmlns:a16="http://schemas.microsoft.com/office/drawing/2014/main" val="1529208494"/>
+                    </a:ext>
+                  </a:extLst>
+                </a:gridCol>
+                <a:gridCol w="1426819">
+                  <a:extLst>
+                    <a:ext uri="{9D8B030D-6E8A-4147-A177-3AD203B41FA5}">
+                      <a16:colId xmlns:a16="http://schemas.microsoft.com/office/drawing/2014/main" val="2177897629"/>
+                    </a:ext>
+                  </a:extLst>
+                </a:gridCol>
+              </a:tblGrid>
+              <a:tr h="441606">
+                <a:tc>
+                  <a:txBody>
+                    <a:bodyPr/>
+                    <a:lstStyle/>
+                    <a:p>
+                      <a:pPr algn="ctr" fontAlgn="b"/>
+                      <a:r>
+                        <a:rPr lang="en-US" sz="1300" b="1" i="0" u="none" strike="noStrike">
+                          <a:solidFill>
+                            <a:srgbClr val="000000"/>
+                          </a:solidFill>
+                          <a:effectLst/>
+                          <a:latin typeface="Helvetica" pitchFamily="2" charset="0"/>
+                        </a:rPr>
+                        <a:t>Class</a:t>
+                      </a:r>
+                    </a:p>
+                  </a:txBody>
+                  <a:tcPr marL="9525" marR="9525" marT="9525" marB="0" anchor="b">
+                    <a:lnL w="6350" cap="flat" cmpd="sng" algn="ctr">
+                      <a:solidFill>
+                        <a:srgbClr val="000000"/>
+                      </a:solidFill>
+                      <a:prstDash val="solid"/>
+                      <a:round/>
+                      <a:headEnd type="none" w="med" len="med"/>
+                      <a:tailEnd type="none" w="med" len="med"/>
+                    </a:lnL>
+                    <a:lnR>
+                      <a:noFill/>
+                    </a:lnR>
+                    <a:lnT w="6350" cap="flat" cmpd="sng" algn="ctr">
+                      <a:solidFill>
+                        <a:srgbClr val="000000"/>
+                      </a:solidFill>
+                      <a:prstDash val="solid"/>
+                      <a:round/>
+                      <a:headEnd type="none" w="med" len="med"/>
+                      <a:tailEnd type="none" w="med" len="med"/>
+                    </a:lnT>
+                    <a:lnB w="6350" cap="flat" cmpd="sng" algn="ctr">
+                      <a:solidFill>
+                        <a:srgbClr val="000000"/>
+                      </a:solidFill>
+                      <a:prstDash val="solid"/>
+                      <a:round/>
+                      <a:headEnd type="none" w="med" len="med"/>
+                      <a:tailEnd type="none" w="med" len="med"/>
+                    </a:lnB>
+                  </a:tcPr>
+                </a:tc>
+                <a:tc>
+                  <a:txBody>
+                    <a:bodyPr/>
+                    <a:lstStyle/>
+                    <a:p>
+                      <a:pPr algn="ctr" fontAlgn="b"/>
+                      <a:r>
+                        <a:rPr lang="en-US" sz="1300" b="1" i="0" u="none" strike="noStrike" dirty="0">
+                          <a:solidFill>
+                            <a:srgbClr val="000000"/>
+                          </a:solidFill>
+                          <a:effectLst/>
+                          <a:latin typeface="Helvetica" pitchFamily="2" charset="0"/>
+                        </a:rPr>
+                        <a:t>Quarter </a:t>
+                      </a:r>
+                    </a:p>
+                    <a:p>
+                      <a:pPr algn="ctr" fontAlgn="b"/>
+                      <a:r>
+                        <a:rPr lang="en-US" sz="1300" b="1" i="0" u="none" strike="noStrike" dirty="0">
+                          <a:solidFill>
+                            <a:srgbClr val="000000"/>
+                          </a:solidFill>
+                          <a:effectLst/>
+                          <a:latin typeface="Helvetica" pitchFamily="2" charset="0"/>
+                        </a:rPr>
+                        <a:t>&amp; Year</a:t>
+                      </a:r>
+                    </a:p>
+                  </a:txBody>
+                  <a:tcPr marL="9525" marR="9525" marT="9525" marB="0" anchor="b">
+                    <a:lnL>
+                      <a:noFill/>
+                    </a:lnL>
+                    <a:lnR>
+                      <a:noFill/>
+                    </a:lnR>
+                    <a:lnT w="6350" cap="flat" cmpd="sng" algn="ctr">
+                      <a:solidFill>
+                        <a:srgbClr val="000000"/>
+                      </a:solidFill>
+                      <a:prstDash val="solid"/>
+                      <a:round/>
+                      <a:headEnd type="none" w="med" len="med"/>
+                      <a:tailEnd type="none" w="med" len="med"/>
+                    </a:lnT>
+                    <a:lnB w="6350" cap="flat" cmpd="sng" algn="ctr">
+                      <a:solidFill>
+                        <a:srgbClr val="000000"/>
+                      </a:solidFill>
+                      <a:prstDash val="solid"/>
+                      <a:round/>
+                      <a:headEnd type="none" w="med" len="med"/>
+                      <a:tailEnd type="none" w="med" len="med"/>
+                    </a:lnB>
+                  </a:tcPr>
+                </a:tc>
+                <a:tc>
+                  <a:txBody>
+                    <a:bodyPr/>
+                    <a:lstStyle/>
+                    <a:p>
+                      <a:pPr algn="ctr" fontAlgn="b"/>
+                      <a:r>
+                        <a:rPr lang="en-US" sz="1300" b="1" i="0" u="none" strike="noStrike" dirty="0">
+                          <a:solidFill>
+                            <a:srgbClr val="000000"/>
+                          </a:solidFill>
+                          <a:effectLst/>
+                          <a:latin typeface="Helvetica" pitchFamily="2" charset="0"/>
+                        </a:rPr>
+                        <a:t>#OH-Active </a:t>
+                      </a:r>
+                    </a:p>
+                    <a:p>
+                      <a:pPr algn="ctr" fontAlgn="b"/>
+                      <a:r>
+                        <a:rPr lang="en-US" sz="1300" b="1" i="0" u="none" strike="noStrike" dirty="0">
+                          <a:solidFill>
+                            <a:srgbClr val="000000"/>
+                          </a:solidFill>
+                          <a:effectLst/>
+                          <a:latin typeface="Helvetica" pitchFamily="2" charset="0"/>
+                        </a:rPr>
+                        <a:t>TAs</a:t>
+                      </a:r>
+                    </a:p>
+                  </a:txBody>
+                  <a:tcPr marL="9525" marR="9525" marT="9525" marB="0" anchor="b">
+                    <a:lnL>
+                      <a:noFill/>
+                    </a:lnL>
+                    <a:lnR>
+                      <a:noFill/>
+                    </a:lnR>
+                    <a:lnT w="6350" cap="flat" cmpd="sng" algn="ctr">
+                      <a:solidFill>
+                        <a:srgbClr val="000000"/>
+                      </a:solidFill>
+                      <a:prstDash val="solid"/>
+                      <a:round/>
+                      <a:headEnd type="none" w="med" len="med"/>
+                      <a:tailEnd type="none" w="med" len="med"/>
+                    </a:lnT>
+                    <a:lnB w="6350" cap="flat" cmpd="sng" algn="ctr">
+                      <a:solidFill>
+                        <a:srgbClr val="000000"/>
+                      </a:solidFill>
+                      <a:prstDash val="solid"/>
+                      <a:round/>
+                      <a:headEnd type="none" w="med" len="med"/>
+                      <a:tailEnd type="none" w="med" len="med"/>
+                    </a:lnB>
+                  </a:tcPr>
+                </a:tc>
+                <a:tc>
+                  <a:txBody>
+                    <a:bodyPr/>
+                    <a:lstStyle/>
+                    <a:p>
+                      <a:pPr algn="ctr" fontAlgn="b"/>
+                      <a:r>
+                        <a:rPr lang="en-US" sz="1300" b="1" i="0" u="none" strike="noStrike" dirty="0">
+                          <a:solidFill>
+                            <a:srgbClr val="000000"/>
+                          </a:solidFill>
+                          <a:effectLst/>
+                          <a:latin typeface="Helvetica" pitchFamily="2" charset="0"/>
+                        </a:rPr>
+                        <a:t>Total </a:t>
+                      </a:r>
+                    </a:p>
+                    <a:p>
+                      <a:pPr algn="ctr" fontAlgn="b"/>
+                      <a:r>
+                        <a:rPr lang="en-US" sz="1300" b="1" i="0" u="none" strike="noStrike" dirty="0">
+                          <a:solidFill>
+                            <a:srgbClr val="000000"/>
+                          </a:solidFill>
+                          <a:effectLst/>
+                          <a:latin typeface="Helvetica" pitchFamily="2" charset="0"/>
+                        </a:rPr>
+                        <a:t># Students</a:t>
+                      </a:r>
+                    </a:p>
+                  </a:txBody>
+                  <a:tcPr marL="9525" marR="9525" marT="9525" marB="0" anchor="b">
+                    <a:lnL>
+                      <a:noFill/>
+                    </a:lnL>
+                    <a:lnR>
+                      <a:noFill/>
+                    </a:lnR>
+                    <a:lnT w="6350" cap="flat" cmpd="sng" algn="ctr">
+                      <a:solidFill>
+                        <a:srgbClr val="000000"/>
+                      </a:solidFill>
+                      <a:prstDash val="solid"/>
+                      <a:round/>
+                      <a:headEnd type="none" w="med" len="med"/>
+                      <a:tailEnd type="none" w="med" len="med"/>
+                    </a:lnT>
+                    <a:lnB w="6350" cap="flat" cmpd="sng" algn="ctr">
+                      <a:solidFill>
+                        <a:srgbClr val="000000"/>
+                      </a:solidFill>
+                      <a:prstDash val="solid"/>
+                      <a:round/>
+                      <a:headEnd type="none" w="med" len="med"/>
+                      <a:tailEnd type="none" w="med" len="med"/>
+                    </a:lnB>
+                  </a:tcPr>
+                </a:tc>
+                <a:tc>
+                  <a:txBody>
+                    <a:bodyPr/>
+                    <a:lstStyle/>
+                    <a:p>
+                      <a:pPr algn="ctr" fontAlgn="b"/>
+                      <a:r>
+                        <a:rPr lang="en-US" sz="1300" b="1" i="0" u="none" strike="noStrike" dirty="0">
+                          <a:solidFill>
+                            <a:srgbClr val="000000"/>
+                          </a:solidFill>
+                          <a:effectLst/>
+                          <a:latin typeface="Helvetica" pitchFamily="2" charset="0"/>
+                        </a:rPr>
+                        <a:t>Total </a:t>
+                      </a:r>
+                    </a:p>
+                    <a:p>
+                      <a:pPr algn="ctr" fontAlgn="b"/>
+                      <a:r>
+                        <a:rPr lang="en-US" sz="1300" b="1" i="0" u="none" strike="noStrike" dirty="0">
+                          <a:solidFill>
+                            <a:srgbClr val="000000"/>
+                          </a:solidFill>
+                          <a:effectLst/>
+                          <a:latin typeface="Helvetica" pitchFamily="2" charset="0"/>
+                        </a:rPr>
+                        <a:t>OH Hours</a:t>
+                      </a:r>
+                    </a:p>
+                  </a:txBody>
+                  <a:tcPr marL="9525" marR="9525" marT="9525" marB="0" anchor="b">
+                    <a:lnL>
+                      <a:noFill/>
+                    </a:lnL>
+                    <a:lnR>
+                      <a:noFill/>
+                    </a:lnR>
+                    <a:lnT w="6350" cap="flat" cmpd="sng" algn="ctr">
+                      <a:solidFill>
+                        <a:srgbClr val="000000"/>
+                      </a:solidFill>
+                      <a:prstDash val="solid"/>
+                      <a:round/>
+                      <a:headEnd type="none" w="med" len="med"/>
+                      <a:tailEnd type="none" w="med" len="med"/>
+                    </a:lnT>
+                    <a:lnB w="6350" cap="flat" cmpd="sng" algn="ctr">
+                      <a:solidFill>
+                        <a:srgbClr val="000000"/>
+                      </a:solidFill>
+                      <a:prstDash val="solid"/>
+                      <a:round/>
+                      <a:headEnd type="none" w="med" len="med"/>
+                      <a:tailEnd type="none" w="med" len="med"/>
+                    </a:lnB>
+                  </a:tcPr>
+                </a:tc>
+                <a:tc>
+                  <a:txBody>
+                    <a:bodyPr/>
+                    <a:lstStyle/>
+                    <a:p>
+                      <a:pPr algn="ctr" fontAlgn="b"/>
+                      <a:r>
+                        <a:rPr lang="en-US" sz="1300" b="1" i="0" u="none" strike="noStrike" dirty="0">
+                          <a:solidFill>
+                            <a:srgbClr val="000000"/>
+                          </a:solidFill>
+                          <a:effectLst/>
+                          <a:latin typeface="Helvetica" pitchFamily="2" charset="0"/>
+                        </a:rPr>
+                        <a:t>Total </a:t>
+                      </a:r>
+                    </a:p>
+                    <a:p>
+                      <a:pPr algn="ctr" fontAlgn="b"/>
+                      <a:r>
+                        <a:rPr lang="en-US" sz="1300" b="1" i="0" u="none" strike="noStrike" dirty="0">
+                          <a:solidFill>
+                            <a:srgbClr val="000000"/>
+                          </a:solidFill>
+                          <a:effectLst/>
+                          <a:latin typeface="Helvetica" pitchFamily="2" charset="0"/>
+                        </a:rPr>
+                        <a:t>Served</a:t>
+                      </a:r>
+                    </a:p>
+                  </a:txBody>
+                  <a:tcPr marL="9525" marR="9525" marT="9525" marB="0" anchor="b">
+                    <a:lnL>
+                      <a:noFill/>
+                    </a:lnL>
+                    <a:lnR>
+                      <a:noFill/>
+                    </a:lnR>
+                    <a:lnT w="6350" cap="flat" cmpd="sng" algn="ctr">
+                      <a:solidFill>
+                        <a:srgbClr val="000000"/>
+                      </a:solidFill>
+                      <a:prstDash val="solid"/>
+                      <a:round/>
+                      <a:headEnd type="none" w="med" len="med"/>
+                      <a:tailEnd type="none" w="med" len="med"/>
+                    </a:lnT>
+                    <a:lnB w="6350" cap="flat" cmpd="sng" algn="ctr">
+                      <a:solidFill>
+                        <a:srgbClr val="000000"/>
+                      </a:solidFill>
+                      <a:prstDash val="solid"/>
+                      <a:round/>
+                      <a:headEnd type="none" w="med" len="med"/>
+                      <a:tailEnd type="none" w="med" len="med"/>
+                    </a:lnB>
+                  </a:tcPr>
+                </a:tc>
+                <a:tc>
+                  <a:txBody>
+                    <a:bodyPr/>
+                    <a:lstStyle/>
+                    <a:p>
+                      <a:pPr algn="ctr" fontAlgn="b"/>
+                      <a:r>
+                        <a:rPr lang="en-US" sz="1300" b="1" i="0" u="none" strike="noStrike" dirty="0">
+                          <a:solidFill>
+                            <a:srgbClr val="000000"/>
+                          </a:solidFill>
+                          <a:effectLst/>
+                          <a:latin typeface="Helvetica" pitchFamily="2" charset="0"/>
+                        </a:rPr>
+                        <a:t>Total </a:t>
+                      </a:r>
+                    </a:p>
+                    <a:p>
+                      <a:pPr algn="ctr" fontAlgn="b"/>
+                      <a:r>
+                        <a:rPr lang="en-US" sz="1300" b="1" i="0" u="none" strike="noStrike" dirty="0">
+                          <a:solidFill>
+                            <a:srgbClr val="000000"/>
+                          </a:solidFill>
+                          <a:effectLst/>
+                          <a:latin typeface="Helvetica" pitchFamily="2" charset="0"/>
+                        </a:rPr>
+                        <a:t>Load Influx </a:t>
+                      </a:r>
+                    </a:p>
+                  </a:txBody>
+                  <a:tcPr marL="9525" marR="9525" marT="9525" marB="0" anchor="b">
+                    <a:lnL>
+                      <a:noFill/>
+                    </a:lnL>
+                    <a:lnR w="6350" cap="flat" cmpd="sng" algn="ctr">
+                      <a:solidFill>
+                        <a:srgbClr val="000000"/>
+                      </a:solidFill>
+                      <a:prstDash val="solid"/>
+                      <a:round/>
+                      <a:headEnd type="none" w="med" len="med"/>
+                      <a:tailEnd type="none" w="med" len="med"/>
+                    </a:lnR>
+                    <a:lnT w="6350" cap="flat" cmpd="sng" algn="ctr">
+                      <a:solidFill>
+                        <a:srgbClr val="000000"/>
+                      </a:solidFill>
+                      <a:prstDash val="solid"/>
+                      <a:round/>
+                      <a:headEnd type="none" w="med" len="med"/>
+                      <a:tailEnd type="none" w="med" len="med"/>
+                    </a:lnT>
+                    <a:lnB w="6350" cap="flat" cmpd="sng" algn="ctr">
+                      <a:solidFill>
+                        <a:srgbClr val="000000"/>
+                      </a:solidFill>
+                      <a:prstDash val="solid"/>
+                      <a:round/>
+                      <a:headEnd type="none" w="med" len="med"/>
+                      <a:tailEnd type="none" w="med" len="med"/>
+                    </a:lnB>
+                  </a:tcPr>
+                </a:tc>
+                <a:extLst>
+                  <a:ext uri="{0D108BD9-81ED-4DB2-BD59-A6C34878D82A}">
+                    <a16:rowId xmlns:a16="http://schemas.microsoft.com/office/drawing/2014/main" val="1862565935"/>
+                  </a:ext>
+                </a:extLst>
+              </a:tr>
+              <a:tr h="273130">
+                <a:tc>
+                  <a:txBody>
+                    <a:bodyPr/>
+                    <a:lstStyle/>
+                    <a:p>
+                      <a:pPr algn="ctr" fontAlgn="b"/>
+                      <a:r>
+                        <a:rPr lang="en-US" sz="1200" b="0" i="0" u="none" strike="noStrike">
+                          <a:solidFill>
+                            <a:srgbClr val="000000"/>
+                          </a:solidFill>
+                          <a:effectLst/>
+                          <a:latin typeface="Helvetica Light" panose="020B0403020202020204" pitchFamily="34" charset="0"/>
+                        </a:rPr>
+                        <a:t>CS107</a:t>
+                      </a:r>
+                    </a:p>
+                  </a:txBody>
+                  <a:tcPr marL="9525" marR="9525" marT="9525" marB="0" anchor="b">
+                    <a:lnL w="6350" cap="flat" cmpd="sng" algn="ctr">
+                      <a:solidFill>
+                        <a:srgbClr val="000000"/>
+                      </a:solidFill>
+                      <a:prstDash val="solid"/>
+                      <a:round/>
+                      <a:headEnd type="none" w="med" len="med"/>
+                      <a:tailEnd type="none" w="med" len="med"/>
+                    </a:lnL>
+                    <a:lnR>
+                      <a:noFill/>
+                    </a:lnR>
+                    <a:lnT w="6350" cap="flat" cmpd="sng" algn="ctr">
+                      <a:solidFill>
+                        <a:srgbClr val="000000"/>
+                      </a:solidFill>
+                      <a:prstDash val="solid"/>
+                      <a:round/>
+                      <a:headEnd type="none" w="med" len="med"/>
+                      <a:tailEnd type="none" w="med" len="med"/>
+                    </a:lnT>
+                    <a:lnB w="6350" cap="flat" cmpd="sng" algn="ctr">
+                      <a:solidFill>
+                        <a:srgbClr val="000000"/>
+                      </a:solidFill>
+                      <a:prstDash val="solid"/>
+                      <a:round/>
+                      <a:headEnd type="none" w="med" len="med"/>
+                      <a:tailEnd type="none" w="med" len="med"/>
+                    </a:lnB>
+                  </a:tcPr>
+                </a:tc>
+                <a:tc>
+                  <a:txBody>
+                    <a:bodyPr/>
+                    <a:lstStyle/>
+                    <a:p>
+                      <a:pPr algn="ctr" fontAlgn="b"/>
+                      <a:r>
+                        <a:rPr lang="en-US" sz="1200" b="0" i="0" u="none" strike="noStrike">
+                          <a:solidFill>
+                            <a:srgbClr val="000000"/>
+                          </a:solidFill>
+                          <a:effectLst/>
+                          <a:latin typeface="Helvetica Light" panose="020B0403020202020204" pitchFamily="34" charset="0"/>
+                        </a:rPr>
+                        <a:t>Spring 2017</a:t>
+                      </a:r>
+                    </a:p>
+                  </a:txBody>
+                  <a:tcPr marL="9525" marR="9525" marT="9525" marB="0" anchor="b">
+                    <a:lnL>
+                      <a:noFill/>
+                    </a:lnL>
+                    <a:lnR>
+                      <a:noFill/>
+                    </a:lnR>
+                    <a:lnT w="6350" cap="flat" cmpd="sng" algn="ctr">
+                      <a:solidFill>
+                        <a:srgbClr val="000000"/>
+                      </a:solidFill>
+                      <a:prstDash val="solid"/>
+                      <a:round/>
+                      <a:headEnd type="none" w="med" len="med"/>
+                      <a:tailEnd type="none" w="med" len="med"/>
+                    </a:lnT>
+                    <a:lnB w="6350" cap="flat" cmpd="sng" algn="ctr">
+                      <a:solidFill>
+                        <a:srgbClr val="000000"/>
+                      </a:solidFill>
+                      <a:prstDash val="solid"/>
+                      <a:round/>
+                      <a:headEnd type="none" w="med" len="med"/>
+                      <a:tailEnd type="none" w="med" len="med"/>
+                    </a:lnB>
+                  </a:tcPr>
+                </a:tc>
+                <a:tc>
+                  <a:txBody>
+                    <a:bodyPr/>
+                    <a:lstStyle/>
+                    <a:p>
+                      <a:pPr algn="ctr" fontAlgn="b"/>
+                      <a:r>
+                        <a:rPr lang="en-US" sz="1200" b="0" i="0" u="none" strike="noStrike" dirty="0">
+                          <a:solidFill>
+                            <a:srgbClr val="000000"/>
+                          </a:solidFill>
+                          <a:effectLst/>
+                          <a:latin typeface="Helvetica Light" panose="020B0403020202020204" pitchFamily="34" charset="0"/>
+                        </a:rPr>
+                        <a:t>13</a:t>
+                      </a:r>
+                    </a:p>
+                  </a:txBody>
+                  <a:tcPr marL="9525" marR="9525" marT="9525" marB="0" anchor="b">
+                    <a:lnL>
+                      <a:noFill/>
+                    </a:lnL>
+                    <a:lnR>
+                      <a:noFill/>
+                    </a:lnR>
+                    <a:lnT w="6350" cap="flat" cmpd="sng" algn="ctr">
+                      <a:solidFill>
+                        <a:srgbClr val="000000"/>
+                      </a:solidFill>
+                      <a:prstDash val="solid"/>
+                      <a:round/>
+                      <a:headEnd type="none" w="med" len="med"/>
+                      <a:tailEnd type="none" w="med" len="med"/>
+                    </a:lnT>
+                    <a:lnB w="6350" cap="flat" cmpd="sng" algn="ctr">
+                      <a:solidFill>
+                        <a:srgbClr val="000000"/>
+                      </a:solidFill>
+                      <a:prstDash val="solid"/>
+                      <a:round/>
+                      <a:headEnd type="none" w="med" len="med"/>
+                      <a:tailEnd type="none" w="med" len="med"/>
+                    </a:lnB>
+                  </a:tcPr>
+                </a:tc>
+                <a:tc>
+                  <a:txBody>
+                    <a:bodyPr/>
+                    <a:lstStyle/>
+                    <a:p>
+                      <a:pPr algn="ctr" fontAlgn="b"/>
+                      <a:r>
+                        <a:rPr lang="en-US" sz="1200" b="0" i="0" u="none" strike="noStrike">
+                          <a:solidFill>
+                            <a:srgbClr val="000000"/>
+                          </a:solidFill>
+                          <a:effectLst/>
+                          <a:latin typeface="Helvetica Light" panose="020B0403020202020204" pitchFamily="34" charset="0"/>
+                        </a:rPr>
+                        <a:t>184</a:t>
+                      </a:r>
+                    </a:p>
+                  </a:txBody>
+                  <a:tcPr marL="9525" marR="9525" marT="9525" marB="0" anchor="b">
+                    <a:lnL>
+                      <a:noFill/>
+                    </a:lnL>
+                    <a:lnR>
+                      <a:noFill/>
+                    </a:lnR>
+                    <a:lnT w="6350" cap="flat" cmpd="sng" algn="ctr">
+                      <a:solidFill>
+                        <a:srgbClr val="000000"/>
+                      </a:solidFill>
+                      <a:prstDash val="solid"/>
+                      <a:round/>
+                      <a:headEnd type="none" w="med" len="med"/>
+                      <a:tailEnd type="none" w="med" len="med"/>
+                    </a:lnT>
+                    <a:lnB w="6350" cap="flat" cmpd="sng" algn="ctr">
+                      <a:solidFill>
+                        <a:srgbClr val="000000"/>
+                      </a:solidFill>
+                      <a:prstDash val="solid"/>
+                      <a:round/>
+                      <a:headEnd type="none" w="med" len="med"/>
+                      <a:tailEnd type="none" w="med" len="med"/>
+                    </a:lnB>
+                  </a:tcPr>
+                </a:tc>
+                <a:tc>
+                  <a:txBody>
+                    <a:bodyPr/>
+                    <a:lstStyle/>
+                    <a:p>
+                      <a:pPr algn="ctr" fontAlgn="b"/>
+                      <a:r>
+                        <a:rPr lang="en-US" sz="1200" b="0" i="0" u="none" strike="noStrike">
+                          <a:solidFill>
+                            <a:srgbClr val="000000"/>
+                          </a:solidFill>
+                          <a:effectLst/>
+                          <a:latin typeface="Helvetica Light" panose="020B0403020202020204" pitchFamily="34" charset="0"/>
+                        </a:rPr>
+                        <a:t>415</a:t>
+                      </a:r>
+                    </a:p>
+                  </a:txBody>
+                  <a:tcPr marL="9525" marR="9525" marT="9525" marB="0" anchor="b">
+                    <a:lnL>
+                      <a:noFill/>
+                    </a:lnL>
+                    <a:lnR>
+                      <a:noFill/>
+                    </a:lnR>
+                    <a:lnT w="6350" cap="flat" cmpd="sng" algn="ctr">
+                      <a:solidFill>
+                        <a:srgbClr val="000000"/>
+                      </a:solidFill>
+                      <a:prstDash val="solid"/>
+                      <a:round/>
+                      <a:headEnd type="none" w="med" len="med"/>
+                      <a:tailEnd type="none" w="med" len="med"/>
+                    </a:lnT>
+                    <a:lnB w="6350" cap="flat" cmpd="sng" algn="ctr">
+                      <a:solidFill>
+                        <a:srgbClr val="000000"/>
+                      </a:solidFill>
+                      <a:prstDash val="solid"/>
+                      <a:round/>
+                      <a:headEnd type="none" w="med" len="med"/>
+                      <a:tailEnd type="none" w="med" len="med"/>
+                    </a:lnB>
+                  </a:tcPr>
+                </a:tc>
+                <a:tc>
+                  <a:txBody>
+                    <a:bodyPr/>
+                    <a:lstStyle/>
+                    <a:p>
+                      <a:pPr algn="ctr" fontAlgn="b"/>
+                      <a:r>
+                        <a:rPr lang="en-US" sz="1200" b="0" i="0" u="none" strike="noStrike">
+                          <a:solidFill>
+                            <a:srgbClr val="000000"/>
+                          </a:solidFill>
+                          <a:effectLst/>
+                          <a:latin typeface="Helvetica Light" panose="020B0403020202020204" pitchFamily="34" charset="0"/>
+                        </a:rPr>
+                        <a:t>1722</a:t>
+                      </a:r>
+                    </a:p>
+                  </a:txBody>
+                  <a:tcPr marL="9525" marR="9525" marT="9525" marB="0" anchor="b">
+                    <a:lnL>
+                      <a:noFill/>
+                    </a:lnL>
+                    <a:lnR>
+                      <a:noFill/>
+                    </a:lnR>
+                    <a:lnT w="6350" cap="flat" cmpd="sng" algn="ctr">
+                      <a:solidFill>
+                        <a:srgbClr val="000000"/>
+                      </a:solidFill>
+                      <a:prstDash val="solid"/>
+                      <a:round/>
+                      <a:headEnd type="none" w="med" len="med"/>
+                      <a:tailEnd type="none" w="med" len="med"/>
+                    </a:lnT>
+                    <a:lnB w="6350" cap="flat" cmpd="sng" algn="ctr">
+                      <a:solidFill>
+                        <a:srgbClr val="000000"/>
+                      </a:solidFill>
+                      <a:prstDash val="solid"/>
+                      <a:round/>
+                      <a:headEnd type="none" w="med" len="med"/>
+                      <a:tailEnd type="none" w="med" len="med"/>
+                    </a:lnB>
+                  </a:tcPr>
+                </a:tc>
+                <a:tc>
+                  <a:txBody>
+                    <a:bodyPr/>
+                    <a:lstStyle/>
+                    <a:p>
+                      <a:pPr algn="ctr" fontAlgn="b"/>
+                      <a:r>
+                        <a:rPr lang="en-US" sz="1200" b="0" i="0" u="none" strike="noStrike">
+                          <a:solidFill>
+                            <a:srgbClr val="000000"/>
+                          </a:solidFill>
+                          <a:effectLst/>
+                          <a:latin typeface="Helvetica Light" panose="020B0403020202020204" pitchFamily="34" charset="0"/>
+                        </a:rPr>
+                        <a:t>21873.09</a:t>
+                      </a:r>
+                    </a:p>
+                  </a:txBody>
+                  <a:tcPr marL="9525" marR="9525" marT="9525" marB="0" anchor="b">
+                    <a:lnL>
+                      <a:noFill/>
+                    </a:lnL>
+                    <a:lnR w="6350" cap="flat" cmpd="sng" algn="ctr">
+                      <a:solidFill>
+                        <a:srgbClr val="000000"/>
+                      </a:solidFill>
+                      <a:prstDash val="solid"/>
+                      <a:round/>
+                      <a:headEnd type="none" w="med" len="med"/>
+                      <a:tailEnd type="none" w="med" len="med"/>
+                    </a:lnR>
+                    <a:lnT w="6350" cap="flat" cmpd="sng" algn="ctr">
+                      <a:solidFill>
+                        <a:srgbClr val="000000"/>
+                      </a:solidFill>
+                      <a:prstDash val="solid"/>
+                      <a:round/>
+                      <a:headEnd type="none" w="med" len="med"/>
+                      <a:tailEnd type="none" w="med" len="med"/>
+                    </a:lnT>
+                    <a:lnB w="6350" cap="flat" cmpd="sng" algn="ctr">
+                      <a:solidFill>
+                        <a:srgbClr val="000000"/>
+                      </a:solidFill>
+                      <a:prstDash val="solid"/>
+                      <a:round/>
+                      <a:headEnd type="none" w="med" len="med"/>
+                      <a:tailEnd type="none" w="med" len="med"/>
+                    </a:lnB>
+                  </a:tcPr>
+                </a:tc>
+                <a:extLst>
+                  <a:ext uri="{0D108BD9-81ED-4DB2-BD59-A6C34878D82A}">
+                    <a16:rowId xmlns:a16="http://schemas.microsoft.com/office/drawing/2014/main" val="633595444"/>
+                  </a:ext>
+                </a:extLst>
+              </a:tr>
+              <a:tr h="306301">
+                <a:tc>
+                  <a:txBody>
+                    <a:bodyPr/>
+                    <a:lstStyle/>
+                    <a:p>
+                      <a:pPr algn="ctr" fontAlgn="b"/>
+                      <a:r>
+                        <a:rPr lang="en-US" sz="1200" b="0" i="0" u="none" strike="noStrike">
+                          <a:solidFill>
+                            <a:srgbClr val="000000"/>
+                          </a:solidFill>
+                          <a:effectLst/>
+                          <a:latin typeface="Helvetica Light" panose="020B0403020202020204" pitchFamily="34" charset="0"/>
+                        </a:rPr>
+                        <a:t>CS161</a:t>
+                      </a:r>
+                    </a:p>
+                  </a:txBody>
+                  <a:tcPr marL="9525" marR="9525" marT="9525" marB="0" anchor="b">
+                    <a:lnL w="6350" cap="flat" cmpd="sng" algn="ctr">
+                      <a:solidFill>
+                        <a:srgbClr val="000000"/>
+                      </a:solidFill>
+                      <a:prstDash val="solid"/>
+                      <a:round/>
+                      <a:headEnd type="none" w="med" len="med"/>
+                      <a:tailEnd type="none" w="med" len="med"/>
+                    </a:lnL>
+                    <a:lnR>
+                      <a:noFill/>
+                    </a:lnR>
+                    <a:lnT w="6350" cap="flat" cmpd="sng" algn="ctr">
+                      <a:solidFill>
+                        <a:srgbClr val="000000"/>
+                      </a:solidFill>
+                      <a:prstDash val="solid"/>
+                      <a:round/>
+                      <a:headEnd type="none" w="med" len="med"/>
+                      <a:tailEnd type="none" w="med" len="med"/>
+                    </a:lnT>
+                    <a:lnB w="6350" cap="flat" cmpd="sng" algn="ctr">
+                      <a:solidFill>
+                        <a:srgbClr val="000000"/>
+                      </a:solidFill>
+                      <a:prstDash val="solid"/>
+                      <a:round/>
+                      <a:headEnd type="none" w="med" len="med"/>
+                      <a:tailEnd type="none" w="med" len="med"/>
+                    </a:lnB>
+                  </a:tcPr>
+                </a:tc>
+                <a:tc>
+                  <a:txBody>
+                    <a:bodyPr/>
+                    <a:lstStyle/>
+                    <a:p>
+                      <a:pPr algn="ctr" fontAlgn="b"/>
+                      <a:r>
+                        <a:rPr lang="en-US" sz="1200" b="0" i="0" u="none" strike="noStrike" dirty="0">
+                          <a:solidFill>
+                            <a:srgbClr val="000000"/>
+                          </a:solidFill>
+                          <a:effectLst/>
+                          <a:latin typeface="Helvetica Light" panose="020B0403020202020204" pitchFamily="34" charset="0"/>
+                        </a:rPr>
+                        <a:t>Spring 2017</a:t>
+                      </a:r>
+                    </a:p>
+                  </a:txBody>
+                  <a:tcPr marL="9525" marR="9525" marT="9525" marB="0" anchor="b">
+                    <a:lnL>
+                      <a:noFill/>
+                    </a:lnL>
+                    <a:lnR>
+                      <a:noFill/>
+                    </a:lnR>
+                    <a:lnT w="6350" cap="flat" cmpd="sng" algn="ctr">
+                      <a:solidFill>
+                        <a:srgbClr val="000000"/>
+                      </a:solidFill>
+                      <a:prstDash val="solid"/>
+                      <a:round/>
+                      <a:headEnd type="none" w="med" len="med"/>
+                      <a:tailEnd type="none" w="med" len="med"/>
+                    </a:lnT>
+                    <a:lnB w="6350" cap="flat" cmpd="sng" algn="ctr">
+                      <a:solidFill>
+                        <a:srgbClr val="000000"/>
+                      </a:solidFill>
+                      <a:prstDash val="solid"/>
+                      <a:round/>
+                      <a:headEnd type="none" w="med" len="med"/>
+                      <a:tailEnd type="none" w="med" len="med"/>
+                    </a:lnB>
+                  </a:tcPr>
+                </a:tc>
+                <a:tc>
+                  <a:txBody>
+                    <a:bodyPr/>
+                    <a:lstStyle/>
+                    <a:p>
+                      <a:pPr algn="ctr" fontAlgn="b"/>
+                      <a:r>
+                        <a:rPr lang="en-US" sz="1200" b="0" i="0" u="none" strike="noStrike" dirty="0">
+                          <a:solidFill>
+                            <a:srgbClr val="000000"/>
+                          </a:solidFill>
+                          <a:effectLst/>
+                          <a:latin typeface="Helvetica Light" panose="020B0403020202020204" pitchFamily="34" charset="0"/>
+                        </a:rPr>
+                        <a:t>6</a:t>
+                      </a:r>
+                    </a:p>
+                  </a:txBody>
+                  <a:tcPr marL="9525" marR="9525" marT="9525" marB="0" anchor="b">
+                    <a:lnL>
+                      <a:noFill/>
+                    </a:lnL>
+                    <a:lnR>
+                      <a:noFill/>
+                    </a:lnR>
+                    <a:lnT w="6350" cap="flat" cmpd="sng" algn="ctr">
+                      <a:solidFill>
+                        <a:srgbClr val="000000"/>
+                      </a:solidFill>
+                      <a:prstDash val="solid"/>
+                      <a:round/>
+                      <a:headEnd type="none" w="med" len="med"/>
+                      <a:tailEnd type="none" w="med" len="med"/>
+                    </a:lnT>
+                    <a:lnB w="6350" cap="flat" cmpd="sng" algn="ctr">
+                      <a:solidFill>
+                        <a:srgbClr val="000000"/>
+                      </a:solidFill>
+                      <a:prstDash val="solid"/>
+                      <a:round/>
+                      <a:headEnd type="none" w="med" len="med"/>
+                      <a:tailEnd type="none" w="med" len="med"/>
+                    </a:lnB>
+                  </a:tcPr>
+                </a:tc>
+                <a:tc>
+                  <a:txBody>
+                    <a:bodyPr/>
+                    <a:lstStyle/>
+                    <a:p>
+                      <a:pPr algn="ctr" fontAlgn="b"/>
+                      <a:r>
+                        <a:rPr lang="en-US" sz="1200" b="0" i="0" u="none" strike="noStrike">
+                          <a:solidFill>
+                            <a:srgbClr val="000000"/>
+                          </a:solidFill>
+                          <a:effectLst/>
+                          <a:latin typeface="Helvetica Light" panose="020B0403020202020204" pitchFamily="34" charset="0"/>
+                        </a:rPr>
+                        <a:t>93</a:t>
+                      </a:r>
+                    </a:p>
+                  </a:txBody>
+                  <a:tcPr marL="9525" marR="9525" marT="9525" marB="0" anchor="b">
+                    <a:lnL>
+                      <a:noFill/>
+                    </a:lnL>
+                    <a:lnR>
+                      <a:noFill/>
+                    </a:lnR>
+                    <a:lnT w="6350" cap="flat" cmpd="sng" algn="ctr">
+                      <a:solidFill>
+                        <a:srgbClr val="000000"/>
+                      </a:solidFill>
+                      <a:prstDash val="solid"/>
+                      <a:round/>
+                      <a:headEnd type="none" w="med" len="med"/>
+                      <a:tailEnd type="none" w="med" len="med"/>
+                    </a:lnT>
+                    <a:lnB w="6350" cap="flat" cmpd="sng" algn="ctr">
+                      <a:solidFill>
+                        <a:srgbClr val="000000"/>
+                      </a:solidFill>
+                      <a:prstDash val="solid"/>
+                      <a:round/>
+                      <a:headEnd type="none" w="med" len="med"/>
+                      <a:tailEnd type="none" w="med" len="med"/>
+                    </a:lnB>
+                  </a:tcPr>
+                </a:tc>
+                <a:tc>
+                  <a:txBody>
+                    <a:bodyPr/>
+                    <a:lstStyle/>
+                    <a:p>
+                      <a:pPr algn="ctr" fontAlgn="b"/>
+                      <a:r>
+                        <a:rPr lang="en-US" sz="1200" b="0" i="0" u="none" strike="noStrike" dirty="0">
+                          <a:solidFill>
+                            <a:srgbClr val="000000"/>
+                          </a:solidFill>
+                          <a:effectLst/>
+                          <a:latin typeface="Helvetica Light" panose="020B0403020202020204" pitchFamily="34" charset="0"/>
+                        </a:rPr>
+                        <a:t>204</a:t>
+                      </a:r>
+                    </a:p>
+                  </a:txBody>
+                  <a:tcPr marL="9525" marR="9525" marT="9525" marB="0" anchor="b">
+                    <a:lnL>
+                      <a:noFill/>
+                    </a:lnL>
+                    <a:lnR>
+                      <a:noFill/>
+                    </a:lnR>
+                    <a:lnT w="6350" cap="flat" cmpd="sng" algn="ctr">
+                      <a:solidFill>
+                        <a:srgbClr val="000000"/>
+                      </a:solidFill>
+                      <a:prstDash val="solid"/>
+                      <a:round/>
+                      <a:headEnd type="none" w="med" len="med"/>
+                      <a:tailEnd type="none" w="med" len="med"/>
+                    </a:lnT>
+                    <a:lnB w="6350" cap="flat" cmpd="sng" algn="ctr">
+                      <a:solidFill>
+                        <a:srgbClr val="000000"/>
+                      </a:solidFill>
+                      <a:prstDash val="solid"/>
+                      <a:round/>
+                      <a:headEnd type="none" w="med" len="med"/>
+                      <a:tailEnd type="none" w="med" len="med"/>
+                    </a:lnB>
+                  </a:tcPr>
+                </a:tc>
+                <a:tc>
+                  <a:txBody>
+                    <a:bodyPr/>
+                    <a:lstStyle/>
+                    <a:p>
+                      <a:pPr algn="ctr" fontAlgn="b"/>
+                      <a:r>
+                        <a:rPr lang="en-US" sz="1200" b="0" i="0" u="none" strike="noStrike" dirty="0">
+                          <a:solidFill>
+                            <a:srgbClr val="000000"/>
+                          </a:solidFill>
+                          <a:effectLst/>
+                          <a:latin typeface="Helvetica Light" panose="020B0403020202020204" pitchFamily="34" charset="0"/>
+                        </a:rPr>
+                        <a:t>875</a:t>
+                      </a:r>
+                    </a:p>
+                  </a:txBody>
+                  <a:tcPr marL="9525" marR="9525" marT="9525" marB="0" anchor="b">
+                    <a:lnL>
+                      <a:noFill/>
+                    </a:lnL>
+                    <a:lnR>
+                      <a:noFill/>
+                    </a:lnR>
+                    <a:lnT w="6350" cap="flat" cmpd="sng" algn="ctr">
+                      <a:solidFill>
+                        <a:srgbClr val="000000"/>
+                      </a:solidFill>
+                      <a:prstDash val="solid"/>
+                      <a:round/>
+                      <a:headEnd type="none" w="med" len="med"/>
+                      <a:tailEnd type="none" w="med" len="med"/>
+                    </a:lnT>
+                    <a:lnB w="6350" cap="flat" cmpd="sng" algn="ctr">
+                      <a:solidFill>
+                        <a:srgbClr val="000000"/>
+                      </a:solidFill>
+                      <a:prstDash val="solid"/>
+                      <a:round/>
+                      <a:headEnd type="none" w="med" len="med"/>
+                      <a:tailEnd type="none" w="med" len="med"/>
+                    </a:lnB>
+                  </a:tcPr>
+                </a:tc>
+                <a:tc>
+                  <a:txBody>
+                    <a:bodyPr/>
+                    <a:lstStyle/>
+                    <a:p>
+                      <a:pPr algn="ctr" fontAlgn="b"/>
+                      <a:r>
+                        <a:rPr lang="en-US" sz="1200" b="0" i="0" u="none" strike="noStrike" dirty="0">
+                          <a:solidFill>
+                            <a:srgbClr val="000000"/>
+                          </a:solidFill>
+                          <a:effectLst/>
+                          <a:latin typeface="Helvetica Light" panose="020B0403020202020204" pitchFamily="34" charset="0"/>
+                        </a:rPr>
+                        <a:t>15380.68</a:t>
+                      </a:r>
+                    </a:p>
+                  </a:txBody>
+                  <a:tcPr marL="9525" marR="9525" marT="9525" marB="0" anchor="b">
+                    <a:lnL>
+                      <a:noFill/>
+                    </a:lnL>
+                    <a:lnR w="6350" cap="flat" cmpd="sng" algn="ctr">
+                      <a:solidFill>
+                        <a:srgbClr val="000000"/>
+                      </a:solidFill>
+                      <a:prstDash val="solid"/>
+                      <a:round/>
+                      <a:headEnd type="none" w="med" len="med"/>
+                      <a:tailEnd type="none" w="med" len="med"/>
+                    </a:lnR>
+                    <a:lnT w="6350" cap="flat" cmpd="sng" algn="ctr">
+                      <a:solidFill>
+                        <a:srgbClr val="000000"/>
+                      </a:solidFill>
+                      <a:prstDash val="solid"/>
+                      <a:round/>
+                      <a:headEnd type="none" w="med" len="med"/>
+                      <a:tailEnd type="none" w="med" len="med"/>
+                    </a:lnT>
+                    <a:lnB w="6350" cap="flat" cmpd="sng" algn="ctr">
+                      <a:solidFill>
+                        <a:srgbClr val="000000"/>
+                      </a:solidFill>
+                      <a:prstDash val="solid"/>
+                      <a:round/>
+                      <a:headEnd type="none" w="med" len="med"/>
+                      <a:tailEnd type="none" w="med" len="med"/>
+                    </a:lnB>
+                  </a:tcPr>
+                </a:tc>
+                <a:extLst>
+                  <a:ext uri="{0D108BD9-81ED-4DB2-BD59-A6C34878D82A}">
+                    <a16:rowId xmlns:a16="http://schemas.microsoft.com/office/drawing/2014/main" val="1152020395"/>
+                  </a:ext>
+                </a:extLst>
+              </a:tr>
+              <a:tr h="338839">
+                <a:tc>
+                  <a:txBody>
+                    <a:bodyPr/>
+                    <a:lstStyle/>
+                    <a:p>
+                      <a:pPr algn="ctr" fontAlgn="b"/>
+                      <a:r>
+                        <a:rPr lang="en-US" sz="1200" b="0" i="0" u="none" strike="noStrike">
+                          <a:solidFill>
+                            <a:srgbClr val="000000"/>
+                          </a:solidFill>
+                          <a:effectLst/>
+                          <a:latin typeface="Helvetica Light" panose="020B0403020202020204" pitchFamily="34" charset="0"/>
+                        </a:rPr>
+                        <a:t>CS110</a:t>
+                      </a:r>
+                    </a:p>
+                  </a:txBody>
+                  <a:tcPr marL="9525" marR="9525" marT="9525" marB="0" anchor="b">
+                    <a:lnL w="6350" cap="flat" cmpd="sng" algn="ctr">
+                      <a:solidFill>
+                        <a:srgbClr val="000000"/>
+                      </a:solidFill>
+                      <a:prstDash val="solid"/>
+                      <a:round/>
+                      <a:headEnd type="none" w="med" len="med"/>
+                      <a:tailEnd type="none" w="med" len="med"/>
+                    </a:lnL>
+                    <a:lnR>
+                      <a:noFill/>
+                    </a:lnR>
+                    <a:lnT w="6350" cap="flat" cmpd="sng" algn="ctr">
+                      <a:solidFill>
+                        <a:srgbClr val="000000"/>
+                      </a:solidFill>
+                      <a:prstDash val="solid"/>
+                      <a:round/>
+                      <a:headEnd type="none" w="med" len="med"/>
+                      <a:tailEnd type="none" w="med" len="med"/>
+                    </a:lnT>
+                    <a:lnB w="6350" cap="flat" cmpd="sng" algn="ctr">
+                      <a:solidFill>
+                        <a:srgbClr val="000000"/>
+                      </a:solidFill>
+                      <a:prstDash val="solid"/>
+                      <a:round/>
+                      <a:headEnd type="none" w="med" len="med"/>
+                      <a:tailEnd type="none" w="med" len="med"/>
+                    </a:lnB>
+                  </a:tcPr>
+                </a:tc>
+                <a:tc>
+                  <a:txBody>
+                    <a:bodyPr/>
+                    <a:lstStyle/>
+                    <a:p>
+                      <a:pPr algn="ctr" fontAlgn="b"/>
+                      <a:r>
+                        <a:rPr lang="en-US" sz="1200" b="0" i="0" u="none" strike="noStrike" dirty="0">
+                          <a:solidFill>
+                            <a:srgbClr val="000000"/>
+                          </a:solidFill>
+                          <a:effectLst/>
+                          <a:latin typeface="Helvetica Light" panose="020B0403020202020204" pitchFamily="34" charset="0"/>
+                        </a:rPr>
+                        <a:t>Spring 2018</a:t>
+                      </a:r>
+                    </a:p>
+                  </a:txBody>
+                  <a:tcPr marL="9525" marR="9525" marT="9525" marB="0" anchor="b">
+                    <a:lnL>
+                      <a:noFill/>
+                    </a:lnL>
+                    <a:lnR>
+                      <a:noFill/>
+                    </a:lnR>
+                    <a:lnT w="6350" cap="flat" cmpd="sng" algn="ctr">
+                      <a:solidFill>
+                        <a:srgbClr val="000000"/>
+                      </a:solidFill>
+                      <a:prstDash val="solid"/>
+                      <a:round/>
+                      <a:headEnd type="none" w="med" len="med"/>
+                      <a:tailEnd type="none" w="med" len="med"/>
+                    </a:lnT>
+                    <a:lnB w="6350" cap="flat" cmpd="sng" algn="ctr">
+                      <a:solidFill>
+                        <a:srgbClr val="000000"/>
+                      </a:solidFill>
+                      <a:prstDash val="solid"/>
+                      <a:round/>
+                      <a:headEnd type="none" w="med" len="med"/>
+                      <a:tailEnd type="none" w="med" len="med"/>
+                    </a:lnB>
+                  </a:tcPr>
+                </a:tc>
+                <a:tc>
+                  <a:txBody>
+                    <a:bodyPr/>
+                    <a:lstStyle/>
+                    <a:p>
+                      <a:pPr algn="ctr" fontAlgn="b"/>
+                      <a:r>
+                        <a:rPr lang="en-US" sz="1200" b="0" i="0" u="none" strike="noStrike" dirty="0">
+                          <a:solidFill>
+                            <a:srgbClr val="000000"/>
+                          </a:solidFill>
+                          <a:effectLst/>
+                          <a:latin typeface="Helvetica Light" panose="020B0403020202020204" pitchFamily="34" charset="0"/>
+                        </a:rPr>
+                        <a:t>20</a:t>
+                      </a:r>
+                    </a:p>
+                  </a:txBody>
+                  <a:tcPr marL="9525" marR="9525" marT="9525" marB="0" anchor="b">
+                    <a:lnL>
+                      <a:noFill/>
+                    </a:lnL>
+                    <a:lnR>
+                      <a:noFill/>
+                    </a:lnR>
+                    <a:lnT w="6350" cap="flat" cmpd="sng" algn="ctr">
+                      <a:solidFill>
+                        <a:srgbClr val="000000"/>
+                      </a:solidFill>
+                      <a:prstDash val="solid"/>
+                      <a:round/>
+                      <a:headEnd type="none" w="med" len="med"/>
+                      <a:tailEnd type="none" w="med" len="med"/>
+                    </a:lnT>
+                    <a:lnB w="6350" cap="flat" cmpd="sng" algn="ctr">
+                      <a:solidFill>
+                        <a:srgbClr val="000000"/>
+                      </a:solidFill>
+                      <a:prstDash val="solid"/>
+                      <a:round/>
+                      <a:headEnd type="none" w="med" len="med"/>
+                      <a:tailEnd type="none" w="med" len="med"/>
+                    </a:lnB>
+                  </a:tcPr>
+                </a:tc>
+                <a:tc>
+                  <a:txBody>
+                    <a:bodyPr/>
+                    <a:lstStyle/>
+                    <a:p>
+                      <a:pPr algn="ctr" fontAlgn="b"/>
+                      <a:r>
+                        <a:rPr lang="en-US" sz="1200" b="0" i="0" u="none" strike="noStrike" dirty="0">
+                          <a:solidFill>
+                            <a:srgbClr val="000000"/>
+                          </a:solidFill>
+                          <a:effectLst/>
+                          <a:latin typeface="Helvetica Light" panose="020B0403020202020204" pitchFamily="34" charset="0"/>
+                        </a:rPr>
+                        <a:t>187</a:t>
+                      </a:r>
+                    </a:p>
+                  </a:txBody>
+                  <a:tcPr marL="9525" marR="9525" marT="9525" marB="0" anchor="b">
+                    <a:lnL>
+                      <a:noFill/>
+                    </a:lnL>
+                    <a:lnR>
+                      <a:noFill/>
+                    </a:lnR>
+                    <a:lnT w="6350" cap="flat" cmpd="sng" algn="ctr">
+                      <a:solidFill>
+                        <a:srgbClr val="000000"/>
+                      </a:solidFill>
+                      <a:prstDash val="solid"/>
+                      <a:round/>
+                      <a:headEnd type="none" w="med" len="med"/>
+                      <a:tailEnd type="none" w="med" len="med"/>
+                    </a:lnT>
+                    <a:lnB w="6350" cap="flat" cmpd="sng" algn="ctr">
+                      <a:solidFill>
+                        <a:srgbClr val="000000"/>
+                      </a:solidFill>
+                      <a:prstDash val="solid"/>
+                      <a:round/>
+                      <a:headEnd type="none" w="med" len="med"/>
+                      <a:tailEnd type="none" w="med" len="med"/>
+                    </a:lnB>
+                  </a:tcPr>
+                </a:tc>
+                <a:tc>
+                  <a:txBody>
+                    <a:bodyPr/>
+                    <a:lstStyle/>
+                    <a:p>
+                      <a:pPr algn="ctr" fontAlgn="b"/>
+                      <a:r>
+                        <a:rPr lang="en-US" sz="1200" b="0" i="0" u="none" strike="noStrike" dirty="0">
+                          <a:solidFill>
+                            <a:srgbClr val="000000"/>
+                          </a:solidFill>
+                          <a:effectLst/>
+                          <a:latin typeface="Helvetica Light" panose="020B0403020202020204" pitchFamily="34" charset="0"/>
+                        </a:rPr>
+                        <a:t>223</a:t>
+                      </a:r>
+                    </a:p>
+                  </a:txBody>
+                  <a:tcPr marL="9525" marR="9525" marT="9525" marB="0" anchor="b">
+                    <a:lnL>
+                      <a:noFill/>
+                    </a:lnL>
+                    <a:lnR>
+                      <a:noFill/>
+                    </a:lnR>
+                    <a:lnT w="6350" cap="flat" cmpd="sng" algn="ctr">
+                      <a:solidFill>
+                        <a:srgbClr val="000000"/>
+                      </a:solidFill>
+                      <a:prstDash val="solid"/>
+                      <a:round/>
+                      <a:headEnd type="none" w="med" len="med"/>
+                      <a:tailEnd type="none" w="med" len="med"/>
+                    </a:lnT>
+                    <a:lnB w="6350" cap="flat" cmpd="sng" algn="ctr">
+                      <a:solidFill>
+                        <a:srgbClr val="000000"/>
+                      </a:solidFill>
+                      <a:prstDash val="solid"/>
+                      <a:round/>
+                      <a:headEnd type="none" w="med" len="med"/>
+                      <a:tailEnd type="none" w="med" len="med"/>
+                    </a:lnB>
+                  </a:tcPr>
+                </a:tc>
+                <a:tc>
+                  <a:txBody>
+                    <a:bodyPr/>
+                    <a:lstStyle/>
+                    <a:p>
+                      <a:pPr algn="ctr" fontAlgn="b"/>
+                      <a:r>
+                        <a:rPr lang="en-US" sz="1200" b="0" i="0" u="none" strike="noStrike" dirty="0">
+                          <a:solidFill>
+                            <a:srgbClr val="000000"/>
+                          </a:solidFill>
+                          <a:effectLst/>
+                          <a:latin typeface="Helvetica Light" panose="020B0403020202020204" pitchFamily="34" charset="0"/>
+                        </a:rPr>
+                        <a:t>1749</a:t>
+                      </a:r>
+                    </a:p>
+                  </a:txBody>
+                  <a:tcPr marL="9525" marR="9525" marT="9525" marB="0" anchor="b">
+                    <a:lnL>
+                      <a:noFill/>
+                    </a:lnL>
+                    <a:lnR>
+                      <a:noFill/>
+                    </a:lnR>
+                    <a:lnT w="6350" cap="flat" cmpd="sng" algn="ctr">
+                      <a:solidFill>
+                        <a:srgbClr val="000000"/>
+                      </a:solidFill>
+                      <a:prstDash val="solid"/>
+                      <a:round/>
+                      <a:headEnd type="none" w="med" len="med"/>
+                      <a:tailEnd type="none" w="med" len="med"/>
+                    </a:lnT>
+                    <a:lnB w="6350" cap="flat" cmpd="sng" algn="ctr">
+                      <a:solidFill>
+                        <a:srgbClr val="000000"/>
+                      </a:solidFill>
+                      <a:prstDash val="solid"/>
+                      <a:round/>
+                      <a:headEnd type="none" w="med" len="med"/>
+                      <a:tailEnd type="none" w="med" len="med"/>
+                    </a:lnB>
+                  </a:tcPr>
+                </a:tc>
+                <a:tc>
+                  <a:txBody>
+                    <a:bodyPr/>
+                    <a:lstStyle/>
+                    <a:p>
+                      <a:pPr algn="ctr" fontAlgn="b"/>
+                      <a:r>
+                        <a:rPr lang="en-US" sz="1200" b="0" i="0" u="none" strike="noStrike" dirty="0">
+                          <a:solidFill>
+                            <a:srgbClr val="000000"/>
+                          </a:solidFill>
+                          <a:effectLst/>
+                          <a:latin typeface="Helvetica Light" panose="020B0403020202020204" pitchFamily="34" charset="0"/>
+                        </a:rPr>
+                        <a:t>35459.1</a:t>
+                      </a:r>
+                    </a:p>
+                  </a:txBody>
+                  <a:tcPr marL="9525" marR="9525" marT="9525" marB="0" anchor="b">
+                    <a:lnL>
+                      <a:noFill/>
+                    </a:lnL>
+                    <a:lnR w="6350" cap="flat" cmpd="sng" algn="ctr">
+                      <a:solidFill>
+                        <a:srgbClr val="000000"/>
+                      </a:solidFill>
+                      <a:prstDash val="solid"/>
+                      <a:round/>
+                      <a:headEnd type="none" w="med" len="med"/>
+                      <a:tailEnd type="none" w="med" len="med"/>
+                    </a:lnR>
+                    <a:lnT w="6350" cap="flat" cmpd="sng" algn="ctr">
+                      <a:solidFill>
+                        <a:srgbClr val="000000"/>
+                      </a:solidFill>
+                      <a:prstDash val="solid"/>
+                      <a:round/>
+                      <a:headEnd type="none" w="med" len="med"/>
+                      <a:tailEnd type="none" w="med" len="med"/>
+                    </a:lnT>
+                    <a:lnB w="6350" cap="flat" cmpd="sng" algn="ctr">
+                      <a:solidFill>
+                        <a:srgbClr val="000000"/>
+                      </a:solidFill>
+                      <a:prstDash val="solid"/>
+                      <a:round/>
+                      <a:headEnd type="none" w="med" len="med"/>
+                      <a:tailEnd type="none" w="med" len="med"/>
+                    </a:lnB>
+                  </a:tcPr>
+                </a:tc>
+                <a:extLst>
+                  <a:ext uri="{0D108BD9-81ED-4DB2-BD59-A6C34878D82A}">
+                    <a16:rowId xmlns:a16="http://schemas.microsoft.com/office/drawing/2014/main" val="1248243580"/>
+                  </a:ext>
+                </a:extLst>
+              </a:tr>
+              <a:tr h="228600">
+                <a:tc>
+                  <a:txBody>
+                    <a:bodyPr/>
+                    <a:lstStyle/>
+                    <a:p>
+                      <a:pPr algn="ctr" fontAlgn="b"/>
+                      <a:r>
+                        <a:rPr lang="en-US" sz="1200" b="0" i="0" u="none" strike="noStrike">
+                          <a:solidFill>
+                            <a:srgbClr val="000000"/>
+                          </a:solidFill>
+                          <a:effectLst/>
+                          <a:latin typeface="Helvetica Light" panose="020B0403020202020204" pitchFamily="34" charset="0"/>
+                        </a:rPr>
+                        <a:t>CS229</a:t>
+                      </a:r>
+                    </a:p>
+                  </a:txBody>
+                  <a:tcPr marL="9525" marR="9525" marT="9525" marB="0" anchor="b">
+                    <a:lnL w="6350" cap="flat" cmpd="sng" algn="ctr">
+                      <a:solidFill>
+                        <a:srgbClr val="000000"/>
+                      </a:solidFill>
+                      <a:prstDash val="solid"/>
+                      <a:round/>
+                      <a:headEnd type="none" w="med" len="med"/>
+                      <a:tailEnd type="none" w="med" len="med"/>
+                    </a:lnL>
+                    <a:lnR>
+                      <a:noFill/>
+                    </a:lnR>
+                    <a:lnT w="6350" cap="flat" cmpd="sng" algn="ctr">
+                      <a:solidFill>
+                        <a:srgbClr val="000000"/>
+                      </a:solidFill>
+                      <a:prstDash val="solid"/>
+                      <a:round/>
+                      <a:headEnd type="none" w="med" len="med"/>
+                      <a:tailEnd type="none" w="med" len="med"/>
+                    </a:lnT>
+                    <a:lnB w="6350" cap="flat" cmpd="sng" algn="ctr">
+                      <a:solidFill>
+                        <a:srgbClr val="000000"/>
+                      </a:solidFill>
+                      <a:prstDash val="solid"/>
+                      <a:round/>
+                      <a:headEnd type="none" w="med" len="med"/>
+                      <a:tailEnd type="none" w="med" len="med"/>
+                    </a:lnB>
+                  </a:tcPr>
+                </a:tc>
+                <a:tc>
+                  <a:txBody>
+                    <a:bodyPr/>
+                    <a:lstStyle/>
+                    <a:p>
+                      <a:pPr algn="ctr" fontAlgn="b"/>
+                      <a:r>
+                        <a:rPr lang="en-US" sz="1200" b="0" i="0" u="none" strike="noStrike">
+                          <a:solidFill>
+                            <a:srgbClr val="000000"/>
+                          </a:solidFill>
+                          <a:effectLst/>
+                          <a:latin typeface="Helvetica Light" panose="020B0403020202020204" pitchFamily="34" charset="0"/>
+                        </a:rPr>
+                        <a:t>Autumn 2018</a:t>
+                      </a:r>
+                    </a:p>
+                  </a:txBody>
+                  <a:tcPr marL="9525" marR="9525" marT="9525" marB="0" anchor="b">
+                    <a:lnL>
+                      <a:noFill/>
+                    </a:lnL>
+                    <a:lnR>
+                      <a:noFill/>
+                    </a:lnR>
+                    <a:lnT w="6350" cap="flat" cmpd="sng" algn="ctr">
+                      <a:solidFill>
+                        <a:srgbClr val="000000"/>
+                      </a:solidFill>
+                      <a:prstDash val="solid"/>
+                      <a:round/>
+                      <a:headEnd type="none" w="med" len="med"/>
+                      <a:tailEnd type="none" w="med" len="med"/>
+                    </a:lnT>
+                    <a:lnB w="6350" cap="flat" cmpd="sng" algn="ctr">
+                      <a:solidFill>
+                        <a:srgbClr val="000000"/>
+                      </a:solidFill>
+                      <a:prstDash val="solid"/>
+                      <a:round/>
+                      <a:headEnd type="none" w="med" len="med"/>
+                      <a:tailEnd type="none" w="med" len="med"/>
+                    </a:lnB>
+                  </a:tcPr>
+                </a:tc>
+                <a:tc>
+                  <a:txBody>
+                    <a:bodyPr/>
+                    <a:lstStyle/>
+                    <a:p>
+                      <a:pPr algn="ctr" fontAlgn="b"/>
+                      <a:r>
+                        <a:rPr lang="en-US" sz="1200" b="0" i="0" u="none" strike="noStrike" dirty="0">
+                          <a:solidFill>
+                            <a:srgbClr val="000000"/>
+                          </a:solidFill>
+                          <a:effectLst/>
+                          <a:latin typeface="Helvetica Light" panose="020B0403020202020204" pitchFamily="34" charset="0"/>
+                        </a:rPr>
+                        <a:t>17</a:t>
+                      </a:r>
+                    </a:p>
+                  </a:txBody>
+                  <a:tcPr marL="9525" marR="9525" marT="9525" marB="0" anchor="b">
+                    <a:lnL>
+                      <a:noFill/>
+                    </a:lnL>
+                    <a:lnR>
+                      <a:noFill/>
+                    </a:lnR>
+                    <a:lnT w="6350" cap="flat" cmpd="sng" algn="ctr">
+                      <a:solidFill>
+                        <a:srgbClr val="000000"/>
+                      </a:solidFill>
+                      <a:prstDash val="solid"/>
+                      <a:round/>
+                      <a:headEnd type="none" w="med" len="med"/>
+                      <a:tailEnd type="none" w="med" len="med"/>
+                    </a:lnT>
+                    <a:lnB w="6350" cap="flat" cmpd="sng" algn="ctr">
+                      <a:solidFill>
+                        <a:srgbClr val="000000"/>
+                      </a:solidFill>
+                      <a:prstDash val="solid"/>
+                      <a:round/>
+                      <a:headEnd type="none" w="med" len="med"/>
+                      <a:tailEnd type="none" w="med" len="med"/>
+                    </a:lnB>
+                  </a:tcPr>
+                </a:tc>
+                <a:tc>
+                  <a:txBody>
+                    <a:bodyPr/>
+                    <a:lstStyle/>
+                    <a:p>
+                      <a:pPr algn="ctr" fontAlgn="b"/>
+                      <a:r>
+                        <a:rPr lang="en-US" sz="1200" b="0" i="0" u="none" strike="noStrike" dirty="0">
+                          <a:solidFill>
+                            <a:srgbClr val="000000"/>
+                          </a:solidFill>
+                          <a:effectLst/>
+                          <a:latin typeface="Helvetica Light" panose="020B0403020202020204" pitchFamily="34" charset="0"/>
+                        </a:rPr>
+                        <a:t>634</a:t>
+                      </a:r>
+                    </a:p>
+                  </a:txBody>
+                  <a:tcPr marL="9525" marR="9525" marT="9525" marB="0" anchor="b">
+                    <a:lnL>
+                      <a:noFill/>
+                    </a:lnL>
+                    <a:lnR>
+                      <a:noFill/>
+                    </a:lnR>
+                    <a:lnT w="6350" cap="flat" cmpd="sng" algn="ctr">
+                      <a:solidFill>
+                        <a:srgbClr val="000000"/>
+                      </a:solidFill>
+                      <a:prstDash val="solid"/>
+                      <a:round/>
+                      <a:headEnd type="none" w="med" len="med"/>
+                      <a:tailEnd type="none" w="med" len="med"/>
+                    </a:lnT>
+                    <a:lnB w="6350" cap="flat" cmpd="sng" algn="ctr">
+                      <a:solidFill>
+                        <a:srgbClr val="000000"/>
+                      </a:solidFill>
+                      <a:prstDash val="solid"/>
+                      <a:round/>
+                      <a:headEnd type="none" w="med" len="med"/>
+                      <a:tailEnd type="none" w="med" len="med"/>
+                    </a:lnB>
+                  </a:tcPr>
+                </a:tc>
+                <a:tc>
+                  <a:txBody>
+                    <a:bodyPr/>
+                    <a:lstStyle/>
+                    <a:p>
+                      <a:pPr algn="ctr" fontAlgn="b"/>
+                      <a:r>
+                        <a:rPr lang="en-US" sz="1200" b="0" i="0" u="none" strike="noStrike" dirty="0">
+                          <a:solidFill>
+                            <a:srgbClr val="000000"/>
+                          </a:solidFill>
+                          <a:effectLst/>
+                          <a:latin typeface="Helvetica Light" panose="020B0403020202020204" pitchFamily="34" charset="0"/>
+                        </a:rPr>
+                        <a:t>369</a:t>
+                      </a:r>
+                    </a:p>
+                  </a:txBody>
+                  <a:tcPr marL="9525" marR="9525" marT="9525" marB="0" anchor="b">
+                    <a:lnL>
+                      <a:noFill/>
+                    </a:lnL>
+                    <a:lnR>
+                      <a:noFill/>
+                    </a:lnR>
+                    <a:lnT w="6350" cap="flat" cmpd="sng" algn="ctr">
+                      <a:solidFill>
+                        <a:srgbClr val="000000"/>
+                      </a:solidFill>
+                      <a:prstDash val="solid"/>
+                      <a:round/>
+                      <a:headEnd type="none" w="med" len="med"/>
+                      <a:tailEnd type="none" w="med" len="med"/>
+                    </a:lnT>
+                    <a:lnB w="6350" cap="flat" cmpd="sng" algn="ctr">
+                      <a:solidFill>
+                        <a:srgbClr val="000000"/>
+                      </a:solidFill>
+                      <a:prstDash val="solid"/>
+                      <a:round/>
+                      <a:headEnd type="none" w="med" len="med"/>
+                      <a:tailEnd type="none" w="med" len="med"/>
+                    </a:lnB>
+                  </a:tcPr>
+                </a:tc>
+                <a:tc>
+                  <a:txBody>
+                    <a:bodyPr/>
+                    <a:lstStyle/>
+                    <a:p>
+                      <a:pPr algn="ctr" fontAlgn="b"/>
+                      <a:r>
+                        <a:rPr lang="en-US" sz="1200" b="0" i="0" u="none" strike="noStrike" dirty="0">
+                          <a:solidFill>
+                            <a:srgbClr val="000000"/>
+                          </a:solidFill>
+                          <a:effectLst/>
+                          <a:latin typeface="Helvetica Light" panose="020B0403020202020204" pitchFamily="34" charset="0"/>
+                        </a:rPr>
+                        <a:t>1390</a:t>
+                      </a:r>
+                    </a:p>
+                  </a:txBody>
+                  <a:tcPr marL="9525" marR="9525" marT="9525" marB="0" anchor="b">
+                    <a:lnL>
+                      <a:noFill/>
+                    </a:lnL>
+                    <a:lnR>
+                      <a:noFill/>
+                    </a:lnR>
+                    <a:lnT w="6350" cap="flat" cmpd="sng" algn="ctr">
+                      <a:solidFill>
+                        <a:srgbClr val="000000"/>
+                      </a:solidFill>
+                      <a:prstDash val="solid"/>
+                      <a:round/>
+                      <a:headEnd type="none" w="med" len="med"/>
+                      <a:tailEnd type="none" w="med" len="med"/>
+                    </a:lnT>
+                    <a:lnB w="6350" cap="flat" cmpd="sng" algn="ctr">
+                      <a:solidFill>
+                        <a:srgbClr val="000000"/>
+                      </a:solidFill>
+                      <a:prstDash val="solid"/>
+                      <a:round/>
+                      <a:headEnd type="none" w="med" len="med"/>
+                      <a:tailEnd type="none" w="med" len="med"/>
+                    </a:lnB>
+                  </a:tcPr>
+                </a:tc>
+                <a:tc>
+                  <a:txBody>
+                    <a:bodyPr/>
+                    <a:lstStyle/>
+                    <a:p>
+                      <a:pPr algn="ctr" fontAlgn="b"/>
+                      <a:r>
+                        <a:rPr lang="en-US" sz="1200" b="0" i="0" u="none" strike="noStrike" dirty="0">
+                          <a:solidFill>
+                            <a:srgbClr val="000000"/>
+                          </a:solidFill>
+                          <a:effectLst/>
+                          <a:latin typeface="Helvetica Light" panose="020B0403020202020204" pitchFamily="34" charset="0"/>
+                        </a:rPr>
+                        <a:t>31733.7</a:t>
+                      </a:r>
+                    </a:p>
+                  </a:txBody>
+                  <a:tcPr marL="9525" marR="9525" marT="9525" marB="0" anchor="b">
+                    <a:lnL>
+                      <a:noFill/>
+                    </a:lnL>
+                    <a:lnR w="6350" cap="flat" cmpd="sng" algn="ctr">
+                      <a:solidFill>
+                        <a:srgbClr val="000000"/>
+                      </a:solidFill>
+                      <a:prstDash val="solid"/>
+                      <a:round/>
+                      <a:headEnd type="none" w="med" len="med"/>
+                      <a:tailEnd type="none" w="med" len="med"/>
+                    </a:lnR>
+                    <a:lnT w="6350" cap="flat" cmpd="sng" algn="ctr">
+                      <a:solidFill>
+                        <a:srgbClr val="000000"/>
+                      </a:solidFill>
+                      <a:prstDash val="solid"/>
+                      <a:round/>
+                      <a:headEnd type="none" w="med" len="med"/>
+                      <a:tailEnd type="none" w="med" len="med"/>
+                    </a:lnT>
+                    <a:lnB w="6350" cap="flat" cmpd="sng" algn="ctr">
+                      <a:solidFill>
+                        <a:srgbClr val="000000"/>
+                      </a:solidFill>
+                      <a:prstDash val="solid"/>
+                      <a:round/>
+                      <a:headEnd type="none" w="med" len="med"/>
+                      <a:tailEnd type="none" w="med" len="med"/>
+                    </a:lnB>
+                  </a:tcPr>
+                </a:tc>
+                <a:extLst>
+                  <a:ext uri="{0D108BD9-81ED-4DB2-BD59-A6C34878D82A}">
+                    <a16:rowId xmlns:a16="http://schemas.microsoft.com/office/drawing/2014/main" val="23549842"/>
+                  </a:ext>
+                </a:extLst>
+              </a:tr>
+            </a:tbl>
+          </a:graphicData>
+        </a:graphic>
+      </p:graphicFrame>
+      <p:sp>
+        <p:nvSpPr>
+          <p:cNvPr id="52" name="Rectangle 51">
+            <a:extLst>
+              <a:ext uri="{FF2B5EF4-FFF2-40B4-BE49-F238E27FC236}">
+                <a16:creationId xmlns:a16="http://schemas.microsoft.com/office/drawing/2014/main" id="{0B9E9237-C341-4447-ADBB-5DB41895680D}"/>
+              </a:ext>
+            </a:extLst>
+          </p:cNvPr>
+          <p:cNvSpPr/>
+          <p:nvPr/>
+        </p:nvSpPr>
+        <p:spPr>
+          <a:xfrm>
+            <a:off x="12035170" y="4295171"/>
+            <a:ext cx="2040362" cy="840826"/>
+          </a:xfrm>
+          <a:prstGeom prst="rect">
+            <a:avLst/>
+          </a:prstGeom>
+          <a:solidFill>
+            <a:schemeClr val="bg1"/>
+          </a:solidFill>
+        </p:spPr>
+        <p:style>
+          <a:lnRef idx="1">
+            <a:schemeClr val="accent1"/>
+          </a:lnRef>
+          <a:fillRef idx="3">
+            <a:schemeClr val="accent1"/>
+          </a:fillRef>
+          <a:effectRef idx="2">
+            <a:schemeClr val="accent1"/>
+          </a:effectRef>
+          <a:fontRef idx="minor">
+            <a:schemeClr val="lt1"/>
+          </a:fontRef>
+        </p:style>
+        <p:txBody>
+          <a:bodyPr rtlCol="0" anchor="ctr"/>
+          <a:lstStyle/>
+          <a:p>
+            <a:pPr algn="ctr"/>
+            <a:r>
+              <a:rPr lang="en-US" sz="2000" b="1" dirty="0">
+                <a:solidFill>
+                  <a:schemeClr val="tx1"/>
+                </a:solidFill>
+                <a:latin typeface="Helvetica Light" panose="020B0403020202020204" pitchFamily="34" charset="0"/>
+              </a:rPr>
+              <a:t>Predict </a:t>
+            </a:r>
+          </a:p>
+          <a:p>
+            <a:pPr algn="ctr"/>
+            <a:r>
+              <a:rPr lang="en-US" sz="2000" b="1" dirty="0">
+                <a:solidFill>
+                  <a:schemeClr val="tx1"/>
+                </a:solidFill>
+                <a:latin typeface="Helvetica Light" panose="020B0403020202020204" pitchFamily="34" charset="0"/>
+              </a:rPr>
+              <a:t>Load Influx</a:t>
+            </a:r>
+          </a:p>
+        </p:txBody>
+      </p:sp>
+      <p:sp>
+        <p:nvSpPr>
+          <p:cNvPr id="53" name="Rectangle 52">
+            <a:extLst>
+              <a:ext uri="{FF2B5EF4-FFF2-40B4-BE49-F238E27FC236}">
+                <a16:creationId xmlns:a16="http://schemas.microsoft.com/office/drawing/2014/main" id="{7F37EE7C-B10F-9247-B7AC-038B68A89DAB}"/>
+              </a:ext>
+            </a:extLst>
+          </p:cNvPr>
+          <p:cNvSpPr/>
+          <p:nvPr/>
+        </p:nvSpPr>
+        <p:spPr>
+          <a:xfrm>
+            <a:off x="15020868" y="4307810"/>
+            <a:ext cx="2040362" cy="840826"/>
+          </a:xfrm>
+          <a:prstGeom prst="rect">
+            <a:avLst/>
+          </a:prstGeom>
+          <a:solidFill>
+            <a:schemeClr val="bg1"/>
+          </a:solidFill>
+        </p:spPr>
+        <p:style>
+          <a:lnRef idx="1">
+            <a:schemeClr val="accent1"/>
+          </a:lnRef>
+          <a:fillRef idx="3">
+            <a:schemeClr val="accent1"/>
+          </a:fillRef>
+          <a:effectRef idx="2">
+            <a:schemeClr val="accent1"/>
+          </a:effectRef>
+          <a:fontRef idx="minor">
+            <a:schemeClr val="lt1"/>
+          </a:fontRef>
+        </p:style>
+        <p:txBody>
+          <a:bodyPr rtlCol="0" anchor="ctr"/>
+          <a:lstStyle/>
+          <a:p>
+            <a:pPr algn="ctr"/>
+            <a:r>
+              <a:rPr lang="en-US" sz="2000" b="1" dirty="0">
+                <a:solidFill>
+                  <a:schemeClr val="tx1"/>
+                </a:solidFill>
+                <a:latin typeface="Helvetica Light" panose="020B0403020202020204" pitchFamily="34" charset="0"/>
+              </a:rPr>
+              <a:t>Optimize </a:t>
+            </a:r>
+          </a:p>
+          <a:p>
+            <a:pPr algn="ctr"/>
+            <a:r>
+              <a:rPr lang="en-US" sz="2000" b="1" dirty="0">
+                <a:solidFill>
+                  <a:schemeClr val="tx1"/>
+                </a:solidFill>
+                <a:latin typeface="Helvetica Light" panose="020B0403020202020204" pitchFamily="34" charset="0"/>
+              </a:rPr>
+              <a:t>TA Scheduling</a:t>
+            </a:r>
+          </a:p>
+        </p:txBody>
+      </p:sp>
+      <p:cxnSp>
+        <p:nvCxnSpPr>
+          <p:cNvPr id="13" name="Straight Arrow Connector 12">
+            <a:extLst>
+              <a:ext uri="{FF2B5EF4-FFF2-40B4-BE49-F238E27FC236}">
+                <a16:creationId xmlns:a16="http://schemas.microsoft.com/office/drawing/2014/main" id="{5CDFDCEF-5E5E-2741-9FEB-9804B3277B80}"/>
+              </a:ext>
+            </a:extLst>
+          </p:cNvPr>
+          <p:cNvCxnSpPr/>
+          <p:nvPr/>
+        </p:nvCxnSpPr>
+        <p:spPr>
+          <a:xfrm>
+            <a:off x="11445875" y="4737399"/>
+            <a:ext cx="464859" cy="0"/>
+          </a:xfrm>
+          <a:prstGeom prst="straightConnector1">
+            <a:avLst/>
+          </a:prstGeom>
+          <a:ln w="44450">
+            <a:solidFill>
+              <a:schemeClr val="tx1"/>
+            </a:solidFill>
+            <a:tailEnd type="triangle"/>
+          </a:ln>
+          <a:effectLst/>
+        </p:spPr>
+        <p:style>
+          <a:lnRef idx="2">
+            <a:schemeClr val="accent1"/>
+          </a:lnRef>
+          <a:fillRef idx="0">
+            <a:schemeClr val="accent1"/>
+          </a:fillRef>
+          <a:effectRef idx="1">
+            <a:schemeClr val="accent1"/>
+          </a:effectRef>
+          <a:fontRef idx="minor">
+            <a:schemeClr val="tx1"/>
+          </a:fontRef>
+        </p:style>
+      </p:cxnSp>
+      <p:cxnSp>
+        <p:nvCxnSpPr>
+          <p:cNvPr id="15" name="Straight Arrow Connector 14">
+            <a:extLst>
+              <a:ext uri="{FF2B5EF4-FFF2-40B4-BE49-F238E27FC236}">
+                <a16:creationId xmlns:a16="http://schemas.microsoft.com/office/drawing/2014/main" id="{FDB0A286-C995-A84E-A7B0-C1E53F1B82ED}"/>
+              </a:ext>
+            </a:extLst>
+          </p:cNvPr>
+          <p:cNvCxnSpPr/>
+          <p:nvPr/>
+        </p:nvCxnSpPr>
+        <p:spPr>
+          <a:xfrm>
+            <a:off x="14273797" y="4755080"/>
+            <a:ext cx="685800" cy="0"/>
+          </a:xfrm>
+          <a:prstGeom prst="straightConnector1">
+            <a:avLst/>
+          </a:prstGeom>
+          <a:ln w="44450">
+            <a:solidFill>
+              <a:schemeClr val="tx1"/>
+            </a:solidFill>
+            <a:tailEnd type="triangle"/>
+          </a:ln>
+          <a:effectLst/>
+        </p:spPr>
+        <p:style>
+          <a:lnRef idx="2">
+            <a:schemeClr val="accent1"/>
+          </a:lnRef>
+          <a:fillRef idx="0">
+            <a:schemeClr val="accent1"/>
+          </a:fillRef>
+          <a:effectRef idx="1">
+            <a:schemeClr val="accent1"/>
+          </a:effectRef>
+          <a:fontRef idx="minor">
+            <a:schemeClr val="tx1"/>
+          </a:fontRef>
+        </p:style>
+      </p:cxnSp>
+      <p:sp>
+        <p:nvSpPr>
+          <p:cNvPr id="54" name="Rectangle 53">
+            <a:extLst>
+              <a:ext uri="{FF2B5EF4-FFF2-40B4-BE49-F238E27FC236}">
+                <a16:creationId xmlns:a16="http://schemas.microsoft.com/office/drawing/2014/main" id="{570FCF8B-EF97-9F49-B4EE-C558EE8665FB}"/>
+              </a:ext>
+            </a:extLst>
+          </p:cNvPr>
+          <p:cNvSpPr/>
+          <p:nvPr/>
+        </p:nvSpPr>
+        <p:spPr>
+          <a:xfrm>
+            <a:off x="9301222" y="4316986"/>
+            <a:ext cx="2040362" cy="840826"/>
+          </a:xfrm>
+          <a:prstGeom prst="rect">
+            <a:avLst/>
+          </a:prstGeom>
+          <a:solidFill>
+            <a:schemeClr val="bg1"/>
+          </a:solidFill>
+        </p:spPr>
+        <p:style>
+          <a:lnRef idx="1">
+            <a:schemeClr val="accent1"/>
+          </a:lnRef>
+          <a:fillRef idx="3">
+            <a:schemeClr val="accent1"/>
+          </a:fillRef>
+          <a:effectRef idx="2">
+            <a:schemeClr val="accent1"/>
+          </a:effectRef>
+          <a:fontRef idx="minor">
+            <a:schemeClr val="lt1"/>
+          </a:fontRef>
+        </p:style>
+        <p:txBody>
+          <a:bodyPr rtlCol="0" anchor="ctr"/>
+          <a:lstStyle/>
+          <a:p>
+            <a:pPr algn="ctr"/>
+            <a:r>
+              <a:rPr lang="en-US" sz="2000" b="1" dirty="0">
+                <a:solidFill>
+                  <a:schemeClr val="tx1"/>
+                </a:solidFill>
+                <a:latin typeface="Helvetica Light" panose="020B0403020202020204" pitchFamily="34" charset="0"/>
+              </a:rPr>
+              <a:t>Collect</a:t>
+            </a:r>
+          </a:p>
+          <a:p>
+            <a:pPr algn="ctr"/>
+            <a:r>
+              <a:rPr lang="en-US" sz="2000" b="1" dirty="0">
+                <a:solidFill>
+                  <a:schemeClr val="tx1"/>
+                </a:solidFill>
+                <a:latin typeface="Helvetica Light" panose="020B0403020202020204" pitchFamily="34" charset="0"/>
+              </a:rPr>
+              <a:t>Queue Data</a:t>
+            </a:r>
+          </a:p>
+        </p:txBody>
+      </p:sp>
+      <p:sp>
+        <p:nvSpPr>
+          <p:cNvPr id="27" name="Rectangle 26">
+            <a:extLst>
+              <a:ext uri="{FF2B5EF4-FFF2-40B4-BE49-F238E27FC236}">
+                <a16:creationId xmlns:a16="http://schemas.microsoft.com/office/drawing/2014/main" id="{AA05E2E0-7549-D745-89BB-3B6C9546BF22}"/>
+              </a:ext>
+            </a:extLst>
+          </p:cNvPr>
+          <p:cNvSpPr/>
+          <p:nvPr/>
+        </p:nvSpPr>
+        <p:spPr>
+          <a:xfrm>
+            <a:off x="23926277" y="410662"/>
+            <a:ext cx="2772944" cy="1054541"/>
+          </a:xfrm>
+          <a:prstGeom prst="rect">
+            <a:avLst/>
+          </a:prstGeom>
+          <a:solidFill>
+            <a:srgbClr val="99163F"/>
+          </a:solidFill>
+        </p:spPr>
+        <p:style>
+          <a:lnRef idx="1">
+            <a:schemeClr val="accent1"/>
+          </a:lnRef>
+          <a:fillRef idx="3">
+            <a:schemeClr val="accent1"/>
+          </a:fillRef>
+          <a:effectRef idx="2">
+            <a:schemeClr val="accent1"/>
+          </a:effectRef>
+          <a:fontRef idx="minor">
+            <a:schemeClr val="lt1"/>
+          </a:fontRef>
+        </p:style>
+        <p:txBody>
+          <a:bodyPr rtlCol="0" anchor="ctr"/>
+          <a:lstStyle/>
+          <a:p>
+            <a:pPr algn="ctr"/>
+            <a:r>
+              <a:rPr lang="en-US" dirty="0"/>
+              <a:t>CS 221</a:t>
+            </a:r>
+          </a:p>
+        </p:txBody>
+      </p:sp>
+      <p:sp>
+        <p:nvSpPr>
+          <p:cNvPr id="60" name="Rectangle 59">
+            <a:extLst>
+              <a:ext uri="{FF2B5EF4-FFF2-40B4-BE49-F238E27FC236}">
+                <a16:creationId xmlns:a16="http://schemas.microsoft.com/office/drawing/2014/main" id="{D2D8D289-B037-714E-AD6D-07FE2F321936}"/>
+              </a:ext>
+            </a:extLst>
+          </p:cNvPr>
+          <p:cNvSpPr/>
+          <p:nvPr/>
+        </p:nvSpPr>
+        <p:spPr>
+          <a:xfrm>
+            <a:off x="23926277" y="1515675"/>
+            <a:ext cx="2772944" cy="1054541"/>
+          </a:xfrm>
+          <a:prstGeom prst="rect">
+            <a:avLst/>
+          </a:prstGeom>
+          <a:noFill/>
+        </p:spPr>
+        <p:style>
+          <a:lnRef idx="1">
+            <a:schemeClr val="accent1"/>
+          </a:lnRef>
+          <a:fillRef idx="3">
+            <a:schemeClr val="accent1"/>
+          </a:fillRef>
+          <a:effectRef idx="2">
+            <a:schemeClr val="accent1"/>
+          </a:effectRef>
+          <a:fontRef idx="minor">
+            <a:schemeClr val="lt1"/>
+          </a:fontRef>
+        </p:style>
+        <p:txBody>
+          <a:bodyPr rtlCol="0" anchor="ctr"/>
+          <a:lstStyle/>
+          <a:p>
+            <a:pPr algn="ctr"/>
+            <a:r>
+              <a:rPr lang="en-US" dirty="0">
+                <a:solidFill>
+                  <a:schemeClr val="tx2">
+                    <a:lumMod val="75000"/>
+                  </a:schemeClr>
+                </a:solidFill>
+              </a:rPr>
+              <a:t>CS 229</a:t>
+            </a:r>
+          </a:p>
+        </p:txBody>
+      </p:sp>
+      <p:sp>
+        <p:nvSpPr>
+          <p:cNvPr id="61" name="TextBox 60">
+            <a:extLst>
+              <a:ext uri="{FF2B5EF4-FFF2-40B4-BE49-F238E27FC236}">
+                <a16:creationId xmlns:a16="http://schemas.microsoft.com/office/drawing/2014/main" id="{E8DADC01-F68F-364B-8726-E859BA678547}"/>
+              </a:ext>
+            </a:extLst>
+          </p:cNvPr>
+          <p:cNvSpPr txBox="1"/>
+          <p:nvPr/>
+        </p:nvSpPr>
+        <p:spPr>
+          <a:xfrm>
+            <a:off x="9117755" y="5712415"/>
+            <a:ext cx="8231902" cy="707886"/>
+          </a:xfrm>
+          <a:prstGeom prst="rect">
+            <a:avLst/>
+          </a:prstGeom>
+          <a:noFill/>
+        </p:spPr>
+        <p:txBody>
+          <a:bodyPr wrap="square" rtlCol="0">
+            <a:spAutoFit/>
+          </a:bodyPr>
+          <a:lstStyle/>
+          <a:p>
+            <a:r>
+              <a:rPr lang="en-US" sz="2000" dirty="0">
+                <a:latin typeface="Helvetica" pitchFamily="2" charset="0"/>
+              </a:rPr>
+              <a:t>Datasets: </a:t>
+            </a:r>
+            <a:r>
+              <a:rPr lang="en-US" sz="2000" b="1" dirty="0">
+                <a:latin typeface="Helvetica" pitchFamily="2" charset="0"/>
+              </a:rPr>
+              <a:t>CS107</a:t>
+            </a:r>
+            <a:r>
+              <a:rPr lang="en-US" sz="2000" dirty="0">
+                <a:latin typeface="Helvetica" pitchFamily="2" charset="0"/>
+              </a:rPr>
+              <a:t> (</a:t>
+            </a:r>
+            <a:r>
+              <a:rPr lang="en-US" sz="2000" dirty="0" err="1">
+                <a:latin typeface="Helvetica" pitchFamily="2" charset="0"/>
+              </a:rPr>
+              <a:t>Spr</a:t>
+            </a:r>
+            <a:r>
+              <a:rPr lang="en-US" sz="2000" dirty="0">
+                <a:latin typeface="Helvetica" pitchFamily="2" charset="0"/>
+              </a:rPr>
+              <a:t>/</a:t>
+            </a:r>
+            <a:r>
+              <a:rPr lang="en-US" sz="2000" dirty="0" err="1">
+                <a:latin typeface="Helvetica" pitchFamily="2" charset="0"/>
+              </a:rPr>
+              <a:t>Aut</a:t>
+            </a:r>
+            <a:r>
+              <a:rPr lang="en-US" sz="2000" dirty="0">
+                <a:latin typeface="Helvetica" pitchFamily="2" charset="0"/>
+              </a:rPr>
+              <a:t> 2017, </a:t>
+            </a:r>
+            <a:r>
+              <a:rPr lang="en-US" sz="2000" dirty="0" err="1">
+                <a:latin typeface="Helvetica" pitchFamily="2" charset="0"/>
+              </a:rPr>
+              <a:t>Aut</a:t>
+            </a:r>
+            <a:r>
+              <a:rPr lang="en-US" sz="2000" dirty="0">
+                <a:latin typeface="Helvetica" pitchFamily="2" charset="0"/>
+              </a:rPr>
+              <a:t>/Win/</a:t>
+            </a:r>
+            <a:r>
+              <a:rPr lang="en-US" sz="2000" dirty="0" err="1">
+                <a:latin typeface="Helvetica" pitchFamily="2" charset="0"/>
+              </a:rPr>
+              <a:t>Spr</a:t>
+            </a:r>
+            <a:r>
+              <a:rPr lang="en-US" sz="2000" dirty="0">
+                <a:latin typeface="Helvetica" pitchFamily="2" charset="0"/>
+              </a:rPr>
+              <a:t> 2018), </a:t>
+            </a:r>
+            <a:r>
+              <a:rPr lang="en-US" sz="2000" b="1" dirty="0">
+                <a:latin typeface="Helvetica" pitchFamily="2" charset="0"/>
+              </a:rPr>
+              <a:t>CS161</a:t>
+            </a:r>
+            <a:r>
+              <a:rPr lang="en-US" sz="2000" dirty="0">
+                <a:latin typeface="Helvetica" pitchFamily="2" charset="0"/>
+              </a:rPr>
+              <a:t> (</a:t>
+            </a:r>
+            <a:r>
+              <a:rPr lang="en-US" sz="2000" dirty="0" err="1">
+                <a:latin typeface="Helvetica" pitchFamily="2" charset="0"/>
+              </a:rPr>
+              <a:t>Spr</a:t>
+            </a:r>
+            <a:r>
+              <a:rPr lang="en-US" sz="2000" dirty="0">
+                <a:latin typeface="Helvetica" pitchFamily="2" charset="0"/>
+              </a:rPr>
+              <a:t>/</a:t>
+            </a:r>
+            <a:r>
+              <a:rPr lang="en-US" sz="2000" dirty="0" err="1">
+                <a:latin typeface="Helvetica" pitchFamily="2" charset="0"/>
+              </a:rPr>
+              <a:t>Aut</a:t>
+            </a:r>
+            <a:r>
+              <a:rPr lang="en-US" sz="2000" dirty="0">
+                <a:latin typeface="Helvetica" pitchFamily="2" charset="0"/>
+              </a:rPr>
+              <a:t> 2017), </a:t>
+            </a:r>
+            <a:r>
+              <a:rPr lang="en-US" sz="2000" b="1" dirty="0">
+                <a:latin typeface="Helvetica" pitchFamily="2" charset="0"/>
+              </a:rPr>
+              <a:t>CS110</a:t>
+            </a:r>
+            <a:r>
+              <a:rPr lang="en-US" sz="2000" dirty="0">
+                <a:latin typeface="Helvetica" pitchFamily="2" charset="0"/>
+              </a:rPr>
+              <a:t> (</a:t>
+            </a:r>
+            <a:r>
+              <a:rPr lang="en-US" sz="2000" dirty="0" err="1">
+                <a:latin typeface="Helvetica" pitchFamily="2" charset="0"/>
+              </a:rPr>
+              <a:t>Spr</a:t>
+            </a:r>
+            <a:r>
+              <a:rPr lang="en-US" sz="2000" dirty="0">
+                <a:latin typeface="Helvetica" pitchFamily="2" charset="0"/>
+              </a:rPr>
+              <a:t>/</a:t>
+            </a:r>
+            <a:r>
+              <a:rPr lang="en-US" sz="2000" dirty="0" err="1">
+                <a:latin typeface="Helvetica" pitchFamily="2" charset="0"/>
+              </a:rPr>
+              <a:t>Aut</a:t>
+            </a:r>
+            <a:r>
+              <a:rPr lang="en-US" sz="2000" dirty="0">
+                <a:latin typeface="Helvetica" pitchFamily="2" charset="0"/>
+              </a:rPr>
+              <a:t> 2018), </a:t>
+            </a:r>
+            <a:r>
+              <a:rPr lang="en-US" sz="2000" b="1" dirty="0">
+                <a:latin typeface="Helvetica" pitchFamily="2" charset="0"/>
+              </a:rPr>
+              <a:t>CS229</a:t>
+            </a:r>
+            <a:r>
+              <a:rPr lang="en-US" sz="2000" dirty="0">
+                <a:latin typeface="Helvetica" pitchFamily="2" charset="0"/>
+              </a:rPr>
+              <a:t> (</a:t>
+            </a:r>
+            <a:r>
+              <a:rPr lang="en-US" sz="2000" dirty="0" err="1">
+                <a:latin typeface="Helvetica" pitchFamily="2" charset="0"/>
+              </a:rPr>
+              <a:t>Aut</a:t>
+            </a:r>
+            <a:r>
+              <a:rPr lang="en-US" sz="2000" dirty="0">
+                <a:latin typeface="Helvetica" pitchFamily="2" charset="0"/>
+              </a:rPr>
+              <a:t> 2018) </a:t>
+            </a:r>
+          </a:p>
+        </p:txBody>
+      </p:sp>
+      <mc:AlternateContent xmlns:mc="http://schemas.openxmlformats.org/markup-compatibility/2006">
+        <mc:Choice xmlns:a14="http://schemas.microsoft.com/office/drawing/2010/main" Requires="a14">
+          <p:sp>
+            <p:nvSpPr>
+              <p:cNvPr id="63" name="TextBox 62">
+                <a:extLst>
+                  <a:ext uri="{FF2B5EF4-FFF2-40B4-BE49-F238E27FC236}">
+                    <a16:creationId xmlns:a16="http://schemas.microsoft.com/office/drawing/2014/main" id="{0DC5AF6B-AA83-8146-A477-788B93F8AC74}"/>
+                  </a:ext>
+                </a:extLst>
+              </p:cNvPr>
+              <p:cNvSpPr txBox="1"/>
+              <p:nvPr/>
+            </p:nvSpPr>
+            <p:spPr>
+              <a:xfrm>
+                <a:off x="9276825" y="12246176"/>
+                <a:ext cx="7605359" cy="5383397"/>
+              </a:xfrm>
+              <a:prstGeom prst="rect">
+                <a:avLst/>
+              </a:prstGeom>
+              <a:noFill/>
+            </p:spPr>
+            <p:txBody>
+              <a:bodyPr wrap="square" rtlCol="0">
+                <a:spAutoFit/>
+              </a:bodyPr>
+              <a:lstStyle/>
+              <a:p>
+                <a:pPr marL="342900" indent="-342900">
+                  <a:buFont typeface="Arial" panose="020B0604020202020204" pitchFamily="34" charset="0"/>
+                  <a:buChar char="•"/>
+                </a:pPr>
+                <a:r>
+                  <a:rPr lang="en-US" sz="2000" dirty="0">
+                    <a:latin typeface="Helvetica" panose="020B0604020202020204" pitchFamily="34" charset="0"/>
+                    <a:cs typeface="Helvetica" panose="020B0604020202020204" pitchFamily="34" charset="0"/>
+                  </a:rPr>
+                  <a:t>Having predicted the expected load influx for each individual office hour in the quarter, we use Bayesian inference with </a:t>
+                </a:r>
+                <a:r>
+                  <a:rPr lang="en-US" sz="2000" b="1" dirty="0">
+                    <a:latin typeface="Helvetica" panose="020B0604020202020204" pitchFamily="34" charset="0"/>
+                    <a:cs typeface="Helvetica" panose="020B0604020202020204" pitchFamily="34" charset="0"/>
+                  </a:rPr>
+                  <a:t>Gibbs Sampling </a:t>
+                </a:r>
+                <a:r>
+                  <a:rPr lang="en-US" sz="2000" dirty="0">
+                    <a:latin typeface="Helvetica" panose="020B0604020202020204" pitchFamily="34" charset="0"/>
+                    <a:cs typeface="Helvetica" panose="020B0604020202020204" pitchFamily="34" charset="0"/>
+                  </a:rPr>
+                  <a:t>to assign TAs to each individual time slot.</a:t>
+                </a:r>
+              </a:p>
+              <a:p>
+                <a:pPr marL="342900" indent="-342900">
+                  <a:buFont typeface="Arial" panose="020B0604020202020204" pitchFamily="34" charset="0"/>
+                  <a:buChar char="•"/>
+                </a:pPr>
+                <a:r>
+                  <a:rPr lang="en-US" sz="2000" dirty="0">
+                    <a:latin typeface="Helvetica" panose="020B0604020202020204" pitchFamily="34" charset="0"/>
+                    <a:cs typeface="Helvetica" panose="020B0604020202020204" pitchFamily="34" charset="0"/>
+                  </a:rPr>
+                  <a:t>Treating each TA as a variable, the Gibbs sampler assigns a </a:t>
+                </a:r>
+                <a:r>
+                  <a:rPr lang="en-US" sz="2000" i="1" dirty="0">
+                    <a:latin typeface="Helvetica" panose="020B0604020202020204" pitchFamily="34" charset="0"/>
+                    <a:cs typeface="Helvetica" panose="020B0604020202020204" pitchFamily="34" charset="0"/>
+                  </a:rPr>
+                  <a:t>fixed</a:t>
+                </a:r>
+                <a:r>
+                  <a:rPr lang="en-US" sz="2000" dirty="0">
+                    <a:latin typeface="Helvetica" panose="020B0604020202020204" pitchFamily="34" charset="0"/>
+                    <a:cs typeface="Helvetica" panose="020B0604020202020204" pitchFamily="34" charset="0"/>
+                  </a:rPr>
+                  <a:t>-length list of time slots to each TA through the quarter. Each time slot assignment is weighted according to:</a:t>
+                </a:r>
+              </a:p>
+              <a:p>
+                <a:pPr algn="ctr"/>
+                <a14:m>
+                  <m:oMathPara xmlns:m="http://schemas.openxmlformats.org/officeDocument/2006/math">
+                    <m:oMathParaPr>
+                      <m:jc m:val="centerGroup"/>
+                    </m:oMathParaPr>
+                    <m:oMath xmlns:m="http://schemas.openxmlformats.org/officeDocument/2006/math">
+                      <m:r>
+                        <a:rPr lang="en-US" sz="2000" b="0" i="1" smtClean="0">
+                          <a:latin typeface="Cambria Math" panose="02040503050406030204" pitchFamily="18" charset="0"/>
+                          <a:cs typeface="Helvetica" panose="020B0604020202020204" pitchFamily="34" charset="0"/>
+                        </a:rPr>
+                        <m:t>𝑃</m:t>
+                      </m:r>
+                      <m:d>
+                        <m:dPr>
+                          <m:ctrlPr>
+                            <a:rPr lang="en-US" sz="2000" b="0" i="1" smtClean="0">
+                              <a:latin typeface="Cambria Math" panose="02040503050406030204" pitchFamily="18" charset="0"/>
+                              <a:cs typeface="Helvetica" panose="020B0604020202020204" pitchFamily="34" charset="0"/>
+                            </a:rPr>
+                          </m:ctrlPr>
+                        </m:dPr>
+                        <m:e>
+                          <m:sSub>
+                            <m:sSubPr>
+                              <m:ctrlPr>
+                                <a:rPr lang="en-US" sz="2000" b="0" i="1" smtClean="0">
+                                  <a:latin typeface="Cambria Math" panose="02040503050406030204" pitchFamily="18" charset="0"/>
+                                  <a:cs typeface="Helvetica" panose="020B0604020202020204" pitchFamily="34" charset="0"/>
+                                </a:rPr>
+                              </m:ctrlPr>
+                            </m:sSubPr>
+                            <m:e>
+                              <m:sSub>
+                                <m:sSubPr>
+                                  <m:ctrlPr>
+                                    <a:rPr lang="en-US" sz="2000" b="0" i="1" smtClean="0">
+                                      <a:latin typeface="Cambria Math" panose="02040503050406030204" pitchFamily="18" charset="0"/>
+                                      <a:cs typeface="Helvetica" panose="020B0604020202020204" pitchFamily="34" charset="0"/>
+                                    </a:rPr>
+                                  </m:ctrlPr>
+                                </m:sSubPr>
+                                <m:e>
+                                  <m:r>
+                                    <a:rPr lang="en-US" sz="2000" b="0" i="1" smtClean="0">
+                                      <a:latin typeface="Cambria Math" panose="02040503050406030204" pitchFamily="18" charset="0"/>
+                                      <a:cs typeface="Helvetica" panose="020B0604020202020204" pitchFamily="34" charset="0"/>
+                                    </a:rPr>
+                                    <m:t>𝑋</m:t>
+                                  </m:r>
+                                </m:e>
+                                <m:sub>
+                                  <m:r>
+                                    <a:rPr lang="en-US" sz="2000" b="0" i="1" smtClean="0">
+                                      <a:latin typeface="Cambria Math" panose="02040503050406030204" pitchFamily="18" charset="0"/>
+                                      <a:cs typeface="Helvetica" panose="020B0604020202020204" pitchFamily="34" charset="0"/>
+                                    </a:rPr>
+                                    <m:t>𝑖</m:t>
+                                  </m:r>
+                                </m:sub>
+                              </m:sSub>
+                            </m:e>
+                            <m:sub>
+                              <m:r>
+                                <a:rPr lang="en-US" sz="2000" b="0" i="1" smtClean="0">
+                                  <a:latin typeface="Cambria Math" panose="02040503050406030204" pitchFamily="18" charset="0"/>
+                                  <a:cs typeface="Helvetica" panose="020B0604020202020204" pitchFamily="34" charset="0"/>
+                                </a:rPr>
+                                <m:t>𝑗</m:t>
+                              </m:r>
+                            </m:sub>
+                          </m:sSub>
+                          <m:r>
+                            <a:rPr lang="en-US" sz="2000" b="0" i="1" smtClean="0">
+                              <a:latin typeface="Cambria Math" panose="02040503050406030204" pitchFamily="18" charset="0"/>
+                              <a:cs typeface="Helvetica" panose="020B0604020202020204" pitchFamily="34" charset="0"/>
+                            </a:rPr>
+                            <m:t>=</m:t>
+                          </m:r>
+                          <m:r>
+                            <a:rPr lang="en-US" sz="2000" b="0" i="1" smtClean="0">
+                              <a:latin typeface="Cambria Math" panose="02040503050406030204" pitchFamily="18" charset="0"/>
+                              <a:cs typeface="Helvetica" panose="020B0604020202020204" pitchFamily="34" charset="0"/>
+                            </a:rPr>
+                            <m:t>𝑥</m:t>
+                          </m:r>
+                        </m:e>
+                      </m:d>
+                      <m:r>
+                        <a:rPr lang="en-US" sz="2000" b="0" i="1" smtClean="0">
+                          <a:latin typeface="Cambria Math" panose="02040503050406030204" pitchFamily="18" charset="0"/>
+                          <a:cs typeface="Helvetica" panose="020B0604020202020204" pitchFamily="34" charset="0"/>
+                        </a:rPr>
+                        <m:t>= </m:t>
+                      </m:r>
+                      <m:sSub>
+                        <m:sSubPr>
+                          <m:ctrlPr>
+                            <a:rPr lang="en-US" sz="2000" b="1" i="1" smtClean="0">
+                              <a:latin typeface="Cambria Math" panose="02040503050406030204" pitchFamily="18" charset="0"/>
+                              <a:cs typeface="Helvetica" panose="020B0604020202020204" pitchFamily="34" charset="0"/>
+                            </a:rPr>
+                          </m:ctrlPr>
+                        </m:sSubPr>
+                        <m:e>
+                          <m:r>
+                            <a:rPr lang="en-US" sz="2000" b="1" i="1" smtClean="0">
+                              <a:latin typeface="Cambria Math" panose="02040503050406030204" pitchFamily="18" charset="0"/>
+                              <a:cs typeface="Helvetica" panose="020B0604020202020204" pitchFamily="34" charset="0"/>
+                            </a:rPr>
+                            <m:t>𝑻</m:t>
+                          </m:r>
+                        </m:e>
+                        <m:sub>
+                          <m:r>
+                            <a:rPr lang="en-US" sz="2000" b="1" i="1" smtClean="0">
+                              <a:latin typeface="Cambria Math" panose="02040503050406030204" pitchFamily="18" charset="0"/>
+                              <a:cs typeface="Helvetica" panose="020B0604020202020204" pitchFamily="34" charset="0"/>
+                            </a:rPr>
+                            <m:t>𝒂𝒔𝒔𝒊𝒈𝒏𝒆𝒅</m:t>
+                          </m:r>
+                        </m:sub>
+                      </m:sSub>
+                      <m:r>
+                        <a:rPr lang="en-US" sz="2000" b="0" i="1" smtClean="0">
+                          <a:latin typeface="Cambria Math" panose="02040503050406030204" pitchFamily="18" charset="0"/>
+                          <a:cs typeface="Helvetica" panose="020B0604020202020204" pitchFamily="34" charset="0"/>
+                        </a:rPr>
+                        <m:t>⋅</m:t>
+                      </m:r>
+                      <m:sSub>
+                        <m:sSubPr>
+                          <m:ctrlPr>
+                            <a:rPr lang="en-US" sz="2000" b="1" i="1" smtClean="0">
+                              <a:latin typeface="Cambria Math" panose="02040503050406030204" pitchFamily="18" charset="0"/>
+                              <a:cs typeface="Helvetica" panose="020B0604020202020204" pitchFamily="34" charset="0"/>
+                            </a:rPr>
+                          </m:ctrlPr>
+                        </m:sSubPr>
+                        <m:e>
+                          <m:r>
+                            <a:rPr lang="en-US" sz="2000" b="1" i="1" smtClean="0">
+                              <a:latin typeface="Cambria Math" panose="02040503050406030204" pitchFamily="18" charset="0"/>
+                              <a:cs typeface="Helvetica" panose="020B0604020202020204" pitchFamily="34" charset="0"/>
+                            </a:rPr>
+                            <m:t>𝑻</m:t>
+                          </m:r>
+                        </m:e>
+                        <m:sub>
+                          <m:r>
+                            <a:rPr lang="en-US" sz="2000" b="1" i="1" smtClean="0">
+                              <a:latin typeface="Cambria Math" panose="02040503050406030204" pitchFamily="18" charset="0"/>
+                              <a:cs typeface="Helvetica" panose="020B0604020202020204" pitchFamily="34" charset="0"/>
+                            </a:rPr>
+                            <m:t>𝒑𝒓𝒆𝒅𝒊𝒄𝒕𝒆𝒅</m:t>
+                          </m:r>
+                        </m:sub>
+                      </m:sSub>
+                      <m:r>
+                        <a:rPr lang="en-US" sz="2000" b="0" i="1" smtClean="0">
+                          <a:latin typeface="Cambria Math" panose="02040503050406030204" pitchFamily="18" charset="0"/>
+                          <a:cs typeface="Helvetica" panose="020B0604020202020204" pitchFamily="34" charset="0"/>
+                        </a:rPr>
+                        <m:t> | </m:t>
+                      </m:r>
+                      <m:sSub>
+                        <m:sSubPr>
+                          <m:ctrlPr>
+                            <a:rPr lang="en-US" sz="2000" b="0" i="1" smtClean="0">
+                              <a:latin typeface="Cambria Math" panose="02040503050406030204" pitchFamily="18" charset="0"/>
+                              <a:cs typeface="Helvetica" panose="020B0604020202020204" pitchFamily="34" charset="0"/>
+                            </a:rPr>
+                          </m:ctrlPr>
+                        </m:sSubPr>
+                        <m:e>
+                          <m:r>
+                            <a:rPr lang="en-US" sz="2000" b="0" i="1" smtClean="0">
+                              <a:latin typeface="Cambria Math" panose="02040503050406030204" pitchFamily="18" charset="0"/>
+                              <a:cs typeface="Helvetica" panose="020B0604020202020204" pitchFamily="34" charset="0"/>
+                            </a:rPr>
+                            <m:t>𝑋</m:t>
+                          </m:r>
+                        </m:e>
+                        <m:sub>
+                          <m:r>
+                            <a:rPr lang="en-US" sz="2000" b="0" i="1" smtClean="0">
+                              <a:latin typeface="Cambria Math" panose="02040503050406030204" pitchFamily="18" charset="0"/>
+                              <a:cs typeface="Helvetica" panose="020B0604020202020204" pitchFamily="34" charset="0"/>
+                            </a:rPr>
+                            <m:t>𝑖𝑗</m:t>
+                          </m:r>
+                        </m:sub>
+                      </m:sSub>
+                      <m:r>
+                        <a:rPr lang="en-US" sz="2000" b="0" i="1" smtClean="0">
+                          <a:latin typeface="Cambria Math" panose="02040503050406030204" pitchFamily="18" charset="0"/>
+                          <a:cs typeface="Helvetica" panose="020B0604020202020204" pitchFamily="34" charset="0"/>
+                        </a:rPr>
+                        <m:t>=</m:t>
+                      </m:r>
+                      <m:r>
+                        <a:rPr lang="en-US" sz="2000" b="0" i="1" smtClean="0">
+                          <a:latin typeface="Cambria Math" panose="02040503050406030204" pitchFamily="18" charset="0"/>
+                          <a:cs typeface="Helvetica" panose="020B0604020202020204" pitchFamily="34" charset="0"/>
+                        </a:rPr>
+                        <m:t>𝑥</m:t>
+                      </m:r>
+                    </m:oMath>
+                  </m:oMathPara>
+                </a14:m>
+                <a:endParaRPr lang="en-US" sz="2000" dirty="0">
+                  <a:latin typeface="Helvetica" panose="020B0604020202020204" pitchFamily="34" charset="0"/>
+                  <a:cs typeface="Helvetica" panose="020B0604020202020204" pitchFamily="34" charset="0"/>
+                </a:endParaRPr>
+              </a:p>
+              <a:p>
+                <a:pPr algn="ctr"/>
+                <a:r>
+                  <a:rPr lang="en-US" sz="2000" i="1" dirty="0">
+                    <a:latin typeface="Helvetica" panose="020B0604020202020204" pitchFamily="34" charset="0"/>
+                    <a:cs typeface="Helvetica" panose="020B0604020202020204" pitchFamily="34" charset="0"/>
+                  </a:rPr>
+                  <a:t>where </a:t>
+                </a:r>
+                <a14:m>
+                  <m:oMath xmlns:m="http://schemas.openxmlformats.org/officeDocument/2006/math">
+                    <m:sSub>
+                      <m:sSubPr>
+                        <m:ctrlPr>
+                          <a:rPr lang="en-US" sz="2000" b="1" i="1">
+                            <a:latin typeface="Cambria Math" panose="02040503050406030204" pitchFamily="18" charset="0"/>
+                            <a:cs typeface="Helvetica" panose="020B0604020202020204" pitchFamily="34" charset="0"/>
+                          </a:rPr>
+                        </m:ctrlPr>
+                      </m:sSubPr>
+                      <m:e>
+                        <m:r>
+                          <a:rPr lang="en-US" sz="2000" b="1" i="1" smtClean="0">
+                            <a:latin typeface="Cambria Math" panose="02040503050406030204" pitchFamily="18" charset="0"/>
+                            <a:cs typeface="Helvetica" panose="020B0604020202020204" pitchFamily="34" charset="0"/>
+                          </a:rPr>
+                          <m:t> </m:t>
+                        </m:r>
+                        <m:r>
+                          <a:rPr lang="en-US" sz="2000" b="1" i="1">
+                            <a:latin typeface="Cambria Math" panose="02040503050406030204" pitchFamily="18" charset="0"/>
+                            <a:cs typeface="Helvetica" panose="020B0604020202020204" pitchFamily="34" charset="0"/>
+                          </a:rPr>
+                          <m:t>𝑻</m:t>
+                        </m:r>
+                      </m:e>
+                      <m:sub>
+                        <m:r>
+                          <a:rPr lang="en-US" sz="2000" b="1" i="1">
+                            <a:latin typeface="Cambria Math" panose="02040503050406030204" pitchFamily="18" charset="0"/>
+                            <a:cs typeface="Helvetica" panose="020B0604020202020204" pitchFamily="34" charset="0"/>
+                          </a:rPr>
+                          <m:t>𝒂𝒔𝒔𝒊𝒈𝒏𝒆𝒅</m:t>
+                        </m:r>
+                      </m:sub>
+                    </m:sSub>
+                    <m:r>
+                      <a:rPr lang="en-US" sz="2000" b="1" i="1" smtClean="0">
+                        <a:latin typeface="Cambria Math" panose="02040503050406030204" pitchFamily="18" charset="0"/>
+                        <a:cs typeface="Helvetica" panose="020B0604020202020204" pitchFamily="34" charset="0"/>
+                      </a:rPr>
+                      <m:t> </m:t>
+                    </m:r>
+                    <m:r>
+                      <a:rPr lang="en-US" sz="2000" i="1">
+                        <a:latin typeface="Cambria Math" panose="02040503050406030204" pitchFamily="18" charset="0"/>
+                        <a:cs typeface="Helvetica" panose="020B0604020202020204" pitchFamily="34" charset="0"/>
+                      </a:rPr>
+                      <m:t>⋅</m:t>
+                    </m:r>
+                    <m:sSub>
+                      <m:sSubPr>
+                        <m:ctrlPr>
+                          <a:rPr lang="en-US" sz="2000" b="1" i="1">
+                            <a:latin typeface="Cambria Math" panose="02040503050406030204" pitchFamily="18" charset="0"/>
+                            <a:cs typeface="Helvetica" panose="020B0604020202020204" pitchFamily="34" charset="0"/>
+                          </a:rPr>
+                        </m:ctrlPr>
+                      </m:sSubPr>
+                      <m:e>
+                        <m:r>
+                          <a:rPr lang="en-US" sz="2000" b="1" i="1">
+                            <a:latin typeface="Cambria Math" panose="02040503050406030204" pitchFamily="18" charset="0"/>
+                            <a:cs typeface="Helvetica" panose="020B0604020202020204" pitchFamily="34" charset="0"/>
+                          </a:rPr>
+                          <m:t>𝑻</m:t>
+                        </m:r>
+                      </m:e>
+                      <m:sub>
+                        <m:r>
+                          <a:rPr lang="en-US" sz="2000" b="1" i="1">
+                            <a:latin typeface="Cambria Math" panose="02040503050406030204" pitchFamily="18" charset="0"/>
+                            <a:cs typeface="Helvetica" panose="020B0604020202020204" pitchFamily="34" charset="0"/>
+                          </a:rPr>
+                          <m:t>𝒑𝒓𝒆𝒅𝒊𝒄𝒕𝒆𝒅</m:t>
+                        </m:r>
+                      </m:sub>
+                    </m:sSub>
+                  </m:oMath>
+                </a14:m>
+                <a:r>
+                  <a:rPr lang="en-US" sz="2000" i="1" dirty="0">
+                    <a:latin typeface="Helvetica" panose="020B0604020202020204" pitchFamily="34" charset="0"/>
+                    <a:cs typeface="Helvetica" panose="020B0604020202020204" pitchFamily="34" charset="0"/>
+                  </a:rPr>
+                  <a:t> measures the correlation between the number of Tas assigned each office hour and the predicted loads </a:t>
+                </a:r>
+              </a:p>
+              <a:p>
+                <a:pPr marL="342900" indent="-342900">
+                  <a:buFont typeface="Arial" panose="020B0604020202020204" pitchFamily="34" charset="0"/>
+                  <a:buChar char="•"/>
+                </a:pPr>
+                <a:r>
+                  <a:rPr lang="en-US" sz="2000" dirty="0">
+                    <a:latin typeface="Helvetica" panose="020B0604020202020204" pitchFamily="34" charset="0"/>
+                    <a:cs typeface="Helvetica" panose="020B0604020202020204" pitchFamily="34" charset="0"/>
+                  </a:rPr>
+                  <a:t>We also factor in constraints such as a maximum TA workload per day and continuity of office hours for a TA within any given day.</a:t>
+                </a:r>
+              </a:p>
+              <a:p>
+                <a:pPr marL="342900" indent="-342900">
+                  <a:buFont typeface="Arial" panose="020B0604020202020204" pitchFamily="34" charset="0"/>
+                  <a:buChar char="•"/>
+                </a:pPr>
+                <a:endParaRPr lang="en-US" sz="2000" dirty="0">
+                  <a:latin typeface="Helvetica" panose="020B0604020202020204" pitchFamily="34" charset="0"/>
+                  <a:cs typeface="Helvetica" panose="020B0604020202020204" pitchFamily="34" charset="0"/>
+                </a:endParaRPr>
+              </a:p>
+              <a:p>
+                <a:endParaRPr lang="en-US" sz="3600" dirty="0">
+                  <a:latin typeface="Helvetica" panose="020B0604020202020204" pitchFamily="34" charset="0"/>
+                  <a:cs typeface="Helvetica" panose="020B0604020202020204" pitchFamily="34" charset="0"/>
+                </a:endParaRPr>
+              </a:p>
+              <a:p>
+                <a:r>
+                  <a:rPr lang="en-US" sz="3600" dirty="0">
+                    <a:latin typeface="Helvetica" panose="020B0604020202020204" pitchFamily="34" charset="0"/>
+                    <a:cs typeface="Helvetica" panose="020B0604020202020204" pitchFamily="34" charset="0"/>
+                  </a:rPr>
+                  <a:t> </a:t>
+                </a:r>
+              </a:p>
+            </p:txBody>
+          </p:sp>
+        </mc:Choice>
+        <mc:Fallback>
+          <p:sp>
+            <p:nvSpPr>
+              <p:cNvPr id="63" name="TextBox 62">
+                <a:extLst>
+                  <a:ext uri="{FF2B5EF4-FFF2-40B4-BE49-F238E27FC236}">
+                    <a16:creationId xmlns:a16="http://schemas.microsoft.com/office/drawing/2014/main" id="{0DC5AF6B-AA83-8146-A477-788B93F8AC74}"/>
+                  </a:ext>
+                </a:extLst>
+              </p:cNvPr>
+              <p:cNvSpPr txBox="1">
+                <a:spLocks noRot="1" noChangeAspect="1" noMove="1" noResize="1" noEditPoints="1" noAdjustHandles="1" noChangeArrowheads="1" noChangeShapeType="1" noTextEdit="1"/>
+              </p:cNvSpPr>
+              <p:nvPr/>
+            </p:nvSpPr>
+            <p:spPr>
+              <a:xfrm>
+                <a:off x="9276825" y="12246176"/>
+                <a:ext cx="7605359" cy="5383397"/>
+              </a:xfrm>
+              <a:prstGeom prst="rect">
+                <a:avLst/>
+              </a:prstGeom>
+              <a:blipFill>
+                <a:blip r:embed="rId4"/>
+                <a:stretch>
+                  <a:fillRect l="-722" t="-566" r="-1443"/>
+                </a:stretch>
+              </a:blipFill>
+            </p:spPr>
+            <p:txBody>
+              <a:bodyPr/>
+              <a:lstStyle/>
+              <a:p>
+                <a:r>
+                  <a:rPr lang="en-US">
+                    <a:noFill/>
+                  </a:rPr>
+                  <a:t> </a:t>
+                </a:r>
+              </a:p>
+            </p:txBody>
+          </p:sp>
+        </mc:Fallback>
+      </mc:AlternateContent>
+      <p:sp>
+        <p:nvSpPr>
+          <p:cNvPr id="55" name="TextBox 54">
+            <a:extLst>
+              <a:ext uri="{FF2B5EF4-FFF2-40B4-BE49-F238E27FC236}">
+                <a16:creationId xmlns:a16="http://schemas.microsoft.com/office/drawing/2014/main" id="{39001FD3-5B49-D946-B5FE-CC0F37D748F8}"/>
+              </a:ext>
+            </a:extLst>
+          </p:cNvPr>
+          <p:cNvSpPr txBox="1"/>
+          <p:nvPr/>
+        </p:nvSpPr>
+        <p:spPr>
+          <a:xfrm>
+            <a:off x="9028131" y="7658679"/>
+            <a:ext cx="8231902" cy="707886"/>
+          </a:xfrm>
+          <a:prstGeom prst="rect">
+            <a:avLst/>
+          </a:prstGeom>
+          <a:noFill/>
+        </p:spPr>
+        <p:txBody>
+          <a:bodyPr wrap="square" rtlCol="0">
+            <a:spAutoFit/>
+          </a:bodyPr>
+          <a:lstStyle/>
+          <a:p>
+            <a:pPr marL="342900" indent="-342900">
+              <a:buFont typeface="Arial" panose="020B0604020202020204" pitchFamily="34" charset="0"/>
+              <a:buChar char="•"/>
+            </a:pPr>
+            <a:r>
+              <a:rPr lang="en-US" sz="2000" dirty="0">
+                <a:latin typeface="Helvetica" pitchFamily="2" charset="0"/>
+              </a:rPr>
+              <a:t>Trained and compared different models with deep fully-connected NN, univariate LSTMs and multivariate LSTMs.</a:t>
+            </a:r>
+          </a:p>
+        </p:txBody>
+      </p:sp>
+      <p:graphicFrame>
+        <p:nvGraphicFramePr>
+          <p:cNvPr id="3" name="Table 2">
+            <a:extLst>
+              <a:ext uri="{FF2B5EF4-FFF2-40B4-BE49-F238E27FC236}">
+                <a16:creationId xmlns:a16="http://schemas.microsoft.com/office/drawing/2014/main" id="{09C9289D-51AA-EA43-98E3-C95E74530F55}"/>
+              </a:ext>
+            </a:extLst>
+          </p:cNvPr>
+          <p:cNvGraphicFramePr>
+            <a:graphicFrameLocks noGrp="1"/>
+          </p:cNvGraphicFramePr>
+          <p:nvPr>
+            <p:extLst>
+              <p:ext uri="{D42A27DB-BD31-4B8C-83A1-F6EECF244321}">
+                <p14:modId xmlns:p14="http://schemas.microsoft.com/office/powerpoint/2010/main" val="4262217554"/>
+              </p:ext>
+            </p:extLst>
+          </p:nvPr>
+        </p:nvGraphicFramePr>
+        <p:xfrm>
+          <a:off x="9517880" y="8343070"/>
+          <a:ext cx="7430888" cy="2115688"/>
+        </p:xfrm>
+        <a:graphic>
+          <a:graphicData uri="http://schemas.openxmlformats.org/drawingml/2006/table">
+            <a:tbl>
+              <a:tblPr firstRow="1" bandRow="1">
+                <a:tableStyleId>{21E4AEA4-8DFA-4A89-87EB-49C32662AFE0}</a:tableStyleId>
+              </a:tblPr>
+              <a:tblGrid>
+                <a:gridCol w="3715444">
+                  <a:extLst>
+                    <a:ext uri="{9D8B030D-6E8A-4147-A177-3AD203B41FA5}">
+                      <a16:colId xmlns:a16="http://schemas.microsoft.com/office/drawing/2014/main" val="2629748201"/>
+                    </a:ext>
+                  </a:extLst>
+                </a:gridCol>
+                <a:gridCol w="3715444">
+                  <a:extLst>
+                    <a:ext uri="{9D8B030D-6E8A-4147-A177-3AD203B41FA5}">
+                      <a16:colId xmlns:a16="http://schemas.microsoft.com/office/drawing/2014/main" val="2277001996"/>
+                    </a:ext>
+                  </a:extLst>
+                </a:gridCol>
+              </a:tblGrid>
+              <a:tr h="528922">
+                <a:tc>
+                  <a:txBody>
+                    <a:bodyPr/>
+                    <a:lstStyle/>
+                    <a:p>
+                      <a:pPr algn="ctr"/>
+                      <a:r>
+                        <a:rPr lang="en-US" sz="2200" dirty="0"/>
+                        <a:t>Model for regression</a:t>
+                      </a:r>
+                    </a:p>
+                  </a:txBody>
+                  <a:tcPr/>
+                </a:tc>
+                <a:tc>
+                  <a:txBody>
+                    <a:bodyPr/>
+                    <a:lstStyle/>
+                    <a:p>
+                      <a:pPr algn="ctr"/>
+                      <a:r>
+                        <a:rPr lang="en-US" sz="2200" dirty="0"/>
+                        <a:t>RMSE (Load Influx)</a:t>
+                      </a:r>
+                    </a:p>
+                  </a:txBody>
+                  <a:tcPr/>
+                </a:tc>
+                <a:extLst>
+                  <a:ext uri="{0D108BD9-81ED-4DB2-BD59-A6C34878D82A}">
+                    <a16:rowId xmlns:a16="http://schemas.microsoft.com/office/drawing/2014/main" val="1343423239"/>
+                  </a:ext>
+                </a:extLst>
+              </a:tr>
+              <a:tr h="528922">
+                <a:tc>
+                  <a:txBody>
+                    <a:bodyPr/>
+                    <a:lstStyle/>
+                    <a:p>
+                      <a:pPr algn="ctr"/>
+                      <a:r>
+                        <a:rPr lang="en-US" sz="2200" dirty="0"/>
+                        <a:t>FCN (hinge/MSE)</a:t>
+                      </a:r>
+                    </a:p>
+                  </a:txBody>
+                  <a:tcPr/>
+                </a:tc>
+                <a:tc>
+                  <a:txBody>
+                    <a:bodyPr/>
+                    <a:lstStyle/>
+                    <a:p>
+                      <a:pPr algn="ctr"/>
+                      <a:r>
+                        <a:rPr lang="en-US" sz="2200" b="0" dirty="0"/>
+                        <a:t>161 / </a:t>
+                      </a:r>
+                      <a:r>
+                        <a:rPr lang="en-US" sz="2200" b="1" dirty="0"/>
+                        <a:t>119</a:t>
+                      </a:r>
+                    </a:p>
+                  </a:txBody>
+                  <a:tcPr/>
+                </a:tc>
+                <a:extLst>
+                  <a:ext uri="{0D108BD9-81ED-4DB2-BD59-A6C34878D82A}">
+                    <a16:rowId xmlns:a16="http://schemas.microsoft.com/office/drawing/2014/main" val="1677445699"/>
+                  </a:ext>
+                </a:extLst>
+              </a:tr>
+              <a:tr h="528922">
+                <a:tc>
+                  <a:txBody>
+                    <a:bodyPr/>
+                    <a:lstStyle/>
+                    <a:p>
+                      <a:pPr algn="ctr"/>
+                      <a:r>
+                        <a:rPr lang="en-US" sz="2200" dirty="0"/>
+                        <a:t>Univariate LSTM</a:t>
+                      </a:r>
+                    </a:p>
+                  </a:txBody>
+                  <a:tcPr/>
+                </a:tc>
+                <a:tc>
+                  <a:txBody>
+                    <a:bodyPr/>
+                    <a:lstStyle/>
+                    <a:p>
+                      <a:pPr algn="ctr"/>
+                      <a:r>
+                        <a:rPr lang="en-US" sz="2200"/>
+                        <a:t>137</a:t>
+                      </a:r>
+                      <a:endParaRPr lang="en-US" sz="2200" dirty="0"/>
+                    </a:p>
+                  </a:txBody>
+                  <a:tcPr/>
+                </a:tc>
+                <a:extLst>
+                  <a:ext uri="{0D108BD9-81ED-4DB2-BD59-A6C34878D82A}">
+                    <a16:rowId xmlns:a16="http://schemas.microsoft.com/office/drawing/2014/main" val="3352610144"/>
+                  </a:ext>
+                </a:extLst>
+              </a:tr>
+              <a:tr h="528922">
+                <a:tc>
+                  <a:txBody>
+                    <a:bodyPr/>
+                    <a:lstStyle/>
+                    <a:p>
+                      <a:pPr algn="ctr"/>
+                      <a:r>
+                        <a:rPr lang="en-US" sz="2200" dirty="0"/>
+                        <a:t>Autoregressive LSTM</a:t>
+                      </a:r>
+                    </a:p>
+                  </a:txBody>
+                  <a:tcPr/>
+                </a:tc>
+                <a:tc>
+                  <a:txBody>
+                    <a:bodyPr/>
+                    <a:lstStyle/>
+                    <a:p>
+                      <a:pPr algn="ctr"/>
+                      <a:r>
+                        <a:rPr lang="en-US" sz="2200" dirty="0"/>
+                        <a:t>128</a:t>
+                      </a:r>
+                    </a:p>
+                  </a:txBody>
+                  <a:tcPr/>
+                </a:tc>
+                <a:extLst>
+                  <a:ext uri="{0D108BD9-81ED-4DB2-BD59-A6C34878D82A}">
+                    <a16:rowId xmlns:a16="http://schemas.microsoft.com/office/drawing/2014/main" val="3662109026"/>
+                  </a:ext>
+                </a:extLst>
+              </a:tr>
+            </a:tbl>
+          </a:graphicData>
+        </a:graphic>
+      </p:graphicFrame>
+      <p:grpSp>
+        <p:nvGrpSpPr>
+          <p:cNvPr id="14" name="Group 13">
+            <a:extLst>
+              <a:ext uri="{FF2B5EF4-FFF2-40B4-BE49-F238E27FC236}">
+                <a16:creationId xmlns:a16="http://schemas.microsoft.com/office/drawing/2014/main" id="{DBC57ACA-1F60-3B40-B5D1-375166A4D0FD}"/>
+              </a:ext>
+            </a:extLst>
+          </p:cNvPr>
+          <p:cNvGrpSpPr/>
+          <p:nvPr/>
+        </p:nvGrpSpPr>
+        <p:grpSpPr>
+          <a:xfrm>
+            <a:off x="18042860" y="4234041"/>
+            <a:ext cx="8767786" cy="2702250"/>
+            <a:chOff x="18094769" y="4385325"/>
+            <a:chExt cx="8767786" cy="2702250"/>
+          </a:xfrm>
+        </p:grpSpPr>
+        <p:grpSp>
+          <p:nvGrpSpPr>
+            <p:cNvPr id="12" name="Group 11">
+              <a:extLst>
+                <a:ext uri="{FF2B5EF4-FFF2-40B4-BE49-F238E27FC236}">
+                  <a16:creationId xmlns:a16="http://schemas.microsoft.com/office/drawing/2014/main" id="{1F21AC5A-70DC-B64C-8C14-26B1076103FF}"/>
+                </a:ext>
+              </a:extLst>
+            </p:cNvPr>
+            <p:cNvGrpSpPr/>
+            <p:nvPr/>
+          </p:nvGrpSpPr>
+          <p:grpSpPr>
+            <a:xfrm>
+              <a:off x="18094770" y="4385325"/>
+              <a:ext cx="8767785" cy="2267525"/>
+              <a:chOff x="18094770" y="4385325"/>
+              <a:chExt cx="8767785" cy="2267525"/>
+            </a:xfrm>
+          </p:grpSpPr>
+          <p:pic>
+            <p:nvPicPr>
+              <p:cNvPr id="4" name="Picture 3">
+                <a:extLst>
+                  <a:ext uri="{FF2B5EF4-FFF2-40B4-BE49-F238E27FC236}">
+                    <a16:creationId xmlns:a16="http://schemas.microsoft.com/office/drawing/2014/main" id="{400AA407-2F4B-E548-BAEF-B635B07BE19E}"/>
+                  </a:ext>
+                </a:extLst>
+              </p:cNvPr>
+              <p:cNvPicPr>
+                <a:picLocks noChangeAspect="1"/>
+              </p:cNvPicPr>
+              <p:nvPr/>
+            </p:nvPicPr>
+            <p:blipFill>
+              <a:blip r:embed="rId5"/>
+              <a:stretch>
+                <a:fillRect/>
+              </a:stretch>
+            </p:blipFill>
+            <p:spPr>
+              <a:xfrm>
+                <a:off x="23840153" y="4407624"/>
+                <a:ext cx="3022402" cy="2222928"/>
+              </a:xfrm>
+              <a:prstGeom prst="rect">
+                <a:avLst/>
+              </a:prstGeom>
+            </p:spPr>
+          </p:pic>
+          <p:pic>
+            <p:nvPicPr>
+              <p:cNvPr id="7" name="Picture 6">
+                <a:extLst>
+                  <a:ext uri="{FF2B5EF4-FFF2-40B4-BE49-F238E27FC236}">
+                    <a16:creationId xmlns:a16="http://schemas.microsoft.com/office/drawing/2014/main" id="{273282C8-A615-884F-9544-42220FDFECDD}"/>
+                  </a:ext>
+                </a:extLst>
+              </p:cNvPr>
+              <p:cNvPicPr>
+                <a:picLocks noChangeAspect="1"/>
+              </p:cNvPicPr>
+              <p:nvPr/>
+            </p:nvPicPr>
+            <p:blipFill>
+              <a:blip r:embed="rId6"/>
+              <a:stretch>
+                <a:fillRect/>
+              </a:stretch>
+            </p:blipFill>
+            <p:spPr>
+              <a:xfrm>
+                <a:off x="20981336" y="4473300"/>
+                <a:ext cx="2855281" cy="2130516"/>
+              </a:xfrm>
+              <a:prstGeom prst="rect">
+                <a:avLst/>
+              </a:prstGeom>
+            </p:spPr>
+          </p:pic>
+          <p:pic>
+            <p:nvPicPr>
+              <p:cNvPr id="8" name="Picture 7">
+                <a:extLst>
+                  <a:ext uri="{FF2B5EF4-FFF2-40B4-BE49-F238E27FC236}">
+                    <a16:creationId xmlns:a16="http://schemas.microsoft.com/office/drawing/2014/main" id="{22DCC4E4-787E-6744-8F3D-BAE5FC6EB75B}"/>
+                  </a:ext>
+                </a:extLst>
+              </p:cNvPr>
+              <p:cNvPicPr>
+                <a:picLocks noChangeAspect="1"/>
+              </p:cNvPicPr>
+              <p:nvPr/>
+            </p:nvPicPr>
+            <p:blipFill>
+              <a:blip r:embed="rId7"/>
+              <a:stretch>
+                <a:fillRect/>
+              </a:stretch>
+            </p:blipFill>
+            <p:spPr>
+              <a:xfrm>
+                <a:off x="18094770" y="4385325"/>
+                <a:ext cx="2873841" cy="2267525"/>
+              </a:xfrm>
+              <a:prstGeom prst="rect">
+                <a:avLst/>
+              </a:prstGeom>
+            </p:spPr>
+          </p:pic>
+        </p:grpSp>
+        <p:sp>
+          <p:nvSpPr>
+            <p:cNvPr id="59" name="TextBox 58">
+              <a:extLst>
+                <a:ext uri="{FF2B5EF4-FFF2-40B4-BE49-F238E27FC236}">
+                  <a16:creationId xmlns:a16="http://schemas.microsoft.com/office/drawing/2014/main" id="{81F67041-EDD6-544B-99F7-E12D90C9B454}"/>
+                </a:ext>
+              </a:extLst>
+            </p:cNvPr>
+            <p:cNvSpPr txBox="1"/>
+            <p:nvPr/>
+          </p:nvSpPr>
+          <p:spPr>
+            <a:xfrm>
+              <a:off x="18094769" y="6656688"/>
+              <a:ext cx="8767785" cy="430887"/>
+            </a:xfrm>
+            <a:prstGeom prst="rect">
+              <a:avLst/>
+            </a:prstGeom>
+            <a:noFill/>
+          </p:spPr>
+          <p:txBody>
+            <a:bodyPr wrap="square" rtlCol="0">
+              <a:spAutoFit/>
+            </a:bodyPr>
+            <a:lstStyle/>
+            <a:p>
+              <a:r>
+                <a:rPr lang="en-US" sz="2200" dirty="0">
+                  <a:latin typeface="Helvetica" pitchFamily="2" charset="0"/>
+                </a:rPr>
+                <a:t>        Without norm          With normalization     Norm + Early stopping</a:t>
+              </a:r>
+            </a:p>
+          </p:txBody>
+        </p:sp>
+      </p:grpSp>
+      <p:sp>
+        <p:nvSpPr>
+          <p:cNvPr id="62" name="TextBox 61">
+            <a:extLst>
+              <a:ext uri="{FF2B5EF4-FFF2-40B4-BE49-F238E27FC236}">
+                <a16:creationId xmlns:a16="http://schemas.microsoft.com/office/drawing/2014/main" id="{DE09C6A8-0A93-424A-9648-7C59BF263DA9}"/>
+              </a:ext>
+            </a:extLst>
+          </p:cNvPr>
+          <p:cNvSpPr txBox="1"/>
+          <p:nvPr/>
+        </p:nvSpPr>
+        <p:spPr>
+          <a:xfrm>
+            <a:off x="18035567" y="3839812"/>
+            <a:ext cx="8878757" cy="400110"/>
+          </a:xfrm>
+          <a:prstGeom prst="rect">
+            <a:avLst/>
+          </a:prstGeom>
+          <a:noFill/>
+        </p:spPr>
+        <p:txBody>
+          <a:bodyPr wrap="square" rtlCol="0">
+            <a:spAutoFit/>
+          </a:bodyPr>
+          <a:lstStyle/>
+          <a:p>
+            <a:pPr marL="342900" indent="-342900">
+              <a:buFont typeface="Arial" panose="020B0604020202020204" pitchFamily="34" charset="0"/>
+              <a:buChar char="•"/>
+            </a:pPr>
+            <a:r>
+              <a:rPr lang="en-US" sz="2000" dirty="0">
+                <a:latin typeface="Helvetica" pitchFamily="2" charset="0"/>
+              </a:rPr>
+              <a:t>Used normalization and early stopping to prevent overfitting. </a:t>
+            </a:r>
+          </a:p>
+        </p:txBody>
+      </p:sp>
       <p:pic>
         <p:nvPicPr>
-          <p:cNvPr id="3" name="Picture 2">
+          <p:cNvPr id="20" name="Picture 19">
             <a:extLst>
               <a:ext uri="{FF2B5EF4-FFF2-40B4-BE49-F238E27FC236}">
-                <a16:creationId xmlns:a16="http://schemas.microsoft.com/office/drawing/2014/main" id="{BFBC1476-1C40-FC45-9FBE-F043808F6A25}"/>
+                <a16:creationId xmlns:a16="http://schemas.microsoft.com/office/drawing/2014/main" id="{214134BF-6497-2A47-81B1-0E920038EF19}"/>
               </a:ext>
             </a:extLst>
           </p:cNvPr>
@@ -5403,51 +9082,107 @@
           <p:nvPr/>
         </p:nvPicPr>
         <p:blipFill>
-          <a:blip r:embed="rId4"/>
+          <a:blip r:embed="rId8"/>
           <a:stretch>
             <a:fillRect/>
           </a:stretch>
         </p:blipFill>
         <p:spPr>
           <a:xfrm>
-            <a:off x="24187898" y="349127"/>
-            <a:ext cx="1966330" cy="756281"/>
+            <a:off x="1351347" y="14533098"/>
+            <a:ext cx="6268348" cy="3219911"/>
           </a:xfrm>
           <a:prstGeom prst="rect">
             <a:avLst/>
           </a:prstGeom>
         </p:spPr>
       </p:pic>
-      <p:pic>
-        <p:nvPicPr>
-          <p:cNvPr id="4" name="Picture 3">
+      <p:grpSp>
+        <p:nvGrpSpPr>
+          <p:cNvPr id="29" name="Group 28">
             <a:extLst>
               <a:ext uri="{FF2B5EF4-FFF2-40B4-BE49-F238E27FC236}">
-                <a16:creationId xmlns:a16="http://schemas.microsoft.com/office/drawing/2014/main" id="{F02915D7-8D7B-6D47-BEEF-C18F3ED122E3}"/>
+                <a16:creationId xmlns:a16="http://schemas.microsoft.com/office/drawing/2014/main" id="{DCE0CBFE-F4A9-A547-B5BC-6A329C24310B}"/>
               </a:ext>
             </a:extLst>
           </p:cNvPr>
-          <p:cNvPicPr>
-            <a:picLocks noChangeAspect="1"/>
-          </p:cNvPicPr>
+          <p:cNvGrpSpPr/>
           <p:nvPr/>
-        </p:nvPicPr>
-        <p:blipFill>
-          <a:blip r:embed="rId5"/>
-          <a:stretch>
-            <a:fillRect/>
-          </a:stretch>
-        </p:blipFill>
-        <p:spPr>
+        </p:nvGrpSpPr>
+        <p:grpSpPr>
           <a:xfrm>
-            <a:off x="24176478" y="1180914"/>
-            <a:ext cx="2341122" cy="1393524"/>
+            <a:off x="18042860" y="7035072"/>
+            <a:ext cx="5350540" cy="4076109"/>
+            <a:chOff x="18192123" y="7417251"/>
+            <a:chExt cx="5316286" cy="4254363"/>
           </a:xfrm>
-          <a:prstGeom prst="rect">
-            <a:avLst/>
-          </a:prstGeom>
-        </p:spPr>
-      </p:pic>
+        </p:grpSpPr>
+        <p:pic>
+          <p:nvPicPr>
+            <p:cNvPr id="24" name="Picture 23">
+              <a:extLst>
+                <a:ext uri="{FF2B5EF4-FFF2-40B4-BE49-F238E27FC236}">
+                  <a16:creationId xmlns:a16="http://schemas.microsoft.com/office/drawing/2014/main" id="{03D2B28E-312F-8C4D-9D58-BA29F27963B2}"/>
+                </a:ext>
+              </a:extLst>
+            </p:cNvPr>
+            <p:cNvPicPr>
+              <a:picLocks noChangeAspect="1"/>
+            </p:cNvPicPr>
+            <p:nvPr/>
+          </p:nvPicPr>
+          <p:blipFill>
+            <a:blip r:embed="rId9"/>
+            <a:stretch>
+              <a:fillRect/>
+            </a:stretch>
+          </p:blipFill>
+          <p:spPr>
+            <a:xfrm>
+              <a:off x="18192123" y="7417251"/>
+              <a:ext cx="5201278" cy="3804899"/>
+            </a:xfrm>
+            <a:prstGeom prst="rect">
+              <a:avLst/>
+            </a:prstGeom>
+          </p:spPr>
+        </p:pic>
+        <p:sp>
+          <p:nvSpPr>
+            <p:cNvPr id="28" name="TextBox 27">
+              <a:extLst>
+                <a:ext uri="{FF2B5EF4-FFF2-40B4-BE49-F238E27FC236}">
+                  <a16:creationId xmlns:a16="http://schemas.microsoft.com/office/drawing/2014/main" id="{E33C9CF2-DF6F-3041-A666-1289D6A5092C}"/>
+                </a:ext>
+              </a:extLst>
+            </p:cNvPr>
+            <p:cNvSpPr txBox="1"/>
+            <p:nvPr/>
+          </p:nvSpPr>
+          <p:spPr>
+            <a:xfrm>
+              <a:off x="18326807" y="11240727"/>
+              <a:ext cx="5181602" cy="430887"/>
+            </a:xfrm>
+            <a:prstGeom prst="rect">
+              <a:avLst/>
+            </a:prstGeom>
+            <a:noFill/>
+          </p:spPr>
+          <p:txBody>
+            <a:bodyPr wrap="square" rtlCol="0">
+              <a:spAutoFit/>
+            </a:bodyPr>
+            <a:lstStyle/>
+            <a:p>
+              <a:r>
+                <a:rPr lang="en-US" sz="2200" dirty="0"/>
+                <a:t>Univariate LSTM predicts load influx spikes.</a:t>
+              </a:r>
+            </a:p>
+          </p:txBody>
+        </p:sp>
+      </p:grpSp>
     </p:spTree>
     <p:extLst>
       <p:ext uri="{BB962C8B-B14F-4D97-AF65-F5344CB8AC3E}">

</xml_diff>